<commit_message>
added cover image to k means method
</commit_message>
<xml_diff>
--- a/pages/particle_separation_with_clustering/figures.pptx
+++ b/pages/particle_separation_with_clustering/figures.pptx
@@ -111,6 +111,11 @@
       </a:defRPr>
     </a:lvl9pPr>
   </p:defaultTextStyle>
+  <p:extLst>
+    <p:ext uri="{EFAFB233-063F-42B5-8137-9DF3F51BA10A}">
+      <p15:sldGuideLst xmlns:p15="http://schemas.microsoft.com/office/powerpoint/2012/main"/>
+    </p:ext>
+  </p:extLst>
 </p:presentation>
 </file>
 
@@ -2650,36 +2655,36 @@
     </dgm:pt>
   </dgm:ptLst>
   <dgm:cxnLst>
-    <dgm:cxn modelId="{5F633E01-82CD-41CE-A6B1-207C5D7EAD14}" type="presOf" srcId="{7BF3C338-B51E-4794-89CD-E85058C507F8}" destId="{E7EE1688-07F4-489F-A68A-8CE6D9390113}" srcOrd="1" destOrd="0" presId="urn:microsoft.com/office/officeart/2005/8/layout/process3"/>
+    <dgm:cxn modelId="{779BFE10-9BFF-4F43-8FB6-CE7AE5E96703}" type="presOf" srcId="{7BF3C338-B51E-4794-89CD-E85058C507F8}" destId="{A0D7CEDF-2F6D-4B4A-8297-E00F1FD47BE6}" srcOrd="0" destOrd="0" presId="urn:microsoft.com/office/officeart/2005/8/layout/process3"/>
+    <dgm:cxn modelId="{D68E3219-A718-47B5-9B54-57CED13EAB8A}" type="presOf" srcId="{84A537C3-6D6B-42A7-AC2E-A0F2751C1E98}" destId="{9C1417E0-5E04-4942-AB74-5FC9D73BB691}" srcOrd="1" destOrd="0" presId="urn:microsoft.com/office/officeart/2005/8/layout/process3"/>
+    <dgm:cxn modelId="{EAECC224-254A-44F4-A1EA-BB0FF52A4B9F}" type="presOf" srcId="{3ADCE084-2417-4CD2-8F14-EEEFD3F936F2}" destId="{912172FA-9327-429C-933B-E109DC05DCE0}" srcOrd="0" destOrd="0" presId="urn:microsoft.com/office/officeart/2005/8/layout/process3"/>
     <dgm:cxn modelId="{4F310B39-2099-4784-AFC7-05A56A95A8EC}" srcId="{3ADCE084-2417-4CD2-8F14-EEEFD3F936F2}" destId="{970801B1-6EF2-458C-8430-370F6C7DDD55}" srcOrd="2" destOrd="0" parTransId="{359B04E8-83B6-4555-9BD0-4163E2C20165}" sibTransId="{F8B54163-F541-40CC-9E79-A2FC89E46A9F}"/>
-    <dgm:cxn modelId="{7E0F0E3C-1FAF-4977-8232-969218E31A3E}" type="presOf" srcId="{970801B1-6EF2-458C-8430-370F6C7DDD55}" destId="{68D00C0C-60DA-4664-99CE-F7FDC39E9FEC}" srcOrd="1" destOrd="0" presId="urn:microsoft.com/office/officeart/2005/8/layout/process3"/>
     <dgm:cxn modelId="{E3BE7E69-8AB4-4B00-817B-9B44221507D7}" srcId="{3ADCE084-2417-4CD2-8F14-EEEFD3F936F2}" destId="{66DD84B8-AFAE-47FD-BE4D-1BEFF8A6F88D}" srcOrd="0" destOrd="0" parTransId="{6B445937-3B6C-440A-BA46-DF6A3FDA9278}" sibTransId="{84A537C3-6D6B-42A7-AC2E-A0F2751C1E98}"/>
     <dgm:cxn modelId="{9387E752-C2A9-44B5-9E70-7B854577FD29}" srcId="{3ADCE084-2417-4CD2-8F14-EEEFD3F936F2}" destId="{7BF3C338-B51E-4794-89CD-E85058C507F8}" srcOrd="1" destOrd="0" parTransId="{2E267248-CC0A-411E-B671-76F44CAEBAD1}" sibTransId="{53E88FD9-AF6E-4FE8-B945-A94588B57BAA}"/>
-    <dgm:cxn modelId="{1DF93074-1715-4E26-8A16-631271FA7B08}" type="presOf" srcId="{970801B1-6EF2-458C-8430-370F6C7DDD55}" destId="{B903AD5D-8962-495C-B0F6-CE18F6DA794B}" srcOrd="0" destOrd="0" presId="urn:microsoft.com/office/officeart/2005/8/layout/process3"/>
-    <dgm:cxn modelId="{488AB782-3165-49BF-8ABD-2331A3E66629}" type="presOf" srcId="{7BF3C338-B51E-4794-89CD-E85058C507F8}" destId="{A0D7CEDF-2F6D-4B4A-8297-E00F1FD47BE6}" srcOrd="0" destOrd="0" presId="urn:microsoft.com/office/officeart/2005/8/layout/process3"/>
-    <dgm:cxn modelId="{E9CA3195-DE5E-432F-B26C-D88531F19336}" type="presOf" srcId="{84A537C3-6D6B-42A7-AC2E-A0F2751C1E98}" destId="{28452D4A-F8EE-4A91-8F02-E243D8B9B135}" srcOrd="0" destOrd="0" presId="urn:microsoft.com/office/officeart/2005/8/layout/process3"/>
-    <dgm:cxn modelId="{58F132A1-2A21-4C7D-AEC1-71432D1E0FC8}" type="presOf" srcId="{3ADCE084-2417-4CD2-8F14-EEEFD3F936F2}" destId="{912172FA-9327-429C-933B-E109DC05DCE0}" srcOrd="0" destOrd="0" presId="urn:microsoft.com/office/officeart/2005/8/layout/process3"/>
-    <dgm:cxn modelId="{A7434EC2-4153-4F8D-A8EA-1687E9909DA0}" type="presOf" srcId="{66DD84B8-AFAE-47FD-BE4D-1BEFF8A6F88D}" destId="{B153ABD5-C816-46F3-8455-6412B0421BB9}" srcOrd="1" destOrd="0" presId="urn:microsoft.com/office/officeart/2005/8/layout/process3"/>
-    <dgm:cxn modelId="{BAC0CDE4-7222-4BD3-80C2-C6EFA79AC812}" type="presOf" srcId="{53E88FD9-AF6E-4FE8-B945-A94588B57BAA}" destId="{3A3E0DC3-D733-43E8-968E-5A3916C72742}" srcOrd="0" destOrd="0" presId="urn:microsoft.com/office/officeart/2005/8/layout/process3"/>
-    <dgm:cxn modelId="{46625CE5-88A5-41F0-86C9-8079F179B328}" type="presOf" srcId="{66DD84B8-AFAE-47FD-BE4D-1BEFF8A6F88D}" destId="{1E47AF84-EE9E-40F2-A020-12A4F1CA1D8F}" srcOrd="0" destOrd="0" presId="urn:microsoft.com/office/officeart/2005/8/layout/process3"/>
-    <dgm:cxn modelId="{01ECF0ED-A635-479B-AD58-DE9E65EEA056}" type="presOf" srcId="{84A537C3-6D6B-42A7-AC2E-A0F2751C1E98}" destId="{9C1417E0-5E04-4942-AB74-5FC9D73BB691}" srcOrd="1" destOrd="0" presId="urn:microsoft.com/office/officeart/2005/8/layout/process3"/>
-    <dgm:cxn modelId="{F1F50BFD-0707-41B3-8EC4-9B6DF7A5D1EA}" type="presOf" srcId="{53E88FD9-AF6E-4FE8-B945-A94588B57BAA}" destId="{1605C863-136F-4188-B3DD-EF6BD45E4E4D}" srcOrd="1" destOrd="0" presId="urn:microsoft.com/office/officeart/2005/8/layout/process3"/>
-    <dgm:cxn modelId="{A8C7578D-7CF8-4BA5-8452-40D3D4CE11A9}" type="presParOf" srcId="{912172FA-9327-429C-933B-E109DC05DCE0}" destId="{BDE8E051-0B23-4EBD-89AE-9C1933F15EA6}" srcOrd="0" destOrd="0" presId="urn:microsoft.com/office/officeart/2005/8/layout/process3"/>
-    <dgm:cxn modelId="{75A9BA14-051C-46AE-BAC7-4333B910CCEF}" type="presParOf" srcId="{BDE8E051-0B23-4EBD-89AE-9C1933F15EA6}" destId="{1E47AF84-EE9E-40F2-A020-12A4F1CA1D8F}" srcOrd="0" destOrd="0" presId="urn:microsoft.com/office/officeart/2005/8/layout/process3"/>
-    <dgm:cxn modelId="{E50C496E-1455-4781-A25C-19FAB852AFE1}" type="presParOf" srcId="{BDE8E051-0B23-4EBD-89AE-9C1933F15EA6}" destId="{B153ABD5-C816-46F3-8455-6412B0421BB9}" srcOrd="1" destOrd="0" presId="urn:microsoft.com/office/officeart/2005/8/layout/process3"/>
-    <dgm:cxn modelId="{041B90EE-BED7-4FFA-88B7-16BC7C3FDBD6}" type="presParOf" srcId="{BDE8E051-0B23-4EBD-89AE-9C1933F15EA6}" destId="{678504BE-1528-4E3A-BB99-5FCFDB09E0CD}" srcOrd="2" destOrd="0" presId="urn:microsoft.com/office/officeart/2005/8/layout/process3"/>
-    <dgm:cxn modelId="{BF9FF9A7-BF81-4798-9FA9-45401750EBBB}" type="presParOf" srcId="{912172FA-9327-429C-933B-E109DC05DCE0}" destId="{28452D4A-F8EE-4A91-8F02-E243D8B9B135}" srcOrd="1" destOrd="0" presId="urn:microsoft.com/office/officeart/2005/8/layout/process3"/>
-    <dgm:cxn modelId="{B0896057-766F-4F7F-8911-1B0FACDE74FC}" type="presParOf" srcId="{28452D4A-F8EE-4A91-8F02-E243D8B9B135}" destId="{9C1417E0-5E04-4942-AB74-5FC9D73BB691}" srcOrd="0" destOrd="0" presId="urn:microsoft.com/office/officeart/2005/8/layout/process3"/>
-    <dgm:cxn modelId="{C6197178-D223-4927-826A-4B98F4AC89B6}" type="presParOf" srcId="{912172FA-9327-429C-933B-E109DC05DCE0}" destId="{D9F55829-3A3E-41D4-93F0-5276CE801266}" srcOrd="2" destOrd="0" presId="urn:microsoft.com/office/officeart/2005/8/layout/process3"/>
-    <dgm:cxn modelId="{ED36859E-2A2D-4BF3-BBF3-6B4C3B12E8D9}" type="presParOf" srcId="{D9F55829-3A3E-41D4-93F0-5276CE801266}" destId="{A0D7CEDF-2F6D-4B4A-8297-E00F1FD47BE6}" srcOrd="0" destOrd="0" presId="urn:microsoft.com/office/officeart/2005/8/layout/process3"/>
-    <dgm:cxn modelId="{521CAC4C-A364-4A4A-8915-EA72747FE770}" type="presParOf" srcId="{D9F55829-3A3E-41D4-93F0-5276CE801266}" destId="{E7EE1688-07F4-489F-A68A-8CE6D9390113}" srcOrd="1" destOrd="0" presId="urn:microsoft.com/office/officeart/2005/8/layout/process3"/>
-    <dgm:cxn modelId="{7CDB43B3-DB8F-4802-B4FA-74913DC06C78}" type="presParOf" srcId="{D9F55829-3A3E-41D4-93F0-5276CE801266}" destId="{3B6A2C36-29F7-4641-9577-8539AB9B1E8C}" srcOrd="2" destOrd="0" presId="urn:microsoft.com/office/officeart/2005/8/layout/process3"/>
-    <dgm:cxn modelId="{AC7CDBF9-3FA3-49D6-B5EF-A5B3EB12DE39}" type="presParOf" srcId="{912172FA-9327-429C-933B-E109DC05DCE0}" destId="{3A3E0DC3-D733-43E8-968E-5A3916C72742}" srcOrd="3" destOrd="0" presId="urn:microsoft.com/office/officeart/2005/8/layout/process3"/>
-    <dgm:cxn modelId="{7F9B32C5-DE54-4F3C-8108-AE81AF8CD4FC}" type="presParOf" srcId="{3A3E0DC3-D733-43E8-968E-5A3916C72742}" destId="{1605C863-136F-4188-B3DD-EF6BD45E4E4D}" srcOrd="0" destOrd="0" presId="urn:microsoft.com/office/officeart/2005/8/layout/process3"/>
-    <dgm:cxn modelId="{95AC6D0F-1A37-4D59-9E79-337B69D4127F}" type="presParOf" srcId="{912172FA-9327-429C-933B-E109DC05DCE0}" destId="{43F0A786-7EE2-443E-9A84-19BBE03B5A01}" srcOrd="4" destOrd="0" presId="urn:microsoft.com/office/officeart/2005/8/layout/process3"/>
-    <dgm:cxn modelId="{195F0709-A2C6-4366-B184-D3AC9E647572}" type="presParOf" srcId="{43F0A786-7EE2-443E-9A84-19BBE03B5A01}" destId="{B903AD5D-8962-495C-B0F6-CE18F6DA794B}" srcOrd="0" destOrd="0" presId="urn:microsoft.com/office/officeart/2005/8/layout/process3"/>
-    <dgm:cxn modelId="{B88EA013-441E-4E14-8AA4-EEE799F255EF}" type="presParOf" srcId="{43F0A786-7EE2-443E-9A84-19BBE03B5A01}" destId="{68D00C0C-60DA-4664-99CE-F7FDC39E9FEC}" srcOrd="1" destOrd="0" presId="urn:microsoft.com/office/officeart/2005/8/layout/process3"/>
-    <dgm:cxn modelId="{8803C046-3536-45EE-A4BB-21E6320737B5}" type="presParOf" srcId="{43F0A786-7EE2-443E-9A84-19BBE03B5A01}" destId="{CE45B918-B55A-4CF3-B732-BD5DA3FA72F8}" srcOrd="2" destOrd="0" presId="urn:microsoft.com/office/officeart/2005/8/layout/process3"/>
+    <dgm:cxn modelId="{249E7157-CCA5-47B6-BCE2-B88A84E9481C}" type="presOf" srcId="{66DD84B8-AFAE-47FD-BE4D-1BEFF8A6F88D}" destId="{1E47AF84-EE9E-40F2-A020-12A4F1CA1D8F}" srcOrd="0" destOrd="0" presId="urn:microsoft.com/office/officeart/2005/8/layout/process3"/>
+    <dgm:cxn modelId="{4D59E578-3A6D-4CB7-8478-486C82E3FA2D}" type="presOf" srcId="{970801B1-6EF2-458C-8430-370F6C7DDD55}" destId="{B903AD5D-8962-495C-B0F6-CE18F6DA794B}" srcOrd="0" destOrd="0" presId="urn:microsoft.com/office/officeart/2005/8/layout/process3"/>
+    <dgm:cxn modelId="{56182194-2218-4CC5-B305-76C2CC4C8250}" type="presOf" srcId="{7BF3C338-B51E-4794-89CD-E85058C507F8}" destId="{E7EE1688-07F4-489F-A68A-8CE6D9390113}" srcOrd="1" destOrd="0" presId="urn:microsoft.com/office/officeart/2005/8/layout/process3"/>
+    <dgm:cxn modelId="{EF87AFAC-E992-4E7E-BBEA-FACA79C4A6A1}" type="presOf" srcId="{53E88FD9-AF6E-4FE8-B945-A94588B57BAA}" destId="{3A3E0DC3-D733-43E8-968E-5A3916C72742}" srcOrd="0" destOrd="0" presId="urn:microsoft.com/office/officeart/2005/8/layout/process3"/>
+    <dgm:cxn modelId="{B312FFB4-2B66-44E7-BB82-7B8BB9FC7681}" type="presOf" srcId="{970801B1-6EF2-458C-8430-370F6C7DDD55}" destId="{68D00C0C-60DA-4664-99CE-F7FDC39E9FEC}" srcOrd="1" destOrd="0" presId="urn:microsoft.com/office/officeart/2005/8/layout/process3"/>
+    <dgm:cxn modelId="{735997D3-C90A-4488-B885-3D56CE8DCFCF}" type="presOf" srcId="{53E88FD9-AF6E-4FE8-B945-A94588B57BAA}" destId="{1605C863-136F-4188-B3DD-EF6BD45E4E4D}" srcOrd="1" destOrd="0" presId="urn:microsoft.com/office/officeart/2005/8/layout/process3"/>
+    <dgm:cxn modelId="{3B4922EA-8347-47E4-A319-53B128BB166B}" type="presOf" srcId="{84A537C3-6D6B-42A7-AC2E-A0F2751C1E98}" destId="{28452D4A-F8EE-4A91-8F02-E243D8B9B135}" srcOrd="0" destOrd="0" presId="urn:microsoft.com/office/officeart/2005/8/layout/process3"/>
+    <dgm:cxn modelId="{9281EAEB-C295-45D1-BBD9-40029F5C8CFC}" type="presOf" srcId="{66DD84B8-AFAE-47FD-BE4D-1BEFF8A6F88D}" destId="{B153ABD5-C816-46F3-8455-6412B0421BB9}" srcOrd="1" destOrd="0" presId="urn:microsoft.com/office/officeart/2005/8/layout/process3"/>
+    <dgm:cxn modelId="{48F6F086-9528-4EB0-96B7-CB9BAE380AB1}" type="presParOf" srcId="{912172FA-9327-429C-933B-E109DC05DCE0}" destId="{BDE8E051-0B23-4EBD-89AE-9C1933F15EA6}" srcOrd="0" destOrd="0" presId="urn:microsoft.com/office/officeart/2005/8/layout/process3"/>
+    <dgm:cxn modelId="{D1F868AD-4AAE-4A0D-93D8-0A72E89C3135}" type="presParOf" srcId="{BDE8E051-0B23-4EBD-89AE-9C1933F15EA6}" destId="{1E47AF84-EE9E-40F2-A020-12A4F1CA1D8F}" srcOrd="0" destOrd="0" presId="urn:microsoft.com/office/officeart/2005/8/layout/process3"/>
+    <dgm:cxn modelId="{A91A5D6C-EA98-4B5A-B147-3D3B0334899A}" type="presParOf" srcId="{BDE8E051-0B23-4EBD-89AE-9C1933F15EA6}" destId="{B153ABD5-C816-46F3-8455-6412B0421BB9}" srcOrd="1" destOrd="0" presId="urn:microsoft.com/office/officeart/2005/8/layout/process3"/>
+    <dgm:cxn modelId="{227C6C52-9E39-4B71-950F-DFBC39D60B63}" type="presParOf" srcId="{BDE8E051-0B23-4EBD-89AE-9C1933F15EA6}" destId="{678504BE-1528-4E3A-BB99-5FCFDB09E0CD}" srcOrd="2" destOrd="0" presId="urn:microsoft.com/office/officeart/2005/8/layout/process3"/>
+    <dgm:cxn modelId="{F7E86885-11A8-4F6F-9228-8D5104AE6E2F}" type="presParOf" srcId="{912172FA-9327-429C-933B-E109DC05DCE0}" destId="{28452D4A-F8EE-4A91-8F02-E243D8B9B135}" srcOrd="1" destOrd="0" presId="urn:microsoft.com/office/officeart/2005/8/layout/process3"/>
+    <dgm:cxn modelId="{6043AA8C-4BCF-44CD-B227-E4F2EEC0A951}" type="presParOf" srcId="{28452D4A-F8EE-4A91-8F02-E243D8B9B135}" destId="{9C1417E0-5E04-4942-AB74-5FC9D73BB691}" srcOrd="0" destOrd="0" presId="urn:microsoft.com/office/officeart/2005/8/layout/process3"/>
+    <dgm:cxn modelId="{064ABCBC-D705-40B7-87B2-56F1AFF58BC2}" type="presParOf" srcId="{912172FA-9327-429C-933B-E109DC05DCE0}" destId="{D9F55829-3A3E-41D4-93F0-5276CE801266}" srcOrd="2" destOrd="0" presId="urn:microsoft.com/office/officeart/2005/8/layout/process3"/>
+    <dgm:cxn modelId="{762574A2-A171-4CCC-8153-57F87EA05AD2}" type="presParOf" srcId="{D9F55829-3A3E-41D4-93F0-5276CE801266}" destId="{A0D7CEDF-2F6D-4B4A-8297-E00F1FD47BE6}" srcOrd="0" destOrd="0" presId="urn:microsoft.com/office/officeart/2005/8/layout/process3"/>
+    <dgm:cxn modelId="{1BCA5E54-666F-4077-8ECA-0FA4395DB3E6}" type="presParOf" srcId="{D9F55829-3A3E-41D4-93F0-5276CE801266}" destId="{E7EE1688-07F4-489F-A68A-8CE6D9390113}" srcOrd="1" destOrd="0" presId="urn:microsoft.com/office/officeart/2005/8/layout/process3"/>
+    <dgm:cxn modelId="{CEE2D9FD-C13A-457C-9656-523E0CDA0E84}" type="presParOf" srcId="{D9F55829-3A3E-41D4-93F0-5276CE801266}" destId="{3B6A2C36-29F7-4641-9577-8539AB9B1E8C}" srcOrd="2" destOrd="0" presId="urn:microsoft.com/office/officeart/2005/8/layout/process3"/>
+    <dgm:cxn modelId="{5ABF84B7-E933-4DCC-BDB6-6A4911F2A203}" type="presParOf" srcId="{912172FA-9327-429C-933B-E109DC05DCE0}" destId="{3A3E0DC3-D733-43E8-968E-5A3916C72742}" srcOrd="3" destOrd="0" presId="urn:microsoft.com/office/officeart/2005/8/layout/process3"/>
+    <dgm:cxn modelId="{3D8AFDA0-9BD3-413D-A298-EC98660A77CA}" type="presParOf" srcId="{3A3E0DC3-D733-43E8-968E-5A3916C72742}" destId="{1605C863-136F-4188-B3DD-EF6BD45E4E4D}" srcOrd="0" destOrd="0" presId="urn:microsoft.com/office/officeart/2005/8/layout/process3"/>
+    <dgm:cxn modelId="{DC46C198-D716-45DF-B685-CF254A60CE48}" type="presParOf" srcId="{912172FA-9327-429C-933B-E109DC05DCE0}" destId="{43F0A786-7EE2-443E-9A84-19BBE03B5A01}" srcOrd="4" destOrd="0" presId="urn:microsoft.com/office/officeart/2005/8/layout/process3"/>
+    <dgm:cxn modelId="{DC70F642-93C7-4372-971E-F5D11E127834}" type="presParOf" srcId="{43F0A786-7EE2-443E-9A84-19BBE03B5A01}" destId="{B903AD5D-8962-495C-B0F6-CE18F6DA794B}" srcOrd="0" destOrd="0" presId="urn:microsoft.com/office/officeart/2005/8/layout/process3"/>
+    <dgm:cxn modelId="{7E2E9B94-1C83-4080-A36F-DE575483862E}" type="presParOf" srcId="{43F0A786-7EE2-443E-9A84-19BBE03B5A01}" destId="{68D00C0C-60DA-4664-99CE-F7FDC39E9FEC}" srcOrd="1" destOrd="0" presId="urn:microsoft.com/office/officeart/2005/8/layout/process3"/>
+    <dgm:cxn modelId="{53BB491F-C204-4900-A922-451035AD00DB}" type="presParOf" srcId="{43F0A786-7EE2-443E-9A84-19BBE03B5A01}" destId="{CE45B918-B55A-4CF3-B732-BD5DA3FA72F8}" srcOrd="2" destOrd="0" presId="urn:microsoft.com/office/officeart/2005/8/layout/process3"/>
   </dgm:cxnLst>
   <dgm:bg/>
   <dgm:whole/>
@@ -12268,7 +12273,7 @@
           <p:nvPr>
             <p:extLst>
               <p:ext uri="{D42A27DB-BD31-4B8C-83A1-F6EECF244321}">
-                <p14:modId xmlns:p14="http://schemas.microsoft.com/office/powerpoint/2010/main" val="3924848359"/>
+                <p14:modId xmlns:p14="http://schemas.microsoft.com/office/powerpoint/2010/main" val="2785703902"/>
               </p:ext>
             </p:extLst>
           </p:nvPr>
@@ -12344,15 +12349,6 @@
               <a:srgbClr val="C0C0C0"/>
             </a:contourClr>
           </a:sp3d>
-          <a:extLst>
-            <a:ext uri="{909E8E84-426E-40DD-AFC4-6F175D3DCCD1}">
-              <a14:hiddenFill xmlns:a14="http://schemas.microsoft.com/office/drawing/2010/main">
-                <a:solidFill>
-                  <a:srgbClr val="FFFFFF"/>
-                </a:solidFill>
-              </a14:hiddenFill>
-            </a:ext>
-          </a:extLst>
         </p:spPr>
       </p:pic>
       <p:pic>
@@ -12597,15 +12593,6 @@
                 <a:srgbClr val="C0C0C0"/>
               </a:contourClr>
             </a:sp3d>
-            <a:extLst>
-              <a:ext uri="{909E8E84-426E-40DD-AFC4-6F175D3DCCD1}">
-                <a14:hiddenFill xmlns:a14="http://schemas.microsoft.com/office/drawing/2010/main">
-                  <a:solidFill>
-                    <a:srgbClr val="FFFFFF"/>
-                  </a:solidFill>
-                </a14:hiddenFill>
-              </a:ext>
-            </a:extLst>
           </p:spPr>
         </p:pic>
         <p:pic>
@@ -12821,9 +12808,12 @@
         </p:nvSpPr>
         <p:spPr>
           <a:xfrm>
-            <a:off x="801098" y="1396289"/>
-            <a:ext cx="6387102" cy="1325563"/>
+            <a:off x="0" y="1381700"/>
+            <a:ext cx="8389083" cy="1325563"/>
           </a:xfrm>
+          <a:effectLst>
+            <a:softEdge rad="114300"/>
+          </a:effectLst>
         </p:spPr>
         <p:style>
           <a:lnRef idx="2">
@@ -13105,15 +13095,6 @@
               <a:srgbClr val="C0C0C0"/>
             </a:contourClr>
           </a:sp3d>
-          <a:extLst>
-            <a:ext uri="{909E8E84-426E-40DD-AFC4-6F175D3DCCD1}">
-              <a14:hiddenFill xmlns:a14="http://schemas.microsoft.com/office/drawing/2010/main">
-                <a:solidFill>
-                  <a:srgbClr val="FFFFFF"/>
-                </a:solidFill>
-              </a14:hiddenFill>
-            </a:ext>
-          </a:extLst>
         </p:spPr>
       </p:pic>
       <p:sp>
@@ -13480,15 +13461,6 @@
           <a:effectLst>
             <a:reflection blurRad="12700" stA="38000" endPos="28000" dist="5000" dir="5400000" sy="-100000" algn="bl" rotWithShape="0"/>
           </a:effectLst>
-          <a:extLst>
-            <a:ext uri="{909E8E84-426E-40DD-AFC4-6F175D3DCCD1}">
-              <a14:hiddenFill xmlns:a14="http://schemas.microsoft.com/office/drawing/2010/main">
-                <a:solidFill>
-                  <a:srgbClr val="FFFFFF"/>
-                </a:solidFill>
-              </a14:hiddenFill>
-            </a:ext>
-          </a:extLst>
         </p:spPr>
       </p:pic>
       <p:pic>
@@ -13890,15 +13862,6 @@
           <a:effectLst>
             <a:reflection blurRad="12700" stA="38000" endPos="28000" dist="5000" dir="5400000" sy="-100000" algn="bl" rotWithShape="0"/>
           </a:effectLst>
-          <a:extLst>
-            <a:ext uri="{909E8E84-426E-40DD-AFC4-6F175D3DCCD1}">
-              <a14:hiddenFill xmlns:a14="http://schemas.microsoft.com/office/drawing/2010/main">
-                <a:solidFill>
-                  <a:srgbClr val="FFFFFF"/>
-                </a:solidFill>
-              </a14:hiddenFill>
-            </a:ext>
-          </a:extLst>
         </p:spPr>
       </p:pic>
       <p:pic>
@@ -14324,15 +14287,6 @@
           <a:effectLst>
             <a:reflection blurRad="12700" stA="38000" endPos="28000" dist="5000" dir="5400000" sy="-100000" algn="bl" rotWithShape="0"/>
           </a:effectLst>
-          <a:extLst>
-            <a:ext uri="{909E8E84-426E-40DD-AFC4-6F175D3DCCD1}">
-              <a14:hiddenFill xmlns:a14="http://schemas.microsoft.com/office/drawing/2010/main">
-                <a:solidFill>
-                  <a:srgbClr val="FFFFFF"/>
-                </a:solidFill>
-              </a14:hiddenFill>
-            </a:ext>
-          </a:extLst>
         </p:spPr>
       </p:pic>
       <p:pic>

</xml_diff>

<commit_message>
updated cover image clustering
</commit_message>
<xml_diff>
--- a/pages/particle_separation_with_clustering/figures.pptx
+++ b/pages/particle_separation_with_clustering/figures.pptx
@@ -7,11 +7,11 @@
   <p:sldIdLst>
     <p:sldId id="256" r:id="rId2"/>
     <p:sldId id="263" r:id="rId3"/>
-    <p:sldId id="264" r:id="rId4"/>
-    <p:sldId id="257" r:id="rId5"/>
-    <p:sldId id="258" r:id="rId6"/>
-    <p:sldId id="259" r:id="rId7"/>
-    <p:sldId id="262" r:id="rId8"/>
+    <p:sldId id="257" r:id="rId4"/>
+    <p:sldId id="258" r:id="rId5"/>
+    <p:sldId id="259" r:id="rId6"/>
+    <p:sldId id="262" r:id="rId7"/>
+    <p:sldId id="264" r:id="rId8"/>
     <p:sldId id="261" r:id="rId9"/>
   </p:sldIdLst>
   <p:sldSz cx="12192000" cy="6858000"/>
@@ -1665,757 +1665,6 @@
   <dgm:styleLbl name="revTx">
     <dgm:fillClrLst meth="repeat">
       <a:schemeClr val="lt1">
-        <a:alpha val="0"/>
-      </a:schemeClr>
-    </dgm:fillClrLst>
-    <dgm:linClrLst meth="repeat">
-      <a:schemeClr val="dk1">
-        <a:alpha val="0"/>
-      </a:schemeClr>
-    </dgm:linClrLst>
-    <dgm:effectClrLst/>
-    <dgm:txLinClrLst/>
-    <dgm:txFillClrLst meth="repeat">
-      <a:schemeClr val="tx1"/>
-    </dgm:txFillClrLst>
-    <dgm:txEffectClrLst/>
-  </dgm:styleLbl>
-</dgm:colorsDef>
-</file>
-
-<file path=ppt/diagrams/colors3.xml><?xml version="1.0" encoding="utf-8"?>
-<dgm:colorsDef xmlns:dgm="http://schemas.openxmlformats.org/drawingml/2006/diagram" xmlns:a="http://schemas.openxmlformats.org/drawingml/2006/main" uniqueId="urn:microsoft.com/office/officeart/2005/8/colors/accent0_3">
-  <dgm:title val=""/>
-  <dgm:desc val=""/>
-  <dgm:catLst>
-    <dgm:cat type="mainScheme" pri="10300"/>
-  </dgm:catLst>
-  <dgm:styleLbl name="node0">
-    <dgm:fillClrLst meth="repeat">
-      <a:schemeClr val="dk2"/>
-    </dgm:fillClrLst>
-    <dgm:linClrLst meth="repeat">
-      <a:schemeClr val="lt2"/>
-    </dgm:linClrLst>
-    <dgm:effectClrLst/>
-    <dgm:txLinClrLst/>
-    <dgm:txFillClrLst/>
-    <dgm:txEffectClrLst/>
-  </dgm:styleLbl>
-  <dgm:styleLbl name="alignNode1">
-    <dgm:fillClrLst meth="repeat">
-      <a:schemeClr val="dk2"/>
-    </dgm:fillClrLst>
-    <dgm:linClrLst meth="repeat">
-      <a:schemeClr val="dk2"/>
-    </dgm:linClrLst>
-    <dgm:effectClrLst/>
-    <dgm:txLinClrLst/>
-    <dgm:txFillClrLst/>
-    <dgm:txEffectClrLst/>
-  </dgm:styleLbl>
-  <dgm:styleLbl name="node1">
-    <dgm:fillClrLst meth="repeat">
-      <a:schemeClr val="dk2"/>
-    </dgm:fillClrLst>
-    <dgm:linClrLst meth="repeat">
-      <a:schemeClr val="lt2"/>
-    </dgm:linClrLst>
-    <dgm:effectClrLst/>
-    <dgm:txLinClrLst/>
-    <dgm:txFillClrLst/>
-    <dgm:txEffectClrLst/>
-  </dgm:styleLbl>
-  <dgm:styleLbl name="lnNode1">
-    <dgm:fillClrLst meth="repeat">
-      <a:schemeClr val="dk2"/>
-    </dgm:fillClrLst>
-    <dgm:linClrLst meth="repeat">
-      <a:schemeClr val="lt2"/>
-    </dgm:linClrLst>
-    <dgm:effectClrLst/>
-    <dgm:txLinClrLst/>
-    <dgm:txFillClrLst/>
-    <dgm:txEffectClrLst/>
-  </dgm:styleLbl>
-  <dgm:styleLbl name="vennNode1">
-    <dgm:fillClrLst meth="repeat">
-      <a:schemeClr val="dk2">
-        <a:alpha val="50000"/>
-      </a:schemeClr>
-    </dgm:fillClrLst>
-    <dgm:linClrLst meth="repeat">
-      <a:schemeClr val="lt2"/>
-    </dgm:linClrLst>
-    <dgm:effectClrLst/>
-    <dgm:txLinClrLst/>
-    <dgm:txFillClrLst/>
-    <dgm:txEffectClrLst/>
-  </dgm:styleLbl>
-  <dgm:styleLbl name="node2">
-    <dgm:fillClrLst meth="repeat">
-      <a:schemeClr val="dk2"/>
-    </dgm:fillClrLst>
-    <dgm:linClrLst meth="repeat">
-      <a:schemeClr val="lt2"/>
-    </dgm:linClrLst>
-    <dgm:effectClrLst/>
-    <dgm:txLinClrLst/>
-    <dgm:txFillClrLst/>
-    <dgm:txEffectClrLst/>
-  </dgm:styleLbl>
-  <dgm:styleLbl name="node3">
-    <dgm:fillClrLst meth="repeat">
-      <a:schemeClr val="dk2"/>
-    </dgm:fillClrLst>
-    <dgm:linClrLst meth="repeat">
-      <a:schemeClr val="lt2"/>
-    </dgm:linClrLst>
-    <dgm:effectClrLst/>
-    <dgm:txLinClrLst/>
-    <dgm:txFillClrLst/>
-    <dgm:txEffectClrLst/>
-  </dgm:styleLbl>
-  <dgm:styleLbl name="node4">
-    <dgm:fillClrLst meth="repeat">
-      <a:schemeClr val="dk2"/>
-    </dgm:fillClrLst>
-    <dgm:linClrLst meth="repeat">
-      <a:schemeClr val="lt2"/>
-    </dgm:linClrLst>
-    <dgm:effectClrLst/>
-    <dgm:txLinClrLst/>
-    <dgm:txFillClrLst/>
-    <dgm:txEffectClrLst/>
-  </dgm:styleLbl>
-  <dgm:styleLbl name="fgImgPlace1">
-    <dgm:fillClrLst meth="repeat">
-      <a:schemeClr val="dk2">
-        <a:tint val="50000"/>
-      </a:schemeClr>
-    </dgm:fillClrLst>
-    <dgm:linClrLst meth="repeat">
-      <a:schemeClr val="lt2"/>
-    </dgm:linClrLst>
-    <dgm:effectClrLst/>
-    <dgm:txLinClrLst/>
-    <dgm:txFillClrLst meth="repeat">
-      <a:schemeClr val="lt2"/>
-    </dgm:txFillClrLst>
-    <dgm:txEffectClrLst/>
-  </dgm:styleLbl>
-  <dgm:styleLbl name="alignImgPlace1">
-    <dgm:fillClrLst meth="repeat">
-      <a:schemeClr val="dk2">
-        <a:tint val="50000"/>
-      </a:schemeClr>
-    </dgm:fillClrLst>
-    <dgm:linClrLst meth="repeat">
-      <a:schemeClr val="dk2">
-        <a:shade val="80000"/>
-      </a:schemeClr>
-    </dgm:linClrLst>
-    <dgm:effectClrLst/>
-    <dgm:txLinClrLst/>
-    <dgm:txFillClrLst meth="repeat">
-      <a:schemeClr val="lt2"/>
-    </dgm:txFillClrLst>
-    <dgm:txEffectClrLst/>
-  </dgm:styleLbl>
-  <dgm:styleLbl name="bgImgPlace1">
-    <dgm:fillClrLst meth="repeat">
-      <a:schemeClr val="dk2">
-        <a:tint val="50000"/>
-      </a:schemeClr>
-    </dgm:fillClrLst>
-    <dgm:linClrLst meth="repeat">
-      <a:schemeClr val="dk2">
-        <a:shade val="80000"/>
-      </a:schemeClr>
-    </dgm:linClrLst>
-    <dgm:effectClrLst/>
-    <dgm:txLinClrLst/>
-    <dgm:txFillClrLst meth="repeat">
-      <a:schemeClr val="lt2"/>
-    </dgm:txFillClrLst>
-    <dgm:txEffectClrLst/>
-  </dgm:styleLbl>
-  <dgm:styleLbl name="sibTrans2D1">
-    <dgm:fillClrLst meth="repeat">
-      <a:schemeClr val="dk2">
-        <a:tint val="60000"/>
-      </a:schemeClr>
-    </dgm:fillClrLst>
-    <dgm:linClrLst meth="repeat">
-      <a:schemeClr val="dk2">
-        <a:tint val="60000"/>
-      </a:schemeClr>
-    </dgm:linClrLst>
-    <dgm:effectClrLst/>
-    <dgm:txLinClrLst/>
-    <dgm:txFillClrLst/>
-    <dgm:txEffectClrLst/>
-  </dgm:styleLbl>
-  <dgm:styleLbl name="fgSibTrans2D1">
-    <dgm:fillClrLst meth="repeat">
-      <a:schemeClr val="dk2">
-        <a:tint val="60000"/>
-      </a:schemeClr>
-    </dgm:fillClrLst>
-    <dgm:linClrLst meth="repeat">
-      <a:schemeClr val="dk2">
-        <a:tint val="60000"/>
-      </a:schemeClr>
-    </dgm:linClrLst>
-    <dgm:effectClrLst/>
-    <dgm:txLinClrLst/>
-    <dgm:txFillClrLst/>
-    <dgm:txEffectClrLst/>
-  </dgm:styleLbl>
-  <dgm:styleLbl name="bgSibTrans2D1">
-    <dgm:fillClrLst meth="repeat">
-      <a:schemeClr val="dk2">
-        <a:tint val="60000"/>
-      </a:schemeClr>
-    </dgm:fillClrLst>
-    <dgm:linClrLst meth="repeat">
-      <a:schemeClr val="dk2">
-        <a:tint val="60000"/>
-      </a:schemeClr>
-    </dgm:linClrLst>
-    <dgm:effectClrLst/>
-    <dgm:txLinClrLst/>
-    <dgm:txFillClrLst/>
-    <dgm:txEffectClrLst/>
-  </dgm:styleLbl>
-  <dgm:styleLbl name="sibTrans1D1">
-    <dgm:fillClrLst meth="repeat">
-      <a:schemeClr val="dk2"/>
-    </dgm:fillClrLst>
-    <dgm:linClrLst meth="repeat">
-      <a:schemeClr val="dk2"/>
-    </dgm:linClrLst>
-    <dgm:effectClrLst/>
-    <dgm:txLinClrLst/>
-    <dgm:txFillClrLst meth="repeat">
-      <a:schemeClr val="lt2"/>
-    </dgm:txFillClrLst>
-    <dgm:txEffectClrLst/>
-  </dgm:styleLbl>
-  <dgm:styleLbl name="callout">
-    <dgm:fillClrLst meth="repeat">
-      <a:schemeClr val="dk2"/>
-    </dgm:fillClrLst>
-    <dgm:linClrLst meth="repeat">
-      <a:schemeClr val="dk2">
-        <a:tint val="50000"/>
-      </a:schemeClr>
-    </dgm:linClrLst>
-    <dgm:effectClrLst/>
-    <dgm:txLinClrLst/>
-    <dgm:txFillClrLst meth="repeat">
-      <a:schemeClr val="lt2"/>
-    </dgm:txFillClrLst>
-    <dgm:txEffectClrLst/>
-  </dgm:styleLbl>
-  <dgm:styleLbl name="asst0">
-    <dgm:fillClrLst meth="repeat">
-      <a:schemeClr val="dk2"/>
-    </dgm:fillClrLst>
-    <dgm:linClrLst meth="repeat">
-      <a:schemeClr val="lt2"/>
-    </dgm:linClrLst>
-    <dgm:effectClrLst/>
-    <dgm:txLinClrLst/>
-    <dgm:txFillClrLst/>
-    <dgm:txEffectClrLst/>
-  </dgm:styleLbl>
-  <dgm:styleLbl name="asst1">
-    <dgm:fillClrLst meth="repeat">
-      <a:schemeClr val="dk2"/>
-    </dgm:fillClrLst>
-    <dgm:linClrLst meth="repeat">
-      <a:schemeClr val="lt2"/>
-    </dgm:linClrLst>
-    <dgm:effectClrLst/>
-    <dgm:txLinClrLst/>
-    <dgm:txFillClrLst/>
-    <dgm:txEffectClrLst/>
-  </dgm:styleLbl>
-  <dgm:styleLbl name="asst2">
-    <dgm:fillClrLst meth="repeat">
-      <a:schemeClr val="dk2"/>
-    </dgm:fillClrLst>
-    <dgm:linClrLst meth="repeat">
-      <a:schemeClr val="lt2"/>
-    </dgm:linClrLst>
-    <dgm:effectClrLst/>
-    <dgm:txLinClrLst/>
-    <dgm:txFillClrLst/>
-    <dgm:txEffectClrLst/>
-  </dgm:styleLbl>
-  <dgm:styleLbl name="asst3">
-    <dgm:fillClrLst meth="repeat">
-      <a:schemeClr val="dk2"/>
-    </dgm:fillClrLst>
-    <dgm:linClrLst meth="repeat">
-      <a:schemeClr val="lt2"/>
-    </dgm:linClrLst>
-    <dgm:effectClrLst/>
-    <dgm:txLinClrLst/>
-    <dgm:txFillClrLst/>
-    <dgm:txEffectClrLst/>
-  </dgm:styleLbl>
-  <dgm:styleLbl name="asst4">
-    <dgm:fillClrLst meth="repeat">
-      <a:schemeClr val="dk2"/>
-    </dgm:fillClrLst>
-    <dgm:linClrLst meth="repeat">
-      <a:schemeClr val="lt2"/>
-    </dgm:linClrLst>
-    <dgm:effectClrLst/>
-    <dgm:txLinClrLst/>
-    <dgm:txFillClrLst/>
-    <dgm:txEffectClrLst/>
-  </dgm:styleLbl>
-  <dgm:styleLbl name="parChTrans2D1">
-    <dgm:fillClrLst meth="repeat">
-      <a:schemeClr val="dk2">
-        <a:tint val="60000"/>
-      </a:schemeClr>
-    </dgm:fillClrLst>
-    <dgm:linClrLst meth="repeat">
-      <a:schemeClr val="dk2">
-        <a:tint val="60000"/>
-      </a:schemeClr>
-    </dgm:linClrLst>
-    <dgm:effectClrLst/>
-    <dgm:txLinClrLst/>
-    <dgm:txFillClrLst meth="repeat">
-      <a:schemeClr val="lt2"/>
-    </dgm:txFillClrLst>
-    <dgm:txEffectClrLst/>
-  </dgm:styleLbl>
-  <dgm:styleLbl name="parChTrans2D2">
-    <dgm:fillClrLst meth="repeat">
-      <a:schemeClr val="dk2"/>
-    </dgm:fillClrLst>
-    <dgm:linClrLst meth="repeat">
-      <a:schemeClr val="dk2"/>
-    </dgm:linClrLst>
-    <dgm:effectClrLst/>
-    <dgm:txLinClrLst/>
-    <dgm:txFillClrLst meth="repeat">
-      <a:schemeClr val="lt2"/>
-    </dgm:txFillClrLst>
-    <dgm:txEffectClrLst/>
-  </dgm:styleLbl>
-  <dgm:styleLbl name="parChTrans2D3">
-    <dgm:fillClrLst meth="repeat">
-      <a:schemeClr val="dk2"/>
-    </dgm:fillClrLst>
-    <dgm:linClrLst meth="repeat">
-      <a:schemeClr val="dk2"/>
-    </dgm:linClrLst>
-    <dgm:effectClrLst/>
-    <dgm:txLinClrLst/>
-    <dgm:txFillClrLst meth="repeat">
-      <a:schemeClr val="lt2"/>
-    </dgm:txFillClrLst>
-    <dgm:txEffectClrLst/>
-  </dgm:styleLbl>
-  <dgm:styleLbl name="parChTrans2D4">
-    <dgm:fillClrLst meth="repeat">
-      <a:schemeClr val="dk2"/>
-    </dgm:fillClrLst>
-    <dgm:linClrLst meth="repeat">
-      <a:schemeClr val="dk2"/>
-    </dgm:linClrLst>
-    <dgm:effectClrLst/>
-    <dgm:txLinClrLst/>
-    <dgm:txFillClrLst meth="repeat">
-      <a:schemeClr val="lt2"/>
-    </dgm:txFillClrLst>
-    <dgm:txEffectClrLst/>
-  </dgm:styleLbl>
-  <dgm:styleLbl name="parChTrans1D1">
-    <dgm:fillClrLst meth="repeat">
-      <a:schemeClr val="dk2"/>
-    </dgm:fillClrLst>
-    <dgm:linClrLst meth="repeat">
-      <a:schemeClr val="dk2">
-        <a:shade val="60000"/>
-      </a:schemeClr>
-    </dgm:linClrLst>
-    <dgm:effectClrLst/>
-    <dgm:txLinClrLst/>
-    <dgm:txFillClrLst meth="repeat">
-      <a:schemeClr val="tx1"/>
-    </dgm:txFillClrLst>
-    <dgm:txEffectClrLst/>
-  </dgm:styleLbl>
-  <dgm:styleLbl name="parChTrans1D2">
-    <dgm:fillClrLst meth="repeat">
-      <a:schemeClr val="dk2"/>
-    </dgm:fillClrLst>
-    <dgm:linClrLst meth="repeat">
-      <a:schemeClr val="dk2">
-        <a:shade val="60000"/>
-      </a:schemeClr>
-    </dgm:linClrLst>
-    <dgm:effectClrLst/>
-    <dgm:txLinClrLst/>
-    <dgm:txFillClrLst meth="repeat">
-      <a:schemeClr val="tx1"/>
-    </dgm:txFillClrLst>
-    <dgm:txEffectClrLst/>
-  </dgm:styleLbl>
-  <dgm:styleLbl name="parChTrans1D3">
-    <dgm:fillClrLst meth="repeat">
-      <a:schemeClr val="dk2"/>
-    </dgm:fillClrLst>
-    <dgm:linClrLst meth="repeat">
-      <a:schemeClr val="dk2">
-        <a:shade val="80000"/>
-      </a:schemeClr>
-    </dgm:linClrLst>
-    <dgm:effectClrLst/>
-    <dgm:txLinClrLst/>
-    <dgm:txFillClrLst meth="repeat">
-      <a:schemeClr val="tx1"/>
-    </dgm:txFillClrLst>
-    <dgm:txEffectClrLst/>
-  </dgm:styleLbl>
-  <dgm:styleLbl name="parChTrans1D4">
-    <dgm:fillClrLst meth="repeat">
-      <a:schemeClr val="dk2"/>
-    </dgm:fillClrLst>
-    <dgm:linClrLst meth="repeat">
-      <a:schemeClr val="dk2">
-        <a:shade val="80000"/>
-      </a:schemeClr>
-    </dgm:linClrLst>
-    <dgm:effectClrLst/>
-    <dgm:txLinClrLst/>
-    <dgm:txFillClrLst meth="repeat">
-      <a:schemeClr val="tx1"/>
-    </dgm:txFillClrLst>
-    <dgm:txEffectClrLst/>
-  </dgm:styleLbl>
-  <dgm:styleLbl name="fgAcc1">
-    <dgm:fillClrLst meth="repeat">
-      <a:schemeClr val="lt2">
-        <a:alpha val="90000"/>
-      </a:schemeClr>
-    </dgm:fillClrLst>
-    <dgm:linClrLst meth="repeat">
-      <a:schemeClr val="dk2"/>
-    </dgm:linClrLst>
-    <dgm:effectClrLst/>
-    <dgm:txLinClrLst/>
-    <dgm:txFillClrLst meth="repeat">
-      <a:schemeClr val="dk1"/>
-    </dgm:txFillClrLst>
-    <dgm:txEffectClrLst/>
-  </dgm:styleLbl>
-  <dgm:styleLbl name="conFgAcc1">
-    <dgm:fillClrLst meth="repeat">
-      <a:schemeClr val="lt2">
-        <a:alpha val="90000"/>
-      </a:schemeClr>
-    </dgm:fillClrLst>
-    <dgm:linClrLst meth="repeat">
-      <a:schemeClr val="dk2"/>
-    </dgm:linClrLst>
-    <dgm:effectClrLst/>
-    <dgm:txLinClrLst/>
-    <dgm:txFillClrLst meth="repeat">
-      <a:schemeClr val="dk1"/>
-    </dgm:txFillClrLst>
-    <dgm:txEffectClrLst/>
-  </dgm:styleLbl>
-  <dgm:styleLbl name="alignAcc1">
-    <dgm:fillClrLst meth="repeat">
-      <a:schemeClr val="lt2">
-        <a:alpha val="90000"/>
-      </a:schemeClr>
-    </dgm:fillClrLst>
-    <dgm:linClrLst meth="repeat">
-      <a:schemeClr val="dk2"/>
-    </dgm:linClrLst>
-    <dgm:effectClrLst/>
-    <dgm:txLinClrLst/>
-    <dgm:txFillClrLst meth="repeat">
-      <a:schemeClr val="dk1"/>
-    </dgm:txFillClrLst>
-    <dgm:txEffectClrLst/>
-  </dgm:styleLbl>
-  <dgm:styleLbl name="trAlignAcc1">
-    <dgm:fillClrLst meth="repeat">
-      <a:schemeClr val="lt2">
-        <a:alpha val="40000"/>
-      </a:schemeClr>
-    </dgm:fillClrLst>
-    <dgm:linClrLst meth="repeat">
-      <a:schemeClr val="dk2"/>
-    </dgm:linClrLst>
-    <dgm:effectClrLst/>
-    <dgm:txLinClrLst/>
-    <dgm:txFillClrLst meth="repeat">
-      <a:schemeClr val="dk1"/>
-    </dgm:txFillClrLst>
-    <dgm:txEffectClrLst/>
-  </dgm:styleLbl>
-  <dgm:styleLbl name="bgAcc1">
-    <dgm:fillClrLst meth="repeat">
-      <a:schemeClr val="lt2">
-        <a:alpha val="90000"/>
-      </a:schemeClr>
-    </dgm:fillClrLst>
-    <dgm:linClrLst meth="repeat">
-      <a:schemeClr val="dk2"/>
-    </dgm:linClrLst>
-    <dgm:effectClrLst/>
-    <dgm:txLinClrLst/>
-    <dgm:txFillClrLst meth="repeat">
-      <a:schemeClr val="dk1"/>
-    </dgm:txFillClrLst>
-    <dgm:txEffectClrLst/>
-  </dgm:styleLbl>
-  <dgm:styleLbl name="solidFgAcc1">
-    <dgm:fillClrLst meth="repeat">
-      <a:schemeClr val="lt2"/>
-    </dgm:fillClrLst>
-    <dgm:linClrLst meth="repeat">
-      <a:schemeClr val="dk2"/>
-    </dgm:linClrLst>
-    <dgm:effectClrLst/>
-    <dgm:txLinClrLst/>
-    <dgm:txFillClrLst meth="repeat">
-      <a:schemeClr val="dk1"/>
-    </dgm:txFillClrLst>
-    <dgm:txEffectClrLst/>
-  </dgm:styleLbl>
-  <dgm:styleLbl name="solidAlignAcc1">
-    <dgm:fillClrLst meth="repeat">
-      <a:schemeClr val="lt2"/>
-    </dgm:fillClrLst>
-    <dgm:linClrLst meth="repeat">
-      <a:schemeClr val="dk2"/>
-    </dgm:linClrLst>
-    <dgm:effectClrLst/>
-    <dgm:txLinClrLst/>
-    <dgm:txFillClrLst meth="repeat">
-      <a:schemeClr val="dk1"/>
-    </dgm:txFillClrLst>
-    <dgm:txEffectClrLst/>
-  </dgm:styleLbl>
-  <dgm:styleLbl name="solidBgAcc1">
-    <dgm:fillClrLst meth="repeat">
-      <a:schemeClr val="lt2"/>
-    </dgm:fillClrLst>
-    <dgm:linClrLst meth="repeat">
-      <a:schemeClr val="dk2"/>
-    </dgm:linClrLst>
-    <dgm:effectClrLst/>
-    <dgm:txLinClrLst/>
-    <dgm:txFillClrLst meth="repeat">
-      <a:schemeClr val="dk1"/>
-    </dgm:txFillClrLst>
-    <dgm:txEffectClrLst/>
-  </dgm:styleLbl>
-  <dgm:styleLbl name="fgAccFollowNode1">
-    <dgm:fillClrLst meth="repeat">
-      <a:schemeClr val="dk2">
-        <a:alpha val="90000"/>
-        <a:tint val="40000"/>
-      </a:schemeClr>
-    </dgm:fillClrLst>
-    <dgm:linClrLst meth="repeat">
-      <a:schemeClr val="dk2">
-        <a:alpha val="90000"/>
-        <a:tint val="40000"/>
-      </a:schemeClr>
-    </dgm:linClrLst>
-    <dgm:effectClrLst/>
-    <dgm:txLinClrLst/>
-    <dgm:txFillClrLst meth="repeat">
-      <a:schemeClr val="dk1"/>
-    </dgm:txFillClrLst>
-    <dgm:txEffectClrLst/>
-  </dgm:styleLbl>
-  <dgm:styleLbl name="alignAccFollowNode1">
-    <dgm:fillClrLst meth="repeat">
-      <a:schemeClr val="dk2">
-        <a:alpha val="90000"/>
-        <a:tint val="40000"/>
-      </a:schemeClr>
-    </dgm:fillClrLst>
-    <dgm:linClrLst meth="repeat">
-      <a:schemeClr val="dk2">
-        <a:alpha val="90000"/>
-        <a:tint val="40000"/>
-      </a:schemeClr>
-    </dgm:linClrLst>
-    <dgm:effectClrLst/>
-    <dgm:txLinClrLst/>
-    <dgm:txFillClrLst meth="repeat">
-      <a:schemeClr val="dk1"/>
-    </dgm:txFillClrLst>
-    <dgm:txEffectClrLst/>
-  </dgm:styleLbl>
-  <dgm:styleLbl name="bgAccFollowNode1">
-    <dgm:fillClrLst meth="repeat">
-      <a:schemeClr val="dk2">
-        <a:alpha val="90000"/>
-        <a:tint val="40000"/>
-      </a:schemeClr>
-    </dgm:fillClrLst>
-    <dgm:linClrLst meth="repeat">
-      <a:schemeClr val="dk2">
-        <a:alpha val="90000"/>
-        <a:tint val="40000"/>
-      </a:schemeClr>
-    </dgm:linClrLst>
-    <dgm:effectClrLst/>
-    <dgm:txLinClrLst/>
-    <dgm:txFillClrLst meth="repeat">
-      <a:schemeClr val="dk1"/>
-    </dgm:txFillClrLst>
-    <dgm:txEffectClrLst/>
-  </dgm:styleLbl>
-  <dgm:styleLbl name="fgAcc0">
-    <dgm:fillClrLst meth="repeat">
-      <a:schemeClr val="lt2">
-        <a:alpha val="90000"/>
-      </a:schemeClr>
-    </dgm:fillClrLst>
-    <dgm:linClrLst meth="repeat">
-      <a:schemeClr val="dk2"/>
-    </dgm:linClrLst>
-    <dgm:effectClrLst/>
-    <dgm:txLinClrLst/>
-    <dgm:txFillClrLst meth="repeat">
-      <a:schemeClr val="dk1"/>
-    </dgm:txFillClrLst>
-    <dgm:txEffectClrLst/>
-  </dgm:styleLbl>
-  <dgm:styleLbl name="fgAcc2">
-    <dgm:fillClrLst meth="repeat">
-      <a:schemeClr val="lt2">
-        <a:alpha val="90000"/>
-      </a:schemeClr>
-    </dgm:fillClrLst>
-    <dgm:linClrLst meth="repeat">
-      <a:schemeClr val="dk2"/>
-    </dgm:linClrLst>
-    <dgm:effectClrLst/>
-    <dgm:txLinClrLst/>
-    <dgm:txFillClrLst meth="repeat">
-      <a:schemeClr val="dk1"/>
-    </dgm:txFillClrLst>
-    <dgm:txEffectClrLst/>
-  </dgm:styleLbl>
-  <dgm:styleLbl name="fgAcc3">
-    <dgm:fillClrLst meth="repeat">
-      <a:schemeClr val="lt2">
-        <a:alpha val="90000"/>
-      </a:schemeClr>
-    </dgm:fillClrLst>
-    <dgm:linClrLst meth="repeat">
-      <a:schemeClr val="dk2"/>
-    </dgm:linClrLst>
-    <dgm:effectClrLst/>
-    <dgm:txLinClrLst/>
-    <dgm:txFillClrLst meth="repeat">
-      <a:schemeClr val="dk1"/>
-    </dgm:txFillClrLst>
-    <dgm:txEffectClrLst/>
-  </dgm:styleLbl>
-  <dgm:styleLbl name="fgAcc4">
-    <dgm:fillClrLst meth="repeat">
-      <a:schemeClr val="lt2">
-        <a:alpha val="90000"/>
-      </a:schemeClr>
-    </dgm:fillClrLst>
-    <dgm:linClrLst meth="repeat">
-      <a:schemeClr val="dk2"/>
-    </dgm:linClrLst>
-    <dgm:effectClrLst/>
-    <dgm:txLinClrLst/>
-    <dgm:txFillClrLst meth="repeat">
-      <a:schemeClr val="dk1"/>
-    </dgm:txFillClrLst>
-    <dgm:txEffectClrLst/>
-  </dgm:styleLbl>
-  <dgm:styleLbl name="bgShp">
-    <dgm:fillClrLst meth="repeat">
-      <a:schemeClr val="dk2">
-        <a:tint val="40000"/>
-      </a:schemeClr>
-    </dgm:fillClrLst>
-    <dgm:linClrLst meth="repeat">
-      <a:schemeClr val="dk2"/>
-    </dgm:linClrLst>
-    <dgm:effectClrLst/>
-    <dgm:txLinClrLst/>
-    <dgm:txFillClrLst meth="repeat">
-      <a:schemeClr val="dk1"/>
-    </dgm:txFillClrLst>
-    <dgm:txEffectClrLst/>
-  </dgm:styleLbl>
-  <dgm:styleLbl name="dkBgShp">
-    <dgm:fillClrLst meth="repeat">
-      <a:schemeClr val="dk2">
-        <a:shade val="80000"/>
-      </a:schemeClr>
-    </dgm:fillClrLst>
-    <dgm:linClrLst meth="repeat">
-      <a:schemeClr val="dk2"/>
-    </dgm:linClrLst>
-    <dgm:effectClrLst/>
-    <dgm:txLinClrLst/>
-    <dgm:txFillClrLst meth="repeat">
-      <a:schemeClr val="lt1"/>
-    </dgm:txFillClrLst>
-    <dgm:txEffectClrLst/>
-  </dgm:styleLbl>
-  <dgm:styleLbl name="trBgShp">
-    <dgm:fillClrLst meth="repeat">
-      <a:schemeClr val="dk2">
-        <a:tint val="50000"/>
-        <a:alpha val="40000"/>
-      </a:schemeClr>
-    </dgm:fillClrLst>
-    <dgm:linClrLst meth="repeat">
-      <a:schemeClr val="dk2"/>
-    </dgm:linClrLst>
-    <dgm:effectClrLst/>
-    <dgm:txLinClrLst/>
-    <dgm:txFillClrLst meth="repeat">
-      <a:schemeClr val="lt1"/>
-    </dgm:txFillClrLst>
-    <dgm:txEffectClrLst/>
-  </dgm:styleLbl>
-  <dgm:styleLbl name="fgShp">
-    <dgm:fillClrLst meth="repeat">
-      <a:schemeClr val="dk2">
-        <a:tint val="60000"/>
-      </a:schemeClr>
-    </dgm:fillClrLst>
-    <dgm:linClrLst meth="repeat">
-      <a:schemeClr val="lt2"/>
-    </dgm:linClrLst>
-    <dgm:effectClrLst/>
-    <dgm:txLinClrLst/>
-    <dgm:txFillClrLst meth="repeat">
-      <a:schemeClr val="dk1"/>
-    </dgm:txFillClrLst>
-    <dgm:txEffectClrLst/>
-  </dgm:styleLbl>
-  <dgm:styleLbl name="revTx">
-    <dgm:fillClrLst meth="repeat">
-      <a:schemeClr val="lt2">
         <a:alpha val="0"/>
       </a:schemeClr>
     </dgm:fillClrLst>
@@ -2956,243 +2205,6 @@
   <dgm:extLst>
     <a:ext uri="http://schemas.microsoft.com/office/drawing/2008/diagram">
       <dsp:dataModelExt xmlns:dsp="http://schemas.microsoft.com/office/drawing/2008/diagram" relId="rId6" minVer="http://schemas.openxmlformats.org/drawingml/2006/diagram"/>
-    </a:ext>
-  </dgm:extLst>
-</dgm:dataModel>
-</file>
-
-<file path=ppt/diagrams/data3.xml><?xml version="1.0" encoding="utf-8"?>
-<dgm:dataModel xmlns:dgm="http://schemas.openxmlformats.org/drawingml/2006/diagram" xmlns:a="http://schemas.openxmlformats.org/drawingml/2006/main">
-  <dgm:ptLst>
-    <dgm:pt modelId="{3ADCE084-2417-4CD2-8F14-EEEFD3F936F2}" type="doc">
-      <dgm:prSet loTypeId="urn:microsoft.com/office/officeart/2005/8/layout/hierarchy1" loCatId="hierarchy" qsTypeId="urn:microsoft.com/office/officeart/2005/8/quickstyle/simple4" qsCatId="simple" csTypeId="urn:microsoft.com/office/officeart/2005/8/colors/accent0_3" csCatId="mainScheme" phldr="1"/>
-      <dgm:spPr/>
-    </dgm:pt>
-    <dgm:pt modelId="{66DD84B8-AFAE-47FD-BE4D-1BEFF8A6F88D}">
-      <dgm:prSet phldrT="[Text]"/>
-      <dgm:spPr/>
-      <dgm:t>
-        <a:bodyPr/>
-        <a:lstStyle/>
-        <a:p>
-          <a:r>
-            <a:rPr lang="en-GB"/>
-            <a:t>Experiment</a:t>
-          </a:r>
-          <a:endParaRPr lang="en-GB" dirty="0"/>
-        </a:p>
-      </dgm:t>
-    </dgm:pt>
-    <dgm:pt modelId="{6B445937-3B6C-440A-BA46-DF6A3FDA9278}" type="parTrans" cxnId="{E3BE7E69-8AB4-4B00-817B-9B44221507D7}">
-      <dgm:prSet/>
-      <dgm:spPr/>
-      <dgm:t>
-        <a:bodyPr/>
-        <a:lstStyle/>
-        <a:p>
-          <a:endParaRPr lang="en-GB"/>
-        </a:p>
-      </dgm:t>
-    </dgm:pt>
-    <dgm:pt modelId="{84A537C3-6D6B-42A7-AC2E-A0F2751C1E98}" type="sibTrans" cxnId="{E3BE7E69-8AB4-4B00-817B-9B44221507D7}">
-      <dgm:prSet/>
-      <dgm:spPr/>
-      <dgm:t>
-        <a:bodyPr/>
-        <a:lstStyle/>
-        <a:p>
-          <a:endParaRPr lang="en-GB"/>
-        </a:p>
-      </dgm:t>
-    </dgm:pt>
-    <dgm:pt modelId="{7BF3C338-B51E-4794-89CD-E85058C507F8}">
-      <dgm:prSet phldrT="[Text]"/>
-      <dgm:spPr/>
-      <dgm:t>
-        <a:bodyPr/>
-        <a:lstStyle/>
-        <a:p>
-          <a:r>
-            <a:rPr lang="en-GB"/>
-            <a:t>Segmentation</a:t>
-          </a:r>
-          <a:endParaRPr lang="en-GB" dirty="0"/>
-        </a:p>
-      </dgm:t>
-    </dgm:pt>
-    <dgm:pt modelId="{2E267248-CC0A-411E-B671-76F44CAEBAD1}" type="parTrans" cxnId="{9387E752-C2A9-44B5-9E70-7B854577FD29}">
-      <dgm:prSet/>
-      <dgm:spPr/>
-      <dgm:t>
-        <a:bodyPr/>
-        <a:lstStyle/>
-        <a:p>
-          <a:endParaRPr lang="en-GB"/>
-        </a:p>
-      </dgm:t>
-    </dgm:pt>
-    <dgm:pt modelId="{53E88FD9-AF6E-4FE8-B945-A94588B57BAA}" type="sibTrans" cxnId="{9387E752-C2A9-44B5-9E70-7B854577FD29}">
-      <dgm:prSet/>
-      <dgm:spPr/>
-      <dgm:t>
-        <a:bodyPr/>
-        <a:lstStyle/>
-        <a:p>
-          <a:endParaRPr lang="en-GB"/>
-        </a:p>
-      </dgm:t>
-    </dgm:pt>
-    <dgm:pt modelId="{970801B1-6EF2-458C-8430-370F6C7DDD55}">
-      <dgm:prSet phldrT="[Text]"/>
-      <dgm:spPr/>
-      <dgm:t>
-        <a:bodyPr/>
-        <a:lstStyle/>
-        <a:p>
-          <a:r>
-            <a:rPr lang="en-GB"/>
-            <a:t>Labelling</a:t>
-          </a:r>
-          <a:endParaRPr lang="en-GB" dirty="0"/>
-        </a:p>
-      </dgm:t>
-    </dgm:pt>
-    <dgm:pt modelId="{359B04E8-83B6-4555-9BD0-4163E2C20165}" type="parTrans" cxnId="{4F310B39-2099-4784-AFC7-05A56A95A8EC}">
-      <dgm:prSet/>
-      <dgm:spPr/>
-      <dgm:t>
-        <a:bodyPr/>
-        <a:lstStyle/>
-        <a:p>
-          <a:endParaRPr lang="en-GB"/>
-        </a:p>
-      </dgm:t>
-    </dgm:pt>
-    <dgm:pt modelId="{F8B54163-F541-40CC-9E79-A2FC89E46A9F}" type="sibTrans" cxnId="{4F310B39-2099-4784-AFC7-05A56A95A8EC}">
-      <dgm:prSet/>
-      <dgm:spPr/>
-      <dgm:t>
-        <a:bodyPr/>
-        <a:lstStyle/>
-        <a:p>
-          <a:endParaRPr lang="en-GB"/>
-        </a:p>
-      </dgm:t>
-    </dgm:pt>
-    <dgm:pt modelId="{6916FE6E-CC64-4D7E-9EA5-C55E52D11FB9}" type="pres">
-      <dgm:prSet presAssocID="{3ADCE084-2417-4CD2-8F14-EEEFD3F936F2}" presName="hierChild1" presStyleCnt="0">
-        <dgm:presLayoutVars>
-          <dgm:chPref val="1"/>
-          <dgm:dir/>
-          <dgm:animOne val="branch"/>
-          <dgm:animLvl val="lvl"/>
-          <dgm:resizeHandles/>
-        </dgm:presLayoutVars>
-      </dgm:prSet>
-      <dgm:spPr/>
-    </dgm:pt>
-    <dgm:pt modelId="{4D84C83D-919A-4CA9-A987-75409B4D5AA6}" type="pres">
-      <dgm:prSet presAssocID="{66DD84B8-AFAE-47FD-BE4D-1BEFF8A6F88D}" presName="hierRoot1" presStyleCnt="0"/>
-      <dgm:spPr/>
-    </dgm:pt>
-    <dgm:pt modelId="{533B3854-474E-4B46-8BBF-8B2CCD5B32A2}" type="pres">
-      <dgm:prSet presAssocID="{66DD84B8-AFAE-47FD-BE4D-1BEFF8A6F88D}" presName="composite" presStyleCnt="0"/>
-      <dgm:spPr/>
-    </dgm:pt>
-    <dgm:pt modelId="{FFC99094-1E37-4AA6-A6C7-DF619FB18260}" type="pres">
-      <dgm:prSet presAssocID="{66DD84B8-AFAE-47FD-BE4D-1BEFF8A6F88D}" presName="background" presStyleLbl="node0" presStyleIdx="0" presStyleCnt="3"/>
-      <dgm:spPr/>
-    </dgm:pt>
-    <dgm:pt modelId="{1C6BE37F-0A0F-447C-9651-3187296C3B5D}" type="pres">
-      <dgm:prSet presAssocID="{66DD84B8-AFAE-47FD-BE4D-1BEFF8A6F88D}" presName="text" presStyleLbl="fgAcc0" presStyleIdx="0" presStyleCnt="3">
-        <dgm:presLayoutVars>
-          <dgm:chPref val="3"/>
-        </dgm:presLayoutVars>
-      </dgm:prSet>
-      <dgm:spPr/>
-    </dgm:pt>
-    <dgm:pt modelId="{3E551D20-0F8B-43CD-B177-713636E670D1}" type="pres">
-      <dgm:prSet presAssocID="{66DD84B8-AFAE-47FD-BE4D-1BEFF8A6F88D}" presName="hierChild2" presStyleCnt="0"/>
-      <dgm:spPr/>
-    </dgm:pt>
-    <dgm:pt modelId="{9395FB90-627E-436F-B832-18A8957941B0}" type="pres">
-      <dgm:prSet presAssocID="{7BF3C338-B51E-4794-89CD-E85058C507F8}" presName="hierRoot1" presStyleCnt="0"/>
-      <dgm:spPr/>
-    </dgm:pt>
-    <dgm:pt modelId="{895FA363-8753-4CEE-ABD4-E7A8C62D973B}" type="pres">
-      <dgm:prSet presAssocID="{7BF3C338-B51E-4794-89CD-E85058C507F8}" presName="composite" presStyleCnt="0"/>
-      <dgm:spPr/>
-    </dgm:pt>
-    <dgm:pt modelId="{D51A72C0-EAEA-4C5B-BA57-E4061B14477C}" type="pres">
-      <dgm:prSet presAssocID="{7BF3C338-B51E-4794-89CD-E85058C507F8}" presName="background" presStyleLbl="node0" presStyleIdx="1" presStyleCnt="3"/>
-      <dgm:spPr/>
-    </dgm:pt>
-    <dgm:pt modelId="{8C3C70F1-6A73-44D4-8C5D-62EE7D69A8E9}" type="pres">
-      <dgm:prSet presAssocID="{7BF3C338-B51E-4794-89CD-E85058C507F8}" presName="text" presStyleLbl="fgAcc0" presStyleIdx="1" presStyleCnt="3">
-        <dgm:presLayoutVars>
-          <dgm:chPref val="3"/>
-        </dgm:presLayoutVars>
-      </dgm:prSet>
-      <dgm:spPr/>
-    </dgm:pt>
-    <dgm:pt modelId="{6C829D36-3EE6-4C97-9BE8-B0E754E96D60}" type="pres">
-      <dgm:prSet presAssocID="{7BF3C338-B51E-4794-89CD-E85058C507F8}" presName="hierChild2" presStyleCnt="0"/>
-      <dgm:spPr/>
-    </dgm:pt>
-    <dgm:pt modelId="{29D24BDB-652A-4DDB-B2E5-F722CE29703A}" type="pres">
-      <dgm:prSet presAssocID="{970801B1-6EF2-458C-8430-370F6C7DDD55}" presName="hierRoot1" presStyleCnt="0"/>
-      <dgm:spPr/>
-    </dgm:pt>
-    <dgm:pt modelId="{F71673CB-040B-49B2-86D5-B207782EE08A}" type="pres">
-      <dgm:prSet presAssocID="{970801B1-6EF2-458C-8430-370F6C7DDD55}" presName="composite" presStyleCnt="0"/>
-      <dgm:spPr/>
-    </dgm:pt>
-    <dgm:pt modelId="{AE3E8073-E678-4F41-A3CF-E704FBA38962}" type="pres">
-      <dgm:prSet presAssocID="{970801B1-6EF2-458C-8430-370F6C7DDD55}" presName="background" presStyleLbl="node0" presStyleIdx="2" presStyleCnt="3"/>
-      <dgm:spPr/>
-    </dgm:pt>
-    <dgm:pt modelId="{785B99BC-4EDC-4C2C-885A-D8BB689B0787}" type="pres">
-      <dgm:prSet presAssocID="{970801B1-6EF2-458C-8430-370F6C7DDD55}" presName="text" presStyleLbl="fgAcc0" presStyleIdx="2" presStyleCnt="3">
-        <dgm:presLayoutVars>
-          <dgm:chPref val="3"/>
-        </dgm:presLayoutVars>
-      </dgm:prSet>
-      <dgm:spPr/>
-    </dgm:pt>
-    <dgm:pt modelId="{46AD571E-1049-4B8B-8135-B545786C7B89}" type="pres">
-      <dgm:prSet presAssocID="{970801B1-6EF2-458C-8430-370F6C7DDD55}" presName="hierChild2" presStyleCnt="0"/>
-      <dgm:spPr/>
-    </dgm:pt>
-  </dgm:ptLst>
-  <dgm:cxnLst>
-    <dgm:cxn modelId="{14F52D26-9062-4701-9A5F-A488AD6A469F}" type="presOf" srcId="{3ADCE084-2417-4CD2-8F14-EEEFD3F936F2}" destId="{6916FE6E-CC64-4D7E-9EA5-C55E52D11FB9}" srcOrd="0" destOrd="0" presId="urn:microsoft.com/office/officeart/2005/8/layout/hierarchy1"/>
-    <dgm:cxn modelId="{4F310B39-2099-4784-AFC7-05A56A95A8EC}" srcId="{3ADCE084-2417-4CD2-8F14-EEEFD3F936F2}" destId="{970801B1-6EF2-458C-8430-370F6C7DDD55}" srcOrd="2" destOrd="0" parTransId="{359B04E8-83B6-4555-9BD0-4163E2C20165}" sibTransId="{F8B54163-F541-40CC-9E79-A2FC89E46A9F}"/>
-    <dgm:cxn modelId="{B52F4A5D-A765-438F-92E8-4E5B67308E80}" type="presOf" srcId="{970801B1-6EF2-458C-8430-370F6C7DDD55}" destId="{785B99BC-4EDC-4C2C-885A-D8BB689B0787}" srcOrd="0" destOrd="0" presId="urn:microsoft.com/office/officeart/2005/8/layout/hierarchy1"/>
-    <dgm:cxn modelId="{E3BE7E69-8AB4-4B00-817B-9B44221507D7}" srcId="{3ADCE084-2417-4CD2-8F14-EEEFD3F936F2}" destId="{66DD84B8-AFAE-47FD-BE4D-1BEFF8A6F88D}" srcOrd="0" destOrd="0" parTransId="{6B445937-3B6C-440A-BA46-DF6A3FDA9278}" sibTransId="{84A537C3-6D6B-42A7-AC2E-A0F2751C1E98}"/>
-    <dgm:cxn modelId="{500D306C-91E9-41B7-A9BF-73009B17C328}" type="presOf" srcId="{66DD84B8-AFAE-47FD-BE4D-1BEFF8A6F88D}" destId="{1C6BE37F-0A0F-447C-9651-3187296C3B5D}" srcOrd="0" destOrd="0" presId="urn:microsoft.com/office/officeart/2005/8/layout/hierarchy1"/>
-    <dgm:cxn modelId="{9387E752-C2A9-44B5-9E70-7B854577FD29}" srcId="{3ADCE084-2417-4CD2-8F14-EEEFD3F936F2}" destId="{7BF3C338-B51E-4794-89CD-E85058C507F8}" srcOrd="1" destOrd="0" parTransId="{2E267248-CC0A-411E-B671-76F44CAEBAD1}" sibTransId="{53E88FD9-AF6E-4FE8-B945-A94588B57BAA}"/>
-    <dgm:cxn modelId="{CE35C4AB-27E3-4646-82E0-7690A3191EC2}" type="presOf" srcId="{7BF3C338-B51E-4794-89CD-E85058C507F8}" destId="{8C3C70F1-6A73-44D4-8C5D-62EE7D69A8E9}" srcOrd="0" destOrd="0" presId="urn:microsoft.com/office/officeart/2005/8/layout/hierarchy1"/>
-    <dgm:cxn modelId="{6877B5BF-4394-4B37-8965-57870FCCE427}" type="presParOf" srcId="{6916FE6E-CC64-4D7E-9EA5-C55E52D11FB9}" destId="{4D84C83D-919A-4CA9-A987-75409B4D5AA6}" srcOrd="0" destOrd="0" presId="urn:microsoft.com/office/officeart/2005/8/layout/hierarchy1"/>
-    <dgm:cxn modelId="{0721EB88-4087-40A8-9335-B462A2518D01}" type="presParOf" srcId="{4D84C83D-919A-4CA9-A987-75409B4D5AA6}" destId="{533B3854-474E-4B46-8BBF-8B2CCD5B32A2}" srcOrd="0" destOrd="0" presId="urn:microsoft.com/office/officeart/2005/8/layout/hierarchy1"/>
-    <dgm:cxn modelId="{0E9F82CA-9A3E-413E-B3EB-D3E3CF033CFD}" type="presParOf" srcId="{533B3854-474E-4B46-8BBF-8B2CCD5B32A2}" destId="{FFC99094-1E37-4AA6-A6C7-DF619FB18260}" srcOrd="0" destOrd="0" presId="urn:microsoft.com/office/officeart/2005/8/layout/hierarchy1"/>
-    <dgm:cxn modelId="{76BEB9EF-BD83-4FE9-9B02-1123C329628C}" type="presParOf" srcId="{533B3854-474E-4B46-8BBF-8B2CCD5B32A2}" destId="{1C6BE37F-0A0F-447C-9651-3187296C3B5D}" srcOrd="1" destOrd="0" presId="urn:microsoft.com/office/officeart/2005/8/layout/hierarchy1"/>
-    <dgm:cxn modelId="{08A2B36B-BF90-427D-AA9C-80371977752A}" type="presParOf" srcId="{4D84C83D-919A-4CA9-A987-75409B4D5AA6}" destId="{3E551D20-0F8B-43CD-B177-713636E670D1}" srcOrd="1" destOrd="0" presId="urn:microsoft.com/office/officeart/2005/8/layout/hierarchy1"/>
-    <dgm:cxn modelId="{A89E263F-761A-4A3B-83D4-2AC3F6BCDF74}" type="presParOf" srcId="{6916FE6E-CC64-4D7E-9EA5-C55E52D11FB9}" destId="{9395FB90-627E-436F-B832-18A8957941B0}" srcOrd="1" destOrd="0" presId="urn:microsoft.com/office/officeart/2005/8/layout/hierarchy1"/>
-    <dgm:cxn modelId="{37B7933B-99B7-42F5-AC06-A54DE5899D0A}" type="presParOf" srcId="{9395FB90-627E-436F-B832-18A8957941B0}" destId="{895FA363-8753-4CEE-ABD4-E7A8C62D973B}" srcOrd="0" destOrd="0" presId="urn:microsoft.com/office/officeart/2005/8/layout/hierarchy1"/>
-    <dgm:cxn modelId="{03B027AF-2C87-4438-BBE4-1DCBD42FBE8C}" type="presParOf" srcId="{895FA363-8753-4CEE-ABD4-E7A8C62D973B}" destId="{D51A72C0-EAEA-4C5B-BA57-E4061B14477C}" srcOrd="0" destOrd="0" presId="urn:microsoft.com/office/officeart/2005/8/layout/hierarchy1"/>
-    <dgm:cxn modelId="{565C22D1-0DF3-4834-800C-89A942798641}" type="presParOf" srcId="{895FA363-8753-4CEE-ABD4-E7A8C62D973B}" destId="{8C3C70F1-6A73-44D4-8C5D-62EE7D69A8E9}" srcOrd="1" destOrd="0" presId="urn:microsoft.com/office/officeart/2005/8/layout/hierarchy1"/>
-    <dgm:cxn modelId="{098A2E21-E853-4324-B316-3735C1AF00CD}" type="presParOf" srcId="{9395FB90-627E-436F-B832-18A8957941B0}" destId="{6C829D36-3EE6-4C97-9BE8-B0E754E96D60}" srcOrd="1" destOrd="0" presId="urn:microsoft.com/office/officeart/2005/8/layout/hierarchy1"/>
-    <dgm:cxn modelId="{594D5566-AB87-45A2-9304-554962540D88}" type="presParOf" srcId="{6916FE6E-CC64-4D7E-9EA5-C55E52D11FB9}" destId="{29D24BDB-652A-4DDB-B2E5-F722CE29703A}" srcOrd="2" destOrd="0" presId="urn:microsoft.com/office/officeart/2005/8/layout/hierarchy1"/>
-    <dgm:cxn modelId="{3A893C68-6F83-4F15-B99F-D6B98A627A9D}" type="presParOf" srcId="{29D24BDB-652A-4DDB-B2E5-F722CE29703A}" destId="{F71673CB-040B-49B2-86D5-B207782EE08A}" srcOrd="0" destOrd="0" presId="urn:microsoft.com/office/officeart/2005/8/layout/hierarchy1"/>
-    <dgm:cxn modelId="{3846EE19-0465-4D22-AAA8-AC2BE9A85487}" type="presParOf" srcId="{F71673CB-040B-49B2-86D5-B207782EE08A}" destId="{AE3E8073-E678-4F41-A3CF-E704FBA38962}" srcOrd="0" destOrd="0" presId="urn:microsoft.com/office/officeart/2005/8/layout/hierarchy1"/>
-    <dgm:cxn modelId="{D024C8D3-AA60-4EE9-AF14-3B047870D08D}" type="presParOf" srcId="{F71673CB-040B-49B2-86D5-B207782EE08A}" destId="{785B99BC-4EDC-4C2C-885A-D8BB689B0787}" srcOrd="1" destOrd="0" presId="urn:microsoft.com/office/officeart/2005/8/layout/hierarchy1"/>
-    <dgm:cxn modelId="{B92D6624-0230-4058-BBD1-D92BA88F2656}" type="presParOf" srcId="{29D24BDB-652A-4DDB-B2E5-F722CE29703A}" destId="{46AD571E-1049-4B8B-8135-B545786C7B89}" srcOrd="1" destOrd="0" presId="urn:microsoft.com/office/officeart/2005/8/layout/hierarchy1"/>
-  </dgm:cxnLst>
-  <dgm:bg/>
-  <dgm:whole/>
-  <dgm:extLst>
-    <a:ext uri="http://schemas.microsoft.com/office/drawing/2008/diagram">
-      <dsp:dataModelExt xmlns:dsp="http://schemas.microsoft.com/office/drawing/2008/diagram" relId="rId9" minVer="http://schemas.openxmlformats.org/drawingml/2006/diagram"/>
     </a:ext>
   </dgm:extLst>
 </dgm:dataModel>
@@ -4287,477 +3299,6 @@
 </dsp:drawing>
 </file>
 
-<file path=ppt/diagrams/drawing3.xml><?xml version="1.0" encoding="utf-8"?>
-<dsp:drawing xmlns:dgm="http://schemas.openxmlformats.org/drawingml/2006/diagram" xmlns:dsp="http://schemas.microsoft.com/office/drawing/2008/diagram" xmlns:a="http://schemas.openxmlformats.org/drawingml/2006/main">
-  <dsp:spTree>
-    <dsp:nvGrpSpPr>
-      <dsp:cNvPr id="0" name=""/>
-      <dsp:cNvGrpSpPr/>
-    </dsp:nvGrpSpPr>
-    <dsp:grpSpPr/>
-    <dsp:sp modelId="{FFC99094-1E37-4AA6-A6C7-DF619FB18260}">
-      <dsp:nvSpPr>
-        <dsp:cNvPr id="0" name=""/>
-        <dsp:cNvSpPr/>
-      </dsp:nvSpPr>
-      <dsp:spPr>
-        <a:xfrm>
-          <a:off x="0" y="926148"/>
-          <a:ext cx="1795122" cy="1139902"/>
-        </a:xfrm>
-        <a:prstGeom prst="roundRect">
-          <a:avLst>
-            <a:gd name="adj" fmla="val 10000"/>
-          </a:avLst>
-        </a:prstGeom>
-        <a:gradFill rotWithShape="0">
-          <a:gsLst>
-            <a:gs pos="0">
-              <a:schemeClr val="dk2">
-                <a:hueOff val="0"/>
-                <a:satOff val="0"/>
-                <a:lumOff val="0"/>
-                <a:alphaOff val="0"/>
-                <a:satMod val="103000"/>
-                <a:lumMod val="102000"/>
-                <a:tint val="94000"/>
-              </a:schemeClr>
-            </a:gs>
-            <a:gs pos="50000">
-              <a:schemeClr val="dk2">
-                <a:hueOff val="0"/>
-                <a:satOff val="0"/>
-                <a:lumOff val="0"/>
-                <a:alphaOff val="0"/>
-                <a:satMod val="110000"/>
-                <a:lumMod val="100000"/>
-                <a:shade val="100000"/>
-              </a:schemeClr>
-            </a:gs>
-            <a:gs pos="100000">
-              <a:schemeClr val="dk2">
-                <a:hueOff val="0"/>
-                <a:satOff val="0"/>
-                <a:lumOff val="0"/>
-                <a:alphaOff val="0"/>
-                <a:lumMod val="99000"/>
-                <a:satMod val="120000"/>
-                <a:shade val="78000"/>
-              </a:schemeClr>
-            </a:gs>
-          </a:gsLst>
-          <a:lin ang="5400000" scaled="0"/>
-        </a:gradFill>
-        <a:ln>
-          <a:noFill/>
-        </a:ln>
-        <a:effectLst/>
-      </dsp:spPr>
-      <dsp:style>
-        <a:lnRef idx="0">
-          <a:scrgbClr r="0" g="0" b="0"/>
-        </a:lnRef>
-        <a:fillRef idx="3">
-          <a:scrgbClr r="0" g="0" b="0"/>
-        </a:fillRef>
-        <a:effectRef idx="2">
-          <a:scrgbClr r="0" g="0" b="0"/>
-        </a:effectRef>
-        <a:fontRef idx="minor">
-          <a:schemeClr val="lt1"/>
-        </a:fontRef>
-      </dsp:style>
-    </dsp:sp>
-    <dsp:sp modelId="{1C6BE37F-0A0F-447C-9651-3187296C3B5D}">
-      <dsp:nvSpPr>
-        <dsp:cNvPr id="0" name=""/>
-        <dsp:cNvSpPr/>
-      </dsp:nvSpPr>
-      <dsp:spPr>
-        <a:xfrm>
-          <a:off x="199458" y="1115633"/>
-          <a:ext cx="1795122" cy="1139902"/>
-        </a:xfrm>
-        <a:prstGeom prst="roundRect">
-          <a:avLst>
-            <a:gd name="adj" fmla="val 10000"/>
-          </a:avLst>
-        </a:prstGeom>
-        <a:solidFill>
-          <a:schemeClr val="lt2">
-            <a:alpha val="90000"/>
-            <a:hueOff val="0"/>
-            <a:satOff val="0"/>
-            <a:lumOff val="0"/>
-            <a:alphaOff val="0"/>
-          </a:schemeClr>
-        </a:solidFill>
-        <a:ln w="6350" cap="flat" cmpd="sng" algn="ctr">
-          <a:solidFill>
-            <a:schemeClr val="dk2">
-              <a:hueOff val="0"/>
-              <a:satOff val="0"/>
-              <a:lumOff val="0"/>
-              <a:alphaOff val="0"/>
-            </a:schemeClr>
-          </a:solidFill>
-          <a:prstDash val="solid"/>
-          <a:miter lim="800000"/>
-        </a:ln>
-        <a:effectLst/>
-      </dsp:spPr>
-      <dsp:style>
-        <a:lnRef idx="1">
-          <a:scrgbClr r="0" g="0" b="0"/>
-        </a:lnRef>
-        <a:fillRef idx="1">
-          <a:scrgbClr r="0" g="0" b="0"/>
-        </a:fillRef>
-        <a:effectRef idx="0">
-          <a:scrgbClr r="0" g="0" b="0"/>
-        </a:effectRef>
-        <a:fontRef idx="minor"/>
-      </dsp:style>
-      <dsp:txBody>
-        <a:bodyPr spcFirstLastPara="0" vert="horz" wrap="square" lIns="80010" tIns="80010" rIns="80010" bIns="80010" numCol="1" spcCol="1270" anchor="ctr" anchorCtr="0">
-          <a:noAutofit/>
-        </a:bodyPr>
-        <a:lstStyle/>
-        <a:p>
-          <a:pPr marL="0" lvl="0" indent="0" algn="ctr" defTabSz="933450">
-            <a:lnSpc>
-              <a:spcPct val="90000"/>
-            </a:lnSpc>
-            <a:spcBef>
-              <a:spcPct val="0"/>
-            </a:spcBef>
-            <a:spcAft>
-              <a:spcPct val="35000"/>
-            </a:spcAft>
-            <a:buNone/>
-          </a:pPr>
-          <a:r>
-            <a:rPr lang="en-GB" sz="2100" kern="1200"/>
-            <a:t>Experiment</a:t>
-          </a:r>
-          <a:endParaRPr lang="en-GB" sz="2100" kern="1200" dirty="0"/>
-        </a:p>
-      </dsp:txBody>
-      <dsp:txXfrm>
-        <a:off x="232845" y="1149020"/>
-        <a:ext cx="1728348" cy="1073128"/>
-      </dsp:txXfrm>
-    </dsp:sp>
-    <dsp:sp modelId="{D51A72C0-EAEA-4C5B-BA57-E4061B14477C}">
-      <dsp:nvSpPr>
-        <dsp:cNvPr id="0" name=""/>
-        <dsp:cNvSpPr/>
-      </dsp:nvSpPr>
-      <dsp:spPr>
-        <a:xfrm>
-          <a:off x="2194038" y="926148"/>
-          <a:ext cx="1795122" cy="1139902"/>
-        </a:xfrm>
-        <a:prstGeom prst="roundRect">
-          <a:avLst>
-            <a:gd name="adj" fmla="val 10000"/>
-          </a:avLst>
-        </a:prstGeom>
-        <a:gradFill rotWithShape="0">
-          <a:gsLst>
-            <a:gs pos="0">
-              <a:schemeClr val="dk2">
-                <a:hueOff val="0"/>
-                <a:satOff val="0"/>
-                <a:lumOff val="0"/>
-                <a:alphaOff val="0"/>
-                <a:satMod val="103000"/>
-                <a:lumMod val="102000"/>
-                <a:tint val="94000"/>
-              </a:schemeClr>
-            </a:gs>
-            <a:gs pos="50000">
-              <a:schemeClr val="dk2">
-                <a:hueOff val="0"/>
-                <a:satOff val="0"/>
-                <a:lumOff val="0"/>
-                <a:alphaOff val="0"/>
-                <a:satMod val="110000"/>
-                <a:lumMod val="100000"/>
-                <a:shade val="100000"/>
-              </a:schemeClr>
-            </a:gs>
-            <a:gs pos="100000">
-              <a:schemeClr val="dk2">
-                <a:hueOff val="0"/>
-                <a:satOff val="0"/>
-                <a:lumOff val="0"/>
-                <a:alphaOff val="0"/>
-                <a:lumMod val="99000"/>
-                <a:satMod val="120000"/>
-                <a:shade val="78000"/>
-              </a:schemeClr>
-            </a:gs>
-          </a:gsLst>
-          <a:lin ang="5400000" scaled="0"/>
-        </a:gradFill>
-        <a:ln>
-          <a:noFill/>
-        </a:ln>
-        <a:effectLst/>
-      </dsp:spPr>
-      <dsp:style>
-        <a:lnRef idx="0">
-          <a:scrgbClr r="0" g="0" b="0"/>
-        </a:lnRef>
-        <a:fillRef idx="3">
-          <a:scrgbClr r="0" g="0" b="0"/>
-        </a:fillRef>
-        <a:effectRef idx="2">
-          <a:scrgbClr r="0" g="0" b="0"/>
-        </a:effectRef>
-        <a:fontRef idx="minor">
-          <a:schemeClr val="lt1"/>
-        </a:fontRef>
-      </dsp:style>
-    </dsp:sp>
-    <dsp:sp modelId="{8C3C70F1-6A73-44D4-8C5D-62EE7D69A8E9}">
-      <dsp:nvSpPr>
-        <dsp:cNvPr id="0" name=""/>
-        <dsp:cNvSpPr/>
-      </dsp:nvSpPr>
-      <dsp:spPr>
-        <a:xfrm>
-          <a:off x="2393496" y="1115633"/>
-          <a:ext cx="1795122" cy="1139902"/>
-        </a:xfrm>
-        <a:prstGeom prst="roundRect">
-          <a:avLst>
-            <a:gd name="adj" fmla="val 10000"/>
-          </a:avLst>
-        </a:prstGeom>
-        <a:solidFill>
-          <a:schemeClr val="lt2">
-            <a:alpha val="90000"/>
-            <a:hueOff val="0"/>
-            <a:satOff val="0"/>
-            <a:lumOff val="0"/>
-            <a:alphaOff val="0"/>
-          </a:schemeClr>
-        </a:solidFill>
-        <a:ln w="6350" cap="flat" cmpd="sng" algn="ctr">
-          <a:solidFill>
-            <a:schemeClr val="dk2">
-              <a:hueOff val="0"/>
-              <a:satOff val="0"/>
-              <a:lumOff val="0"/>
-              <a:alphaOff val="0"/>
-            </a:schemeClr>
-          </a:solidFill>
-          <a:prstDash val="solid"/>
-          <a:miter lim="800000"/>
-        </a:ln>
-        <a:effectLst/>
-      </dsp:spPr>
-      <dsp:style>
-        <a:lnRef idx="1">
-          <a:scrgbClr r="0" g="0" b="0"/>
-        </a:lnRef>
-        <a:fillRef idx="1">
-          <a:scrgbClr r="0" g="0" b="0"/>
-        </a:fillRef>
-        <a:effectRef idx="0">
-          <a:scrgbClr r="0" g="0" b="0"/>
-        </a:effectRef>
-        <a:fontRef idx="minor"/>
-      </dsp:style>
-      <dsp:txBody>
-        <a:bodyPr spcFirstLastPara="0" vert="horz" wrap="square" lIns="80010" tIns="80010" rIns="80010" bIns="80010" numCol="1" spcCol="1270" anchor="ctr" anchorCtr="0">
-          <a:noAutofit/>
-        </a:bodyPr>
-        <a:lstStyle/>
-        <a:p>
-          <a:pPr marL="0" lvl="0" indent="0" algn="ctr" defTabSz="933450">
-            <a:lnSpc>
-              <a:spcPct val="90000"/>
-            </a:lnSpc>
-            <a:spcBef>
-              <a:spcPct val="0"/>
-            </a:spcBef>
-            <a:spcAft>
-              <a:spcPct val="35000"/>
-            </a:spcAft>
-            <a:buNone/>
-          </a:pPr>
-          <a:r>
-            <a:rPr lang="en-GB" sz="2100" kern="1200"/>
-            <a:t>Segmentation</a:t>
-          </a:r>
-          <a:endParaRPr lang="en-GB" sz="2100" kern="1200" dirty="0"/>
-        </a:p>
-      </dsp:txBody>
-      <dsp:txXfrm>
-        <a:off x="2426883" y="1149020"/>
-        <a:ext cx="1728348" cy="1073128"/>
-      </dsp:txXfrm>
-    </dsp:sp>
-    <dsp:sp modelId="{AE3E8073-E678-4F41-A3CF-E704FBA38962}">
-      <dsp:nvSpPr>
-        <dsp:cNvPr id="0" name=""/>
-        <dsp:cNvSpPr/>
-      </dsp:nvSpPr>
-      <dsp:spPr>
-        <a:xfrm>
-          <a:off x="4388076" y="926148"/>
-          <a:ext cx="1795122" cy="1139902"/>
-        </a:xfrm>
-        <a:prstGeom prst="roundRect">
-          <a:avLst>
-            <a:gd name="adj" fmla="val 10000"/>
-          </a:avLst>
-        </a:prstGeom>
-        <a:gradFill rotWithShape="0">
-          <a:gsLst>
-            <a:gs pos="0">
-              <a:schemeClr val="dk2">
-                <a:hueOff val="0"/>
-                <a:satOff val="0"/>
-                <a:lumOff val="0"/>
-                <a:alphaOff val="0"/>
-                <a:satMod val="103000"/>
-                <a:lumMod val="102000"/>
-                <a:tint val="94000"/>
-              </a:schemeClr>
-            </a:gs>
-            <a:gs pos="50000">
-              <a:schemeClr val="dk2">
-                <a:hueOff val="0"/>
-                <a:satOff val="0"/>
-                <a:lumOff val="0"/>
-                <a:alphaOff val="0"/>
-                <a:satMod val="110000"/>
-                <a:lumMod val="100000"/>
-                <a:shade val="100000"/>
-              </a:schemeClr>
-            </a:gs>
-            <a:gs pos="100000">
-              <a:schemeClr val="dk2">
-                <a:hueOff val="0"/>
-                <a:satOff val="0"/>
-                <a:lumOff val="0"/>
-                <a:alphaOff val="0"/>
-                <a:lumMod val="99000"/>
-                <a:satMod val="120000"/>
-                <a:shade val="78000"/>
-              </a:schemeClr>
-            </a:gs>
-          </a:gsLst>
-          <a:lin ang="5400000" scaled="0"/>
-        </a:gradFill>
-        <a:ln>
-          <a:noFill/>
-        </a:ln>
-        <a:effectLst/>
-      </dsp:spPr>
-      <dsp:style>
-        <a:lnRef idx="0">
-          <a:scrgbClr r="0" g="0" b="0"/>
-        </a:lnRef>
-        <a:fillRef idx="3">
-          <a:scrgbClr r="0" g="0" b="0"/>
-        </a:fillRef>
-        <a:effectRef idx="2">
-          <a:scrgbClr r="0" g="0" b="0"/>
-        </a:effectRef>
-        <a:fontRef idx="minor">
-          <a:schemeClr val="lt1"/>
-        </a:fontRef>
-      </dsp:style>
-    </dsp:sp>
-    <dsp:sp modelId="{785B99BC-4EDC-4C2C-885A-D8BB689B0787}">
-      <dsp:nvSpPr>
-        <dsp:cNvPr id="0" name=""/>
-        <dsp:cNvSpPr/>
-      </dsp:nvSpPr>
-      <dsp:spPr>
-        <a:xfrm>
-          <a:off x="4587534" y="1115633"/>
-          <a:ext cx="1795122" cy="1139902"/>
-        </a:xfrm>
-        <a:prstGeom prst="roundRect">
-          <a:avLst>
-            <a:gd name="adj" fmla="val 10000"/>
-          </a:avLst>
-        </a:prstGeom>
-        <a:solidFill>
-          <a:schemeClr val="lt2">
-            <a:alpha val="90000"/>
-            <a:hueOff val="0"/>
-            <a:satOff val="0"/>
-            <a:lumOff val="0"/>
-            <a:alphaOff val="0"/>
-          </a:schemeClr>
-        </a:solidFill>
-        <a:ln w="6350" cap="flat" cmpd="sng" algn="ctr">
-          <a:solidFill>
-            <a:schemeClr val="dk2">
-              <a:hueOff val="0"/>
-              <a:satOff val="0"/>
-              <a:lumOff val="0"/>
-              <a:alphaOff val="0"/>
-            </a:schemeClr>
-          </a:solidFill>
-          <a:prstDash val="solid"/>
-          <a:miter lim="800000"/>
-        </a:ln>
-        <a:effectLst/>
-      </dsp:spPr>
-      <dsp:style>
-        <a:lnRef idx="1">
-          <a:scrgbClr r="0" g="0" b="0"/>
-        </a:lnRef>
-        <a:fillRef idx="1">
-          <a:scrgbClr r="0" g="0" b="0"/>
-        </a:fillRef>
-        <a:effectRef idx="0">
-          <a:scrgbClr r="0" g="0" b="0"/>
-        </a:effectRef>
-        <a:fontRef idx="minor"/>
-      </dsp:style>
-      <dsp:txBody>
-        <a:bodyPr spcFirstLastPara="0" vert="horz" wrap="square" lIns="80010" tIns="80010" rIns="80010" bIns="80010" numCol="1" spcCol="1270" anchor="ctr" anchorCtr="0">
-          <a:noAutofit/>
-        </a:bodyPr>
-        <a:lstStyle/>
-        <a:p>
-          <a:pPr marL="0" lvl="0" indent="0" algn="ctr" defTabSz="933450">
-            <a:lnSpc>
-              <a:spcPct val="90000"/>
-            </a:lnSpc>
-            <a:spcBef>
-              <a:spcPct val="0"/>
-            </a:spcBef>
-            <a:spcAft>
-              <a:spcPct val="35000"/>
-            </a:spcAft>
-            <a:buNone/>
-          </a:pPr>
-          <a:r>
-            <a:rPr lang="en-GB" sz="2100" kern="1200"/>
-            <a:t>Labelling</a:t>
-          </a:r>
-          <a:endParaRPr lang="en-GB" sz="2100" kern="1200" dirty="0"/>
-        </a:p>
-      </dsp:txBody>
-      <dsp:txXfrm>
-        <a:off x="4620921" y="1149020"/>
-        <a:ext cx="1728348" cy="1073128"/>
-      </dsp:txXfrm>
-    </dsp:sp>
-  </dsp:spTree>
-</dsp:drawing>
-</file>
-
 <file path=ppt/diagrams/layout1.xml><?xml version="1.0" encoding="utf-8"?>
 <dgm:layoutDef xmlns:dgm="http://schemas.openxmlformats.org/drawingml/2006/diagram" xmlns:a="http://schemas.openxmlformats.org/drawingml/2006/main" uniqueId="urn:microsoft.com/office/officeart/2005/8/layout/process3">
   <dgm:title val=""/>
@@ -5360,569 +3901,6 @@
 </dgm:layoutDef>
 </file>
 
-<file path=ppt/diagrams/layout3.xml><?xml version="1.0" encoding="utf-8"?>
-<dgm:layoutDef xmlns:dgm="http://schemas.openxmlformats.org/drawingml/2006/diagram" xmlns:a="http://schemas.openxmlformats.org/drawingml/2006/main" uniqueId="urn:microsoft.com/office/officeart/2005/8/layout/hierarchy1">
-  <dgm:title val=""/>
-  <dgm:desc val=""/>
-  <dgm:catLst>
-    <dgm:cat type="hierarchy" pri="2000"/>
-  </dgm:catLst>
-  <dgm:sampData>
-    <dgm:dataModel>
-      <dgm:ptLst>
-        <dgm:pt modelId="0" type="doc"/>
-        <dgm:pt modelId="1">
-          <dgm:prSet phldr="1"/>
-        </dgm:pt>
-        <dgm:pt modelId="2">
-          <dgm:prSet phldr="1"/>
-        </dgm:pt>
-        <dgm:pt modelId="21">
-          <dgm:prSet phldr="1"/>
-        </dgm:pt>
-        <dgm:pt modelId="22">
-          <dgm:prSet phldr="1"/>
-        </dgm:pt>
-        <dgm:pt modelId="3">
-          <dgm:prSet phldr="1"/>
-        </dgm:pt>
-        <dgm:pt modelId="31">
-          <dgm:prSet phldr="1"/>
-        </dgm:pt>
-      </dgm:ptLst>
-      <dgm:cxnLst>
-        <dgm:cxn modelId="4" srcId="0" destId="1" srcOrd="0" destOrd="0"/>
-        <dgm:cxn modelId="5" srcId="1" destId="2" srcOrd="0" destOrd="0"/>
-        <dgm:cxn modelId="6" srcId="1" destId="3" srcOrd="1" destOrd="0"/>
-        <dgm:cxn modelId="23" srcId="2" destId="21" srcOrd="0" destOrd="0"/>
-        <dgm:cxn modelId="24" srcId="2" destId="22" srcOrd="1" destOrd="0"/>
-        <dgm:cxn modelId="33" srcId="3" destId="31" srcOrd="0" destOrd="0"/>
-      </dgm:cxnLst>
-      <dgm:bg/>
-      <dgm:whole/>
-    </dgm:dataModel>
-  </dgm:sampData>
-  <dgm:styleData>
-    <dgm:dataModel>
-      <dgm:ptLst>
-        <dgm:pt modelId="0" type="doc"/>
-        <dgm:pt modelId="1"/>
-        <dgm:pt modelId="11"/>
-        <dgm:pt modelId="12"/>
-      </dgm:ptLst>
-      <dgm:cxnLst>
-        <dgm:cxn modelId="2" srcId="0" destId="1" srcOrd="0" destOrd="0"/>
-        <dgm:cxn modelId="13" srcId="1" destId="11" srcOrd="0" destOrd="0"/>
-        <dgm:cxn modelId="14" srcId="1" destId="12" srcOrd="1" destOrd="0"/>
-      </dgm:cxnLst>
-      <dgm:bg/>
-      <dgm:whole/>
-    </dgm:dataModel>
-  </dgm:styleData>
-  <dgm:clrData>
-    <dgm:dataModel>
-      <dgm:ptLst>
-        <dgm:pt modelId="0" type="doc"/>
-        <dgm:pt modelId="1"/>
-        <dgm:pt modelId="2"/>
-        <dgm:pt modelId="21"/>
-        <dgm:pt modelId="211"/>
-        <dgm:pt modelId="3"/>
-        <dgm:pt modelId="31"/>
-        <dgm:pt modelId="311"/>
-      </dgm:ptLst>
-      <dgm:cxnLst>
-        <dgm:cxn modelId="4" srcId="0" destId="1" srcOrd="0" destOrd="0"/>
-        <dgm:cxn modelId="5" srcId="1" destId="2" srcOrd="0" destOrd="0"/>
-        <dgm:cxn modelId="6" srcId="1" destId="3" srcOrd="1" destOrd="0"/>
-        <dgm:cxn modelId="23" srcId="2" destId="21" srcOrd="0" destOrd="0"/>
-        <dgm:cxn modelId="24" srcId="21" destId="211" srcOrd="0" destOrd="0"/>
-        <dgm:cxn modelId="33" srcId="3" destId="31" srcOrd="0" destOrd="0"/>
-        <dgm:cxn modelId="34" srcId="31" destId="311" srcOrd="0" destOrd="0"/>
-      </dgm:cxnLst>
-      <dgm:bg/>
-      <dgm:whole/>
-    </dgm:dataModel>
-  </dgm:clrData>
-  <dgm:layoutNode name="hierChild1">
-    <dgm:varLst>
-      <dgm:chPref val="1"/>
-      <dgm:dir/>
-      <dgm:animOne val="branch"/>
-      <dgm:animLvl val="lvl"/>
-      <dgm:resizeHandles/>
-    </dgm:varLst>
-    <dgm:choose name="Name0">
-      <dgm:if name="Name1" func="var" arg="dir" op="equ" val="norm">
-        <dgm:alg type="hierChild">
-          <dgm:param type="linDir" val="fromL"/>
-        </dgm:alg>
-      </dgm:if>
-      <dgm:else name="Name2">
-        <dgm:alg type="hierChild">
-          <dgm:param type="linDir" val="fromR"/>
-        </dgm:alg>
-      </dgm:else>
-    </dgm:choose>
-    <dgm:shape xmlns:r="http://schemas.openxmlformats.org/officeDocument/2006/relationships" r:blip="">
-      <dgm:adjLst/>
-    </dgm:shape>
-    <dgm:presOf/>
-    <dgm:constrLst>
-      <dgm:constr type="primFontSz" for="des" ptType="node" op="equ" val="65"/>
-      <dgm:constr type="w" for="des" forName="composite" refType="w"/>
-      <dgm:constr type="h" for="des" forName="composite" refType="w" refFor="des" refForName="composite" fact="0.667"/>
-      <dgm:constr type="w" for="des" forName="composite2" refType="w" refFor="des" refForName="composite"/>
-      <dgm:constr type="h" for="des" forName="composite2" refType="h" refFor="des" refForName="composite"/>
-      <dgm:constr type="w" for="des" forName="composite3" refType="w" refFor="des" refForName="composite"/>
-      <dgm:constr type="h" for="des" forName="composite3" refType="h" refFor="des" refForName="composite"/>
-      <dgm:constr type="w" for="des" forName="composite4" refType="w" refFor="des" refForName="composite"/>
-      <dgm:constr type="h" for="des" forName="composite4" refType="h" refFor="des" refForName="composite"/>
-      <dgm:constr type="w" for="des" forName="composite5" refType="w" refFor="des" refForName="composite"/>
-      <dgm:constr type="h" for="des" forName="composite5" refType="h" refFor="des" refForName="composite"/>
-      <dgm:constr type="sibSp" refType="w" refFor="des" refForName="composite" fact="0.1"/>
-      <dgm:constr type="sibSp" for="des" forName="hierChild2" refType="sibSp"/>
-      <dgm:constr type="sibSp" for="des" forName="hierChild3" refType="sibSp"/>
-      <dgm:constr type="sibSp" for="des" forName="hierChild4" refType="sibSp"/>
-      <dgm:constr type="sibSp" for="des" forName="hierChild5" refType="sibSp"/>
-      <dgm:constr type="sibSp" for="des" forName="hierChild6" refType="sibSp"/>
-      <dgm:constr type="sp" for="des" forName="hierRoot1" refType="h" refFor="des" refForName="composite" fact="0.25"/>
-      <dgm:constr type="sp" for="des" forName="hierRoot2" refType="sp" refFor="des" refForName="hierRoot1"/>
-      <dgm:constr type="sp" for="des" forName="hierRoot3" refType="sp" refFor="des" refForName="hierRoot1"/>
-      <dgm:constr type="sp" for="des" forName="hierRoot4" refType="sp" refFor="des" refForName="hierRoot1"/>
-      <dgm:constr type="sp" for="des" forName="hierRoot5" refType="sp" refFor="des" refForName="hierRoot1"/>
-    </dgm:constrLst>
-    <dgm:ruleLst/>
-    <dgm:forEach name="Name3" axis="ch">
-      <dgm:forEach name="Name4" axis="self" ptType="node">
-        <dgm:layoutNode name="hierRoot1">
-          <dgm:alg type="hierRoot"/>
-          <dgm:shape xmlns:r="http://schemas.openxmlformats.org/officeDocument/2006/relationships" r:blip="">
-            <dgm:adjLst/>
-          </dgm:shape>
-          <dgm:presOf/>
-          <dgm:constrLst>
-            <dgm:constr type="bendDist" for="des" ptType="parTrans" refType="sp" fact="0.5"/>
-          </dgm:constrLst>
-          <dgm:ruleLst/>
-          <dgm:layoutNode name="composite">
-            <dgm:alg type="composite"/>
-            <dgm:shape xmlns:r="http://schemas.openxmlformats.org/officeDocument/2006/relationships" r:blip="">
-              <dgm:adjLst/>
-            </dgm:shape>
-            <dgm:presOf/>
-            <dgm:constrLst>
-              <dgm:constr type="w" for="ch" forName="background" refType="w" fact="0.9"/>
-              <dgm:constr type="h" for="ch" forName="background" refType="w" refFor="ch" refForName="background" fact="0.635"/>
-              <dgm:constr type="t" for="ch" forName="background"/>
-              <dgm:constr type="l" for="ch" forName="background"/>
-              <dgm:constr type="w" for="ch" forName="text" refType="w" fact="0.9"/>
-              <dgm:constr type="h" for="ch" forName="text" refType="w" refFor="ch" refForName="text" fact="0.635"/>
-              <dgm:constr type="t" for="ch" forName="text" refType="w" fact="0.095"/>
-              <dgm:constr type="l" for="ch" forName="text" refType="w" fact="0.1"/>
-            </dgm:constrLst>
-            <dgm:ruleLst/>
-            <dgm:layoutNode name="background" styleLbl="node0" moveWith="text">
-              <dgm:alg type="sp"/>
-              <dgm:shape xmlns:r="http://schemas.openxmlformats.org/officeDocument/2006/relationships" type="roundRect" r:blip="">
-                <dgm:adjLst>
-                  <dgm:adj idx="1" val="0.1"/>
-                </dgm:adjLst>
-              </dgm:shape>
-              <dgm:presOf/>
-              <dgm:constrLst/>
-              <dgm:ruleLst/>
-            </dgm:layoutNode>
-            <dgm:layoutNode name="text" styleLbl="fgAcc0">
-              <dgm:varLst>
-                <dgm:chPref val="3"/>
-              </dgm:varLst>
-              <dgm:alg type="tx"/>
-              <dgm:shape xmlns:r="http://schemas.openxmlformats.org/officeDocument/2006/relationships" type="roundRect" r:blip="">
-                <dgm:adjLst>
-                  <dgm:adj idx="1" val="0.1"/>
-                </dgm:adjLst>
-              </dgm:shape>
-              <dgm:presOf axis="self"/>
-              <dgm:constrLst>
-                <dgm:constr type="tMarg" refType="primFontSz" fact="0.3"/>
-                <dgm:constr type="bMarg" refType="primFontSz" fact="0.3"/>
-                <dgm:constr type="lMarg" refType="primFontSz" fact="0.3"/>
-                <dgm:constr type="rMarg" refType="primFontSz" fact="0.3"/>
-              </dgm:constrLst>
-              <dgm:ruleLst>
-                <dgm:rule type="primFontSz" val="5" fact="NaN" max="NaN"/>
-              </dgm:ruleLst>
-            </dgm:layoutNode>
-          </dgm:layoutNode>
-          <dgm:layoutNode name="hierChild2">
-            <dgm:choose name="Name5">
-              <dgm:if name="Name6" func="var" arg="dir" op="equ" val="norm">
-                <dgm:alg type="hierChild">
-                  <dgm:param type="linDir" val="fromL"/>
-                </dgm:alg>
-              </dgm:if>
-              <dgm:else name="Name7">
-                <dgm:alg type="hierChild">
-                  <dgm:param type="linDir" val="fromR"/>
-                </dgm:alg>
-              </dgm:else>
-            </dgm:choose>
-            <dgm:shape xmlns:r="http://schemas.openxmlformats.org/officeDocument/2006/relationships" r:blip="">
-              <dgm:adjLst/>
-            </dgm:shape>
-            <dgm:presOf/>
-            <dgm:constrLst/>
-            <dgm:ruleLst/>
-            <dgm:forEach name="Name8" axis="ch">
-              <dgm:forEach name="Name9" axis="self" ptType="parTrans" cnt="1">
-                <dgm:layoutNode name="Name10">
-                  <dgm:alg type="conn">
-                    <dgm:param type="dim" val="1D"/>
-                    <dgm:param type="endSty" val="noArr"/>
-                    <dgm:param type="connRout" val="bend"/>
-                    <dgm:param type="bendPt" val="end"/>
-                    <dgm:param type="begPts" val="bCtr"/>
-                    <dgm:param type="endPts" val="tCtr"/>
-                    <dgm:param type="srcNode" val="background"/>
-                    <dgm:param type="dstNode" val="background2"/>
-                  </dgm:alg>
-                  <dgm:shape xmlns:r="http://schemas.openxmlformats.org/officeDocument/2006/relationships" type="conn" r:blip="" zOrderOff="-999">
-                    <dgm:adjLst/>
-                  </dgm:shape>
-                  <dgm:presOf axis="self"/>
-                  <dgm:constrLst>
-                    <dgm:constr type="begPad"/>
-                    <dgm:constr type="endPad"/>
-                  </dgm:constrLst>
-                  <dgm:ruleLst/>
-                </dgm:layoutNode>
-              </dgm:forEach>
-              <dgm:forEach name="Name11" axis="self" ptType="node">
-                <dgm:layoutNode name="hierRoot2">
-                  <dgm:alg type="hierRoot"/>
-                  <dgm:shape xmlns:r="http://schemas.openxmlformats.org/officeDocument/2006/relationships" r:blip="">
-                    <dgm:adjLst/>
-                  </dgm:shape>
-                  <dgm:presOf/>
-                  <dgm:constrLst>
-                    <dgm:constr type="bendDist" for="des" ptType="parTrans" refType="sp" fact="0.5"/>
-                  </dgm:constrLst>
-                  <dgm:ruleLst/>
-                  <dgm:layoutNode name="composite2">
-                    <dgm:alg type="composite"/>
-                    <dgm:shape xmlns:r="http://schemas.openxmlformats.org/officeDocument/2006/relationships" r:blip="">
-                      <dgm:adjLst/>
-                    </dgm:shape>
-                    <dgm:presOf/>
-                    <dgm:constrLst>
-                      <dgm:constr type="w" for="ch" forName="background2" refType="w" fact="0.9"/>
-                      <dgm:constr type="h" for="ch" forName="background2" refType="w" refFor="ch" refForName="background2" fact="0.635"/>
-                      <dgm:constr type="t" for="ch" forName="background2"/>
-                      <dgm:constr type="l" for="ch" forName="background2"/>
-                      <dgm:constr type="w" for="ch" forName="text2" refType="w" fact="0.9"/>
-                      <dgm:constr type="h" for="ch" forName="text2" refType="w" refFor="ch" refForName="text2" fact="0.635"/>
-                      <dgm:constr type="t" for="ch" forName="text2" refType="w" fact="0.095"/>
-                      <dgm:constr type="l" for="ch" forName="text2" refType="w" fact="0.1"/>
-                    </dgm:constrLst>
-                    <dgm:ruleLst/>
-                    <dgm:layoutNode name="background2" moveWith="text2">
-                      <dgm:alg type="sp"/>
-                      <dgm:shape xmlns:r="http://schemas.openxmlformats.org/officeDocument/2006/relationships" type="roundRect" r:blip="">
-                        <dgm:adjLst>
-                          <dgm:adj idx="1" val="0.1"/>
-                        </dgm:adjLst>
-                      </dgm:shape>
-                      <dgm:presOf/>
-                      <dgm:constrLst/>
-                      <dgm:ruleLst/>
-                    </dgm:layoutNode>
-                    <dgm:layoutNode name="text2" styleLbl="fgAcc2">
-                      <dgm:varLst>
-                        <dgm:chPref val="3"/>
-                      </dgm:varLst>
-                      <dgm:alg type="tx"/>
-                      <dgm:shape xmlns:r="http://schemas.openxmlformats.org/officeDocument/2006/relationships" type="roundRect" r:blip="">
-                        <dgm:adjLst>
-                          <dgm:adj idx="1" val="0.1"/>
-                        </dgm:adjLst>
-                      </dgm:shape>
-                      <dgm:presOf axis="self"/>
-                      <dgm:constrLst>
-                        <dgm:constr type="tMarg" refType="primFontSz" fact="0.3"/>
-                        <dgm:constr type="bMarg" refType="primFontSz" fact="0.3"/>
-                        <dgm:constr type="lMarg" refType="primFontSz" fact="0.3"/>
-                        <dgm:constr type="rMarg" refType="primFontSz" fact="0.3"/>
-                      </dgm:constrLst>
-                      <dgm:ruleLst>
-                        <dgm:rule type="primFontSz" val="5" fact="NaN" max="NaN"/>
-                      </dgm:ruleLst>
-                    </dgm:layoutNode>
-                  </dgm:layoutNode>
-                  <dgm:layoutNode name="hierChild3">
-                    <dgm:choose name="Name12">
-                      <dgm:if name="Name13" func="var" arg="dir" op="equ" val="norm">
-                        <dgm:alg type="hierChild">
-                          <dgm:param type="linDir" val="fromL"/>
-                        </dgm:alg>
-                      </dgm:if>
-                      <dgm:else name="Name14">
-                        <dgm:alg type="hierChild">
-                          <dgm:param type="linDir" val="fromR"/>
-                        </dgm:alg>
-                      </dgm:else>
-                    </dgm:choose>
-                    <dgm:shape xmlns:r="http://schemas.openxmlformats.org/officeDocument/2006/relationships" r:blip="">
-                      <dgm:adjLst/>
-                    </dgm:shape>
-                    <dgm:presOf/>
-                    <dgm:constrLst/>
-                    <dgm:ruleLst/>
-                    <dgm:forEach name="Name15" axis="ch">
-                      <dgm:forEach name="Name16" axis="self" ptType="parTrans" cnt="1">
-                        <dgm:layoutNode name="Name17">
-                          <dgm:alg type="conn">
-                            <dgm:param type="dim" val="1D"/>
-                            <dgm:param type="endSty" val="noArr"/>
-                            <dgm:param type="connRout" val="bend"/>
-                            <dgm:param type="bendPt" val="end"/>
-                            <dgm:param type="begPts" val="bCtr"/>
-                            <dgm:param type="endPts" val="tCtr"/>
-                            <dgm:param type="srcNode" val="background2"/>
-                            <dgm:param type="dstNode" val="background3"/>
-                          </dgm:alg>
-                          <dgm:shape xmlns:r="http://schemas.openxmlformats.org/officeDocument/2006/relationships" type="conn" r:blip="" zOrderOff="-999">
-                            <dgm:adjLst/>
-                          </dgm:shape>
-                          <dgm:presOf axis="self"/>
-                          <dgm:constrLst>
-                            <dgm:constr type="begPad"/>
-                            <dgm:constr type="endPad"/>
-                          </dgm:constrLst>
-                          <dgm:ruleLst/>
-                        </dgm:layoutNode>
-                      </dgm:forEach>
-                      <dgm:forEach name="Name18" axis="self" ptType="node">
-                        <dgm:layoutNode name="hierRoot3">
-                          <dgm:alg type="hierRoot"/>
-                          <dgm:shape xmlns:r="http://schemas.openxmlformats.org/officeDocument/2006/relationships" r:blip="">
-                            <dgm:adjLst/>
-                          </dgm:shape>
-                          <dgm:presOf/>
-                          <dgm:constrLst>
-                            <dgm:constr type="bendDist" for="des" ptType="parTrans" refType="sp" fact="0.5"/>
-                          </dgm:constrLst>
-                          <dgm:ruleLst/>
-                          <dgm:layoutNode name="composite3">
-                            <dgm:alg type="composite"/>
-                            <dgm:shape xmlns:r="http://schemas.openxmlformats.org/officeDocument/2006/relationships" r:blip="">
-                              <dgm:adjLst/>
-                            </dgm:shape>
-                            <dgm:presOf/>
-                            <dgm:constrLst>
-                              <dgm:constr type="w" for="ch" forName="background3" refType="w" fact="0.9"/>
-                              <dgm:constr type="h" for="ch" forName="background3" refType="w" refFor="ch" refForName="background3" fact="0.635"/>
-                              <dgm:constr type="t" for="ch" forName="background3"/>
-                              <dgm:constr type="l" for="ch" forName="background3"/>
-                              <dgm:constr type="w" for="ch" forName="text3" refType="w" fact="0.9"/>
-                              <dgm:constr type="h" for="ch" forName="text3" refType="w" refFor="ch" refForName="text3" fact="0.635"/>
-                              <dgm:constr type="t" for="ch" forName="text3" refType="w" fact="0.095"/>
-                              <dgm:constr type="l" for="ch" forName="text3" refType="w" fact="0.1"/>
-                            </dgm:constrLst>
-                            <dgm:ruleLst/>
-                            <dgm:layoutNode name="background3" moveWith="text3">
-                              <dgm:alg type="sp"/>
-                              <dgm:shape xmlns:r="http://schemas.openxmlformats.org/officeDocument/2006/relationships" type="roundRect" r:blip="">
-                                <dgm:adjLst>
-                                  <dgm:adj idx="1" val="0.1"/>
-                                </dgm:adjLst>
-                              </dgm:shape>
-                              <dgm:presOf/>
-                              <dgm:constrLst/>
-                              <dgm:ruleLst/>
-                            </dgm:layoutNode>
-                            <dgm:layoutNode name="text3" styleLbl="fgAcc3">
-                              <dgm:varLst>
-                                <dgm:chPref val="3"/>
-                              </dgm:varLst>
-                              <dgm:alg type="tx"/>
-                              <dgm:shape xmlns:r="http://schemas.openxmlformats.org/officeDocument/2006/relationships" type="roundRect" r:blip="">
-                                <dgm:adjLst>
-                                  <dgm:adj idx="1" val="0.1"/>
-                                </dgm:adjLst>
-                              </dgm:shape>
-                              <dgm:presOf axis="self"/>
-                              <dgm:constrLst>
-                                <dgm:constr type="tMarg" refType="primFontSz" fact="0.3"/>
-                                <dgm:constr type="bMarg" refType="primFontSz" fact="0.3"/>
-                                <dgm:constr type="lMarg" refType="primFontSz" fact="0.3"/>
-                                <dgm:constr type="rMarg" refType="primFontSz" fact="0.3"/>
-                              </dgm:constrLst>
-                              <dgm:ruleLst>
-                                <dgm:rule type="primFontSz" val="5" fact="NaN" max="NaN"/>
-                              </dgm:ruleLst>
-                            </dgm:layoutNode>
-                          </dgm:layoutNode>
-                          <dgm:layoutNode name="hierChild4">
-                            <dgm:choose name="Name19">
-                              <dgm:if name="Name20" func="var" arg="dir" op="equ" val="norm">
-                                <dgm:alg type="hierChild">
-                                  <dgm:param type="linDir" val="fromL"/>
-                                </dgm:alg>
-                              </dgm:if>
-                              <dgm:else name="Name21">
-                                <dgm:alg type="hierChild">
-                                  <dgm:param type="linDir" val="fromR"/>
-                                </dgm:alg>
-                              </dgm:else>
-                            </dgm:choose>
-                            <dgm:shape xmlns:r="http://schemas.openxmlformats.org/officeDocument/2006/relationships" r:blip="">
-                              <dgm:adjLst/>
-                            </dgm:shape>
-                            <dgm:presOf/>
-                            <dgm:constrLst/>
-                            <dgm:ruleLst/>
-                            <dgm:forEach name="repeat" axis="ch">
-                              <dgm:forEach name="Name22" axis="self" ptType="parTrans" cnt="1">
-                                <dgm:layoutNode name="Name23">
-                                  <dgm:choose name="Name24">
-                                    <dgm:if name="Name25" axis="self" func="depth" op="lte" val="4">
-                                      <dgm:alg type="conn">
-                                        <dgm:param type="dim" val="1D"/>
-                                        <dgm:param type="endSty" val="noArr"/>
-                                        <dgm:param type="connRout" val="bend"/>
-                                        <dgm:param type="bendPt" val="end"/>
-                                        <dgm:param type="begPts" val="bCtr"/>
-                                        <dgm:param type="endPts" val="tCtr"/>
-                                        <dgm:param type="srcNode" val="background3"/>
-                                        <dgm:param type="dstNode" val="background4"/>
-                                      </dgm:alg>
-                                    </dgm:if>
-                                    <dgm:else name="Name26">
-                                      <dgm:alg type="conn">
-                                        <dgm:param type="dim" val="1D"/>
-                                        <dgm:param type="endSty" val="noArr"/>
-                                        <dgm:param type="connRout" val="bend"/>
-                                        <dgm:param type="bendPt" val="end"/>
-                                        <dgm:param type="begPts" val="bCtr"/>
-                                        <dgm:param type="endPts" val="tCtr"/>
-                                        <dgm:param type="srcNode" val="background4"/>
-                                        <dgm:param type="dstNode" val="background4"/>
-                                      </dgm:alg>
-                                    </dgm:else>
-                                  </dgm:choose>
-                                  <dgm:shape xmlns:r="http://schemas.openxmlformats.org/officeDocument/2006/relationships" type="conn" r:blip="" zOrderOff="-999">
-                                    <dgm:adjLst/>
-                                  </dgm:shape>
-                                  <dgm:presOf axis="self"/>
-                                  <dgm:constrLst>
-                                    <dgm:constr type="begPad"/>
-                                    <dgm:constr type="endPad"/>
-                                  </dgm:constrLst>
-                                  <dgm:ruleLst/>
-                                </dgm:layoutNode>
-                              </dgm:forEach>
-                              <dgm:forEach name="Name27" axis="self" ptType="node">
-                                <dgm:layoutNode name="hierRoot4">
-                                  <dgm:alg type="hierRoot"/>
-                                  <dgm:shape xmlns:r="http://schemas.openxmlformats.org/officeDocument/2006/relationships" r:blip="">
-                                    <dgm:adjLst/>
-                                  </dgm:shape>
-                                  <dgm:presOf/>
-                                  <dgm:constrLst>
-                                    <dgm:constr type="bendDist" for="des" ptType="parTrans" refType="sp" fact="0.5"/>
-                                  </dgm:constrLst>
-                                  <dgm:ruleLst/>
-                                  <dgm:layoutNode name="composite4">
-                                    <dgm:alg type="composite"/>
-                                    <dgm:shape xmlns:r="http://schemas.openxmlformats.org/officeDocument/2006/relationships" r:blip="">
-                                      <dgm:adjLst/>
-                                    </dgm:shape>
-                                    <dgm:presOf/>
-                                    <dgm:constrLst>
-                                      <dgm:constr type="w" for="ch" forName="background4" refType="w" fact="0.9"/>
-                                      <dgm:constr type="h" for="ch" forName="background4" refType="w" refFor="ch" refForName="background4" fact="0.635"/>
-                                      <dgm:constr type="t" for="ch" forName="background4"/>
-                                      <dgm:constr type="l" for="ch" forName="background4"/>
-                                      <dgm:constr type="w" for="ch" forName="text4" refType="w" fact="0.9"/>
-                                      <dgm:constr type="h" for="ch" forName="text4" refType="w" refFor="ch" refForName="text4" fact="0.635"/>
-                                      <dgm:constr type="t" for="ch" forName="text4" refType="w" fact="0.095"/>
-                                      <dgm:constr type="l" for="ch" forName="text4" refType="w" fact="0.1"/>
-                                    </dgm:constrLst>
-                                    <dgm:ruleLst/>
-                                    <dgm:layoutNode name="background4" moveWith="text4">
-                                      <dgm:alg type="sp"/>
-                                      <dgm:shape xmlns:r="http://schemas.openxmlformats.org/officeDocument/2006/relationships" type="roundRect" r:blip="">
-                                        <dgm:adjLst>
-                                          <dgm:adj idx="1" val="0.1"/>
-                                        </dgm:adjLst>
-                                      </dgm:shape>
-                                      <dgm:presOf/>
-                                      <dgm:constrLst/>
-                                      <dgm:ruleLst/>
-                                    </dgm:layoutNode>
-                                    <dgm:layoutNode name="text4" styleLbl="fgAcc4">
-                                      <dgm:varLst>
-                                        <dgm:chPref val="3"/>
-                                      </dgm:varLst>
-                                      <dgm:alg type="tx"/>
-                                      <dgm:shape xmlns:r="http://schemas.openxmlformats.org/officeDocument/2006/relationships" type="roundRect" r:blip="">
-                                        <dgm:adjLst>
-                                          <dgm:adj idx="1" val="0.1"/>
-                                        </dgm:adjLst>
-                                      </dgm:shape>
-                                      <dgm:presOf axis="self"/>
-                                      <dgm:constrLst>
-                                        <dgm:constr type="tMarg" refType="primFontSz" fact="0.3"/>
-                                        <dgm:constr type="bMarg" refType="primFontSz" fact="0.3"/>
-                                        <dgm:constr type="lMarg" refType="primFontSz" fact="0.3"/>
-                                        <dgm:constr type="rMarg" refType="primFontSz" fact="0.3"/>
-                                      </dgm:constrLst>
-                                      <dgm:ruleLst>
-                                        <dgm:rule type="primFontSz" val="5" fact="NaN" max="NaN"/>
-                                      </dgm:ruleLst>
-                                    </dgm:layoutNode>
-                                  </dgm:layoutNode>
-                                  <dgm:layoutNode name="hierChild5">
-                                    <dgm:choose name="Name28">
-                                      <dgm:if name="Name29" func="var" arg="dir" op="equ" val="norm">
-                                        <dgm:alg type="hierChild">
-                                          <dgm:param type="linDir" val="fromL"/>
-                                        </dgm:alg>
-                                      </dgm:if>
-                                      <dgm:else name="Name30">
-                                        <dgm:alg type="hierChild">
-                                          <dgm:param type="linDir" val="fromR"/>
-                                        </dgm:alg>
-                                      </dgm:else>
-                                    </dgm:choose>
-                                    <dgm:shape xmlns:r="http://schemas.openxmlformats.org/officeDocument/2006/relationships" r:blip="">
-                                      <dgm:adjLst/>
-                                    </dgm:shape>
-                                    <dgm:presOf/>
-                                    <dgm:constrLst/>
-                                    <dgm:ruleLst/>
-                                    <dgm:forEach name="Name31" ref="repeat"/>
-                                  </dgm:layoutNode>
-                                </dgm:layoutNode>
-                              </dgm:forEach>
-                            </dgm:forEach>
-                          </dgm:layoutNode>
-                        </dgm:layoutNode>
-                      </dgm:forEach>
-                    </dgm:forEach>
-                  </dgm:layoutNode>
-                </dgm:layoutNode>
-              </dgm:forEach>
-            </dgm:forEach>
-          </dgm:layoutNode>
-        </dgm:layoutNode>
-      </dgm:forEach>
-    </dgm:forEach>
-  </dgm:layoutNode>
-</dgm:layoutDef>
-</file>
-
 <file path=ppt/diagrams/quickStyle1.xml><?xml version="1.0" encoding="utf-8"?>
 <dgm:styleDef xmlns:dgm="http://schemas.openxmlformats.org/drawingml/2006/diagram" xmlns:a="http://schemas.openxmlformats.org/drawingml/2006/main" uniqueId="urn:microsoft.com/office/officeart/2005/8/quickstyle/simple1">
   <dgm:title val=""/>
@@ -7963,1040 +5941,6 @@
         <a:scrgbClr r="0" g="0" b="0"/>
       </a:fillRef>
       <a:effectRef idx="0">
-        <a:scrgbClr r="0" g="0" b="0"/>
-      </a:effectRef>
-      <a:fontRef idx="minor"/>
-    </dgm:style>
-  </dgm:styleLbl>
-  <dgm:styleLbl name="revTx">
-    <dgm:scene3d>
-      <a:camera prst="orthographicFront"/>
-      <a:lightRig rig="threePt" dir="t"/>
-    </dgm:scene3d>
-    <dgm:sp3d/>
-    <dgm:txPr/>
-    <dgm:style>
-      <a:lnRef idx="0">
-        <a:scrgbClr r="0" g="0" b="0"/>
-      </a:lnRef>
-      <a:fillRef idx="0">
-        <a:scrgbClr r="0" g="0" b="0"/>
-      </a:fillRef>
-      <a:effectRef idx="0">
-        <a:scrgbClr r="0" g="0" b="0"/>
-      </a:effectRef>
-      <a:fontRef idx="minor"/>
-    </dgm:style>
-  </dgm:styleLbl>
-</dgm:styleDef>
-</file>
-
-<file path=ppt/diagrams/quickStyle3.xml><?xml version="1.0" encoding="utf-8"?>
-<dgm:styleDef xmlns:dgm="http://schemas.openxmlformats.org/drawingml/2006/diagram" xmlns:a="http://schemas.openxmlformats.org/drawingml/2006/main" uniqueId="urn:microsoft.com/office/officeart/2005/8/quickstyle/simple4">
-  <dgm:title val=""/>
-  <dgm:desc val=""/>
-  <dgm:catLst>
-    <dgm:cat type="simple" pri="10400"/>
-  </dgm:catLst>
-  <dgm:scene3d>
-    <a:camera prst="orthographicFront"/>
-    <a:lightRig rig="threePt" dir="t"/>
-  </dgm:scene3d>
-  <dgm:styleLbl name="node0">
-    <dgm:scene3d>
-      <a:camera prst="orthographicFront"/>
-      <a:lightRig rig="threePt" dir="t"/>
-    </dgm:scene3d>
-    <dgm:sp3d/>
-    <dgm:txPr/>
-    <dgm:style>
-      <a:lnRef idx="0">
-        <a:scrgbClr r="0" g="0" b="0"/>
-      </a:lnRef>
-      <a:fillRef idx="3">
-        <a:scrgbClr r="0" g="0" b="0"/>
-      </a:fillRef>
-      <a:effectRef idx="2">
-        <a:scrgbClr r="0" g="0" b="0"/>
-      </a:effectRef>
-      <a:fontRef idx="minor">
-        <a:schemeClr val="lt1"/>
-      </a:fontRef>
-    </dgm:style>
-  </dgm:styleLbl>
-  <dgm:styleLbl name="lnNode1">
-    <dgm:scene3d>
-      <a:camera prst="orthographicFront"/>
-      <a:lightRig rig="threePt" dir="t"/>
-    </dgm:scene3d>
-    <dgm:sp3d/>
-    <dgm:txPr/>
-    <dgm:style>
-      <a:lnRef idx="1">
-        <a:scrgbClr r="0" g="0" b="0"/>
-      </a:lnRef>
-      <a:fillRef idx="3">
-        <a:scrgbClr r="0" g="0" b="0"/>
-      </a:fillRef>
-      <a:effectRef idx="2">
-        <a:scrgbClr r="0" g="0" b="0"/>
-      </a:effectRef>
-      <a:fontRef idx="minor">
-        <a:schemeClr val="lt1"/>
-      </a:fontRef>
-    </dgm:style>
-  </dgm:styleLbl>
-  <dgm:styleLbl name="vennNode1">
-    <dgm:scene3d>
-      <a:camera prst="orthographicFront"/>
-      <a:lightRig rig="threePt" dir="t"/>
-    </dgm:scene3d>
-    <dgm:sp3d/>
-    <dgm:txPr/>
-    <dgm:style>
-      <a:lnRef idx="0">
-        <a:scrgbClr r="0" g="0" b="0"/>
-      </a:lnRef>
-      <a:fillRef idx="3">
-        <a:scrgbClr r="0" g="0" b="0"/>
-      </a:fillRef>
-      <a:effectRef idx="0">
-        <a:scrgbClr r="0" g="0" b="0"/>
-      </a:effectRef>
-      <a:fontRef idx="minor">
-        <a:schemeClr val="tx1"/>
-      </a:fontRef>
-    </dgm:style>
-  </dgm:styleLbl>
-  <dgm:styleLbl name="alignNode1">
-    <dgm:scene3d>
-      <a:camera prst="orthographicFront"/>
-      <a:lightRig rig="threePt" dir="t"/>
-    </dgm:scene3d>
-    <dgm:sp3d/>
-    <dgm:txPr/>
-    <dgm:style>
-      <a:lnRef idx="1">
-        <a:scrgbClr r="0" g="0" b="0"/>
-      </a:lnRef>
-      <a:fillRef idx="3">
-        <a:scrgbClr r="0" g="0" b="0"/>
-      </a:fillRef>
-      <a:effectRef idx="2">
-        <a:scrgbClr r="0" g="0" b="0"/>
-      </a:effectRef>
-      <a:fontRef idx="minor">
-        <a:schemeClr val="lt1"/>
-      </a:fontRef>
-    </dgm:style>
-  </dgm:styleLbl>
-  <dgm:styleLbl name="node1">
-    <dgm:scene3d>
-      <a:camera prst="orthographicFront"/>
-      <a:lightRig rig="threePt" dir="t"/>
-    </dgm:scene3d>
-    <dgm:sp3d/>
-    <dgm:txPr/>
-    <dgm:style>
-      <a:lnRef idx="0">
-        <a:scrgbClr r="0" g="0" b="0"/>
-      </a:lnRef>
-      <a:fillRef idx="3">
-        <a:scrgbClr r="0" g="0" b="0"/>
-      </a:fillRef>
-      <a:effectRef idx="2">
-        <a:scrgbClr r="0" g="0" b="0"/>
-      </a:effectRef>
-      <a:fontRef idx="minor">
-        <a:schemeClr val="lt1"/>
-      </a:fontRef>
-    </dgm:style>
-  </dgm:styleLbl>
-  <dgm:styleLbl name="node2">
-    <dgm:scene3d>
-      <a:camera prst="orthographicFront"/>
-      <a:lightRig rig="threePt" dir="t"/>
-    </dgm:scene3d>
-    <dgm:sp3d/>
-    <dgm:txPr/>
-    <dgm:style>
-      <a:lnRef idx="0">
-        <a:scrgbClr r="0" g="0" b="0"/>
-      </a:lnRef>
-      <a:fillRef idx="3">
-        <a:scrgbClr r="0" g="0" b="0"/>
-      </a:fillRef>
-      <a:effectRef idx="2">
-        <a:scrgbClr r="0" g="0" b="0"/>
-      </a:effectRef>
-      <a:fontRef idx="minor">
-        <a:schemeClr val="lt1"/>
-      </a:fontRef>
-    </dgm:style>
-  </dgm:styleLbl>
-  <dgm:styleLbl name="node3">
-    <dgm:scene3d>
-      <a:camera prst="orthographicFront"/>
-      <a:lightRig rig="threePt" dir="t"/>
-    </dgm:scene3d>
-    <dgm:sp3d/>
-    <dgm:txPr/>
-    <dgm:style>
-      <a:lnRef idx="0">
-        <a:scrgbClr r="0" g="0" b="0"/>
-      </a:lnRef>
-      <a:fillRef idx="3">
-        <a:scrgbClr r="0" g="0" b="0"/>
-      </a:fillRef>
-      <a:effectRef idx="2">
-        <a:scrgbClr r="0" g="0" b="0"/>
-      </a:effectRef>
-      <a:fontRef idx="minor">
-        <a:schemeClr val="lt1"/>
-      </a:fontRef>
-    </dgm:style>
-  </dgm:styleLbl>
-  <dgm:styleLbl name="node4">
-    <dgm:scene3d>
-      <a:camera prst="orthographicFront"/>
-      <a:lightRig rig="threePt" dir="t"/>
-    </dgm:scene3d>
-    <dgm:sp3d/>
-    <dgm:txPr/>
-    <dgm:style>
-      <a:lnRef idx="0">
-        <a:scrgbClr r="0" g="0" b="0"/>
-      </a:lnRef>
-      <a:fillRef idx="3">
-        <a:scrgbClr r="0" g="0" b="0"/>
-      </a:fillRef>
-      <a:effectRef idx="2">
-        <a:scrgbClr r="0" g="0" b="0"/>
-      </a:effectRef>
-      <a:fontRef idx="minor">
-        <a:schemeClr val="lt1"/>
-      </a:fontRef>
-    </dgm:style>
-  </dgm:styleLbl>
-  <dgm:styleLbl name="fgImgPlace1">
-    <dgm:scene3d>
-      <a:camera prst="orthographicFront"/>
-      <a:lightRig rig="threePt" dir="t"/>
-    </dgm:scene3d>
-    <dgm:sp3d/>
-    <dgm:txPr/>
-    <dgm:style>
-      <a:lnRef idx="0">
-        <a:scrgbClr r="0" g="0" b="0"/>
-      </a:lnRef>
-      <a:fillRef idx="1">
-        <a:scrgbClr r="0" g="0" b="0"/>
-      </a:fillRef>
-      <a:effectRef idx="2">
-        <a:scrgbClr r="0" g="0" b="0"/>
-      </a:effectRef>
-      <a:fontRef idx="minor"/>
-    </dgm:style>
-  </dgm:styleLbl>
-  <dgm:styleLbl name="alignImgPlace1">
-    <dgm:scene3d>
-      <a:camera prst="orthographicFront"/>
-      <a:lightRig rig="threePt" dir="t"/>
-    </dgm:scene3d>
-    <dgm:sp3d/>
-    <dgm:txPr/>
-    <dgm:style>
-      <a:lnRef idx="0">
-        <a:scrgbClr r="0" g="0" b="0"/>
-      </a:lnRef>
-      <a:fillRef idx="1">
-        <a:scrgbClr r="0" g="0" b="0"/>
-      </a:fillRef>
-      <a:effectRef idx="2">
-        <a:scrgbClr r="0" g="0" b="0"/>
-      </a:effectRef>
-      <a:fontRef idx="minor"/>
-    </dgm:style>
-  </dgm:styleLbl>
-  <dgm:styleLbl name="bgImgPlace1">
-    <dgm:scene3d>
-      <a:camera prst="orthographicFront"/>
-      <a:lightRig rig="threePt" dir="t"/>
-    </dgm:scene3d>
-    <dgm:sp3d/>
-    <dgm:txPr/>
-    <dgm:style>
-      <a:lnRef idx="0">
-        <a:scrgbClr r="0" g="0" b="0"/>
-      </a:lnRef>
-      <a:fillRef idx="1">
-        <a:scrgbClr r="0" g="0" b="0"/>
-      </a:fillRef>
-      <a:effectRef idx="2">
-        <a:scrgbClr r="0" g="0" b="0"/>
-      </a:effectRef>
-      <a:fontRef idx="minor"/>
-    </dgm:style>
-  </dgm:styleLbl>
-  <dgm:styleLbl name="sibTrans2D1">
-    <dgm:scene3d>
-      <a:camera prst="orthographicFront"/>
-      <a:lightRig rig="threePt" dir="t"/>
-    </dgm:scene3d>
-    <dgm:sp3d/>
-    <dgm:txPr/>
-    <dgm:style>
-      <a:lnRef idx="0">
-        <a:scrgbClr r="0" g="0" b="0"/>
-      </a:lnRef>
-      <a:fillRef idx="3">
-        <a:scrgbClr r="0" g="0" b="0"/>
-      </a:fillRef>
-      <a:effectRef idx="2">
-        <a:scrgbClr r="0" g="0" b="0"/>
-      </a:effectRef>
-      <a:fontRef idx="minor">
-        <a:schemeClr val="lt1"/>
-      </a:fontRef>
-    </dgm:style>
-  </dgm:styleLbl>
-  <dgm:styleLbl name="fgSibTrans2D1">
-    <dgm:scene3d>
-      <a:camera prst="orthographicFront"/>
-      <a:lightRig rig="threePt" dir="t"/>
-    </dgm:scene3d>
-    <dgm:sp3d/>
-    <dgm:txPr/>
-    <dgm:style>
-      <a:lnRef idx="0">
-        <a:scrgbClr r="0" g="0" b="0"/>
-      </a:lnRef>
-      <a:fillRef idx="3">
-        <a:scrgbClr r="0" g="0" b="0"/>
-      </a:fillRef>
-      <a:effectRef idx="2">
-        <a:scrgbClr r="0" g="0" b="0"/>
-      </a:effectRef>
-      <a:fontRef idx="minor">
-        <a:schemeClr val="lt1"/>
-      </a:fontRef>
-    </dgm:style>
-  </dgm:styleLbl>
-  <dgm:styleLbl name="bgSibTrans2D1">
-    <dgm:scene3d>
-      <a:camera prst="orthographicFront"/>
-      <a:lightRig rig="threePt" dir="t"/>
-    </dgm:scene3d>
-    <dgm:sp3d/>
-    <dgm:txPr/>
-    <dgm:style>
-      <a:lnRef idx="0">
-        <a:scrgbClr r="0" g="0" b="0"/>
-      </a:lnRef>
-      <a:fillRef idx="3">
-        <a:scrgbClr r="0" g="0" b="0"/>
-      </a:fillRef>
-      <a:effectRef idx="2">
-        <a:scrgbClr r="0" g="0" b="0"/>
-      </a:effectRef>
-      <a:fontRef idx="minor">
-        <a:schemeClr val="lt1"/>
-      </a:fontRef>
-    </dgm:style>
-  </dgm:styleLbl>
-  <dgm:styleLbl name="sibTrans1D1">
-    <dgm:scene3d>
-      <a:camera prst="orthographicFront"/>
-      <a:lightRig rig="threePt" dir="t"/>
-    </dgm:scene3d>
-    <dgm:sp3d/>
-    <dgm:txPr/>
-    <dgm:style>
-      <a:lnRef idx="1">
-        <a:scrgbClr r="0" g="0" b="0"/>
-      </a:lnRef>
-      <a:fillRef idx="0">
-        <a:scrgbClr r="0" g="0" b="0"/>
-      </a:fillRef>
-      <a:effectRef idx="0">
-        <a:scrgbClr r="0" g="0" b="0"/>
-      </a:effectRef>
-      <a:fontRef idx="minor"/>
-    </dgm:style>
-  </dgm:styleLbl>
-  <dgm:styleLbl name="callout">
-    <dgm:scene3d>
-      <a:camera prst="orthographicFront"/>
-      <a:lightRig rig="threePt" dir="t"/>
-    </dgm:scene3d>
-    <dgm:sp3d/>
-    <dgm:txPr/>
-    <dgm:style>
-      <a:lnRef idx="2">
-        <a:scrgbClr r="0" g="0" b="0"/>
-      </a:lnRef>
-      <a:fillRef idx="1">
-        <a:scrgbClr r="0" g="0" b="0"/>
-      </a:fillRef>
-      <a:effectRef idx="1">
-        <a:scrgbClr r="0" g="0" b="0"/>
-      </a:effectRef>
-      <a:fontRef idx="minor"/>
-    </dgm:style>
-  </dgm:styleLbl>
-  <dgm:styleLbl name="asst0">
-    <dgm:scene3d>
-      <a:camera prst="orthographicFront"/>
-      <a:lightRig rig="threePt" dir="t"/>
-    </dgm:scene3d>
-    <dgm:sp3d/>
-    <dgm:txPr/>
-    <dgm:style>
-      <a:lnRef idx="0">
-        <a:scrgbClr r="0" g="0" b="0"/>
-      </a:lnRef>
-      <a:fillRef idx="3">
-        <a:scrgbClr r="0" g="0" b="0"/>
-      </a:fillRef>
-      <a:effectRef idx="2">
-        <a:scrgbClr r="0" g="0" b="0"/>
-      </a:effectRef>
-      <a:fontRef idx="minor">
-        <a:schemeClr val="lt1"/>
-      </a:fontRef>
-    </dgm:style>
-  </dgm:styleLbl>
-  <dgm:styleLbl name="asst1">
-    <dgm:scene3d>
-      <a:camera prst="orthographicFront"/>
-      <a:lightRig rig="threePt" dir="t"/>
-    </dgm:scene3d>
-    <dgm:sp3d/>
-    <dgm:txPr/>
-    <dgm:style>
-      <a:lnRef idx="0">
-        <a:scrgbClr r="0" g="0" b="0"/>
-      </a:lnRef>
-      <a:fillRef idx="3">
-        <a:scrgbClr r="0" g="0" b="0"/>
-      </a:fillRef>
-      <a:effectRef idx="2">
-        <a:scrgbClr r="0" g="0" b="0"/>
-      </a:effectRef>
-      <a:fontRef idx="minor">
-        <a:schemeClr val="lt1"/>
-      </a:fontRef>
-    </dgm:style>
-  </dgm:styleLbl>
-  <dgm:styleLbl name="asst2">
-    <dgm:scene3d>
-      <a:camera prst="orthographicFront"/>
-      <a:lightRig rig="threePt" dir="t"/>
-    </dgm:scene3d>
-    <dgm:sp3d/>
-    <dgm:txPr/>
-    <dgm:style>
-      <a:lnRef idx="0">
-        <a:scrgbClr r="0" g="0" b="0"/>
-      </a:lnRef>
-      <a:fillRef idx="3">
-        <a:scrgbClr r="0" g="0" b="0"/>
-      </a:fillRef>
-      <a:effectRef idx="2">
-        <a:scrgbClr r="0" g="0" b="0"/>
-      </a:effectRef>
-      <a:fontRef idx="minor">
-        <a:schemeClr val="lt1"/>
-      </a:fontRef>
-    </dgm:style>
-  </dgm:styleLbl>
-  <dgm:styleLbl name="asst3">
-    <dgm:scene3d>
-      <a:camera prst="orthographicFront"/>
-      <a:lightRig rig="threePt" dir="t"/>
-    </dgm:scene3d>
-    <dgm:sp3d/>
-    <dgm:txPr/>
-    <dgm:style>
-      <a:lnRef idx="0">
-        <a:scrgbClr r="0" g="0" b="0"/>
-      </a:lnRef>
-      <a:fillRef idx="3">
-        <a:scrgbClr r="0" g="0" b="0"/>
-      </a:fillRef>
-      <a:effectRef idx="2">
-        <a:scrgbClr r="0" g="0" b="0"/>
-      </a:effectRef>
-      <a:fontRef idx="minor">
-        <a:schemeClr val="lt1"/>
-      </a:fontRef>
-    </dgm:style>
-  </dgm:styleLbl>
-  <dgm:styleLbl name="asst4">
-    <dgm:scene3d>
-      <a:camera prst="orthographicFront"/>
-      <a:lightRig rig="threePt" dir="t"/>
-    </dgm:scene3d>
-    <dgm:sp3d/>
-    <dgm:txPr/>
-    <dgm:style>
-      <a:lnRef idx="0">
-        <a:scrgbClr r="0" g="0" b="0"/>
-      </a:lnRef>
-      <a:fillRef idx="3">
-        <a:scrgbClr r="0" g="0" b="0"/>
-      </a:fillRef>
-      <a:effectRef idx="2">
-        <a:scrgbClr r="0" g="0" b="0"/>
-      </a:effectRef>
-      <a:fontRef idx="minor">
-        <a:schemeClr val="lt1"/>
-      </a:fontRef>
-    </dgm:style>
-  </dgm:styleLbl>
-  <dgm:styleLbl name="parChTrans2D1">
-    <dgm:scene3d>
-      <a:camera prst="orthographicFront"/>
-      <a:lightRig rig="threePt" dir="t"/>
-    </dgm:scene3d>
-    <dgm:sp3d/>
-    <dgm:txPr/>
-    <dgm:style>
-      <a:lnRef idx="0">
-        <a:scrgbClr r="0" g="0" b="0"/>
-      </a:lnRef>
-      <a:fillRef idx="3">
-        <a:scrgbClr r="0" g="0" b="0"/>
-      </a:fillRef>
-      <a:effectRef idx="2">
-        <a:scrgbClr r="0" g="0" b="0"/>
-      </a:effectRef>
-      <a:fontRef idx="minor">
-        <a:schemeClr val="lt1"/>
-      </a:fontRef>
-    </dgm:style>
-  </dgm:styleLbl>
-  <dgm:styleLbl name="parChTrans2D2">
-    <dgm:scene3d>
-      <a:camera prst="orthographicFront"/>
-      <a:lightRig rig="threePt" dir="t"/>
-    </dgm:scene3d>
-    <dgm:sp3d/>
-    <dgm:txPr/>
-    <dgm:style>
-      <a:lnRef idx="0">
-        <a:scrgbClr r="0" g="0" b="0"/>
-      </a:lnRef>
-      <a:fillRef idx="3">
-        <a:scrgbClr r="0" g="0" b="0"/>
-      </a:fillRef>
-      <a:effectRef idx="2">
-        <a:scrgbClr r="0" g="0" b="0"/>
-      </a:effectRef>
-      <a:fontRef idx="minor">
-        <a:schemeClr val="lt1"/>
-      </a:fontRef>
-    </dgm:style>
-  </dgm:styleLbl>
-  <dgm:styleLbl name="parChTrans2D3">
-    <dgm:scene3d>
-      <a:camera prst="orthographicFront"/>
-      <a:lightRig rig="threePt" dir="t"/>
-    </dgm:scene3d>
-    <dgm:sp3d/>
-    <dgm:txPr/>
-    <dgm:style>
-      <a:lnRef idx="1">
-        <a:scrgbClr r="0" g="0" b="0"/>
-      </a:lnRef>
-      <a:fillRef idx="3">
-        <a:scrgbClr r="0" g="0" b="0"/>
-      </a:fillRef>
-      <a:effectRef idx="2">
-        <a:scrgbClr r="0" g="0" b="0"/>
-      </a:effectRef>
-      <a:fontRef idx="minor">
-        <a:schemeClr val="lt1"/>
-      </a:fontRef>
-    </dgm:style>
-  </dgm:styleLbl>
-  <dgm:styleLbl name="parChTrans2D4">
-    <dgm:scene3d>
-      <a:camera prst="orthographicFront"/>
-      <a:lightRig rig="threePt" dir="t"/>
-    </dgm:scene3d>
-    <dgm:sp3d/>
-    <dgm:txPr/>
-    <dgm:style>
-      <a:lnRef idx="1">
-        <a:scrgbClr r="0" g="0" b="0"/>
-      </a:lnRef>
-      <a:fillRef idx="3">
-        <a:scrgbClr r="0" g="0" b="0"/>
-      </a:fillRef>
-      <a:effectRef idx="2">
-        <a:scrgbClr r="0" g="0" b="0"/>
-      </a:effectRef>
-      <a:fontRef idx="minor">
-        <a:schemeClr val="lt1"/>
-      </a:fontRef>
-    </dgm:style>
-  </dgm:styleLbl>
-  <dgm:styleLbl name="parChTrans1D1">
-    <dgm:scene3d>
-      <a:camera prst="orthographicFront"/>
-      <a:lightRig rig="threePt" dir="t"/>
-    </dgm:scene3d>
-    <dgm:sp3d/>
-    <dgm:txPr/>
-    <dgm:style>
-      <a:lnRef idx="1">
-        <a:scrgbClr r="0" g="0" b="0"/>
-      </a:lnRef>
-      <a:fillRef idx="0">
-        <a:scrgbClr r="0" g="0" b="0"/>
-      </a:fillRef>
-      <a:effectRef idx="0">
-        <a:scrgbClr r="0" g="0" b="0"/>
-      </a:effectRef>
-      <a:fontRef idx="minor"/>
-    </dgm:style>
-  </dgm:styleLbl>
-  <dgm:styleLbl name="parChTrans1D2">
-    <dgm:scene3d>
-      <a:camera prst="orthographicFront"/>
-      <a:lightRig rig="threePt" dir="t"/>
-    </dgm:scene3d>
-    <dgm:sp3d/>
-    <dgm:txPr/>
-    <dgm:style>
-      <a:lnRef idx="1">
-        <a:scrgbClr r="0" g="0" b="0"/>
-      </a:lnRef>
-      <a:fillRef idx="0">
-        <a:scrgbClr r="0" g="0" b="0"/>
-      </a:fillRef>
-      <a:effectRef idx="0">
-        <a:scrgbClr r="0" g="0" b="0"/>
-      </a:effectRef>
-      <a:fontRef idx="minor"/>
-    </dgm:style>
-  </dgm:styleLbl>
-  <dgm:styleLbl name="parChTrans1D3">
-    <dgm:scene3d>
-      <a:camera prst="orthographicFront"/>
-      <a:lightRig rig="threePt" dir="t"/>
-    </dgm:scene3d>
-    <dgm:sp3d/>
-    <dgm:txPr/>
-    <dgm:style>
-      <a:lnRef idx="1">
-        <a:scrgbClr r="0" g="0" b="0"/>
-      </a:lnRef>
-      <a:fillRef idx="0">
-        <a:scrgbClr r="0" g="0" b="0"/>
-      </a:fillRef>
-      <a:effectRef idx="0">
-        <a:scrgbClr r="0" g="0" b="0"/>
-      </a:effectRef>
-      <a:fontRef idx="minor"/>
-    </dgm:style>
-  </dgm:styleLbl>
-  <dgm:styleLbl name="parChTrans1D4">
-    <dgm:scene3d>
-      <a:camera prst="orthographicFront"/>
-      <a:lightRig rig="threePt" dir="t"/>
-    </dgm:scene3d>
-    <dgm:sp3d/>
-    <dgm:txPr/>
-    <dgm:style>
-      <a:lnRef idx="1">
-        <a:scrgbClr r="0" g="0" b="0"/>
-      </a:lnRef>
-      <a:fillRef idx="0">
-        <a:scrgbClr r="0" g="0" b="0"/>
-      </a:fillRef>
-      <a:effectRef idx="0">
-        <a:scrgbClr r="0" g="0" b="0"/>
-      </a:effectRef>
-      <a:fontRef idx="minor"/>
-    </dgm:style>
-  </dgm:styleLbl>
-  <dgm:styleLbl name="fgAcc1">
-    <dgm:scene3d>
-      <a:camera prst="orthographicFront"/>
-      <a:lightRig rig="threePt" dir="t"/>
-    </dgm:scene3d>
-    <dgm:sp3d/>
-    <dgm:txPr/>
-    <dgm:style>
-      <a:lnRef idx="1">
-        <a:scrgbClr r="0" g="0" b="0"/>
-      </a:lnRef>
-      <a:fillRef idx="1">
-        <a:scrgbClr r="0" g="0" b="0"/>
-      </a:fillRef>
-      <a:effectRef idx="0">
-        <a:scrgbClr r="0" g="0" b="0"/>
-      </a:effectRef>
-      <a:fontRef idx="minor"/>
-    </dgm:style>
-  </dgm:styleLbl>
-  <dgm:styleLbl name="conFgAcc1">
-    <dgm:scene3d>
-      <a:camera prst="orthographicFront"/>
-      <a:lightRig rig="threePt" dir="t"/>
-    </dgm:scene3d>
-    <dgm:sp3d/>
-    <dgm:txPr/>
-    <dgm:style>
-      <a:lnRef idx="1">
-        <a:scrgbClr r="0" g="0" b="0"/>
-      </a:lnRef>
-      <a:fillRef idx="1">
-        <a:scrgbClr r="0" g="0" b="0"/>
-      </a:fillRef>
-      <a:effectRef idx="0">
-        <a:scrgbClr r="0" g="0" b="0"/>
-      </a:effectRef>
-      <a:fontRef idx="minor"/>
-    </dgm:style>
-  </dgm:styleLbl>
-  <dgm:styleLbl name="alignAcc1">
-    <dgm:scene3d>
-      <a:camera prst="orthographicFront"/>
-      <a:lightRig rig="threePt" dir="t"/>
-    </dgm:scene3d>
-    <dgm:sp3d/>
-    <dgm:txPr/>
-    <dgm:style>
-      <a:lnRef idx="1">
-        <a:scrgbClr r="0" g="0" b="0"/>
-      </a:lnRef>
-      <a:fillRef idx="1">
-        <a:scrgbClr r="0" g="0" b="0"/>
-      </a:fillRef>
-      <a:effectRef idx="0">
-        <a:scrgbClr r="0" g="0" b="0"/>
-      </a:effectRef>
-      <a:fontRef idx="minor"/>
-    </dgm:style>
-  </dgm:styleLbl>
-  <dgm:styleLbl name="trAlignAcc1">
-    <dgm:scene3d>
-      <a:camera prst="orthographicFront"/>
-      <a:lightRig rig="threePt" dir="t"/>
-    </dgm:scene3d>
-    <dgm:sp3d/>
-    <dgm:txPr/>
-    <dgm:style>
-      <a:lnRef idx="1">
-        <a:scrgbClr r="0" g="0" b="0"/>
-      </a:lnRef>
-      <a:fillRef idx="1">
-        <a:scrgbClr r="0" g="0" b="0"/>
-      </a:fillRef>
-      <a:effectRef idx="0">
-        <a:scrgbClr r="0" g="0" b="0"/>
-      </a:effectRef>
-      <a:fontRef idx="minor"/>
-    </dgm:style>
-  </dgm:styleLbl>
-  <dgm:styleLbl name="bgAcc1">
-    <dgm:scene3d>
-      <a:camera prst="orthographicFront"/>
-      <a:lightRig rig="threePt" dir="t"/>
-    </dgm:scene3d>
-    <dgm:sp3d/>
-    <dgm:txPr/>
-    <dgm:style>
-      <a:lnRef idx="1">
-        <a:scrgbClr r="0" g="0" b="0"/>
-      </a:lnRef>
-      <a:fillRef idx="1">
-        <a:scrgbClr r="0" g="0" b="0"/>
-      </a:fillRef>
-      <a:effectRef idx="0">
-        <a:scrgbClr r="0" g="0" b="0"/>
-      </a:effectRef>
-      <a:fontRef idx="minor"/>
-    </dgm:style>
-  </dgm:styleLbl>
-  <dgm:styleLbl name="solidFgAcc1">
-    <dgm:scene3d>
-      <a:camera prst="orthographicFront"/>
-      <a:lightRig rig="threePt" dir="t"/>
-    </dgm:scene3d>
-    <dgm:sp3d/>
-    <dgm:txPr/>
-    <dgm:style>
-      <a:lnRef idx="1">
-        <a:scrgbClr r="0" g="0" b="0"/>
-      </a:lnRef>
-      <a:fillRef idx="1">
-        <a:scrgbClr r="0" g="0" b="0"/>
-      </a:fillRef>
-      <a:effectRef idx="0">
-        <a:scrgbClr r="0" g="0" b="0"/>
-      </a:effectRef>
-      <a:fontRef idx="minor"/>
-    </dgm:style>
-  </dgm:styleLbl>
-  <dgm:styleLbl name="solidAlignAcc1">
-    <dgm:scene3d>
-      <a:camera prst="orthographicFront"/>
-      <a:lightRig rig="threePt" dir="t"/>
-    </dgm:scene3d>
-    <dgm:sp3d/>
-    <dgm:txPr/>
-    <dgm:style>
-      <a:lnRef idx="1">
-        <a:scrgbClr r="0" g="0" b="0"/>
-      </a:lnRef>
-      <a:fillRef idx="1">
-        <a:scrgbClr r="0" g="0" b="0"/>
-      </a:fillRef>
-      <a:effectRef idx="0">
-        <a:scrgbClr r="0" g="0" b="0"/>
-      </a:effectRef>
-      <a:fontRef idx="minor"/>
-    </dgm:style>
-  </dgm:styleLbl>
-  <dgm:styleLbl name="solidBgAcc1">
-    <dgm:scene3d>
-      <a:camera prst="orthographicFront"/>
-      <a:lightRig rig="threePt" dir="t"/>
-    </dgm:scene3d>
-    <dgm:sp3d/>
-    <dgm:txPr/>
-    <dgm:style>
-      <a:lnRef idx="1">
-        <a:scrgbClr r="0" g="0" b="0"/>
-      </a:lnRef>
-      <a:fillRef idx="1">
-        <a:scrgbClr r="0" g="0" b="0"/>
-      </a:fillRef>
-      <a:effectRef idx="0">
-        <a:scrgbClr r="0" g="0" b="0"/>
-      </a:effectRef>
-      <a:fontRef idx="minor"/>
-    </dgm:style>
-  </dgm:styleLbl>
-  <dgm:styleLbl name="fgAccFollowNode1">
-    <dgm:scene3d>
-      <a:camera prst="orthographicFront"/>
-      <a:lightRig rig="threePt" dir="t"/>
-    </dgm:scene3d>
-    <dgm:sp3d/>
-    <dgm:txPr/>
-    <dgm:style>
-      <a:lnRef idx="1">
-        <a:scrgbClr r="0" g="0" b="0"/>
-      </a:lnRef>
-      <a:fillRef idx="1">
-        <a:scrgbClr r="0" g="0" b="0"/>
-      </a:fillRef>
-      <a:effectRef idx="0">
-        <a:scrgbClr r="0" g="0" b="0"/>
-      </a:effectRef>
-      <a:fontRef idx="minor"/>
-    </dgm:style>
-  </dgm:styleLbl>
-  <dgm:styleLbl name="alignAccFollowNode1">
-    <dgm:scene3d>
-      <a:camera prst="orthographicFront"/>
-      <a:lightRig rig="threePt" dir="t"/>
-    </dgm:scene3d>
-    <dgm:sp3d/>
-    <dgm:txPr/>
-    <dgm:style>
-      <a:lnRef idx="1">
-        <a:scrgbClr r="0" g="0" b="0"/>
-      </a:lnRef>
-      <a:fillRef idx="1">
-        <a:scrgbClr r="0" g="0" b="0"/>
-      </a:fillRef>
-      <a:effectRef idx="0">
-        <a:scrgbClr r="0" g="0" b="0"/>
-      </a:effectRef>
-      <a:fontRef idx="minor"/>
-    </dgm:style>
-  </dgm:styleLbl>
-  <dgm:styleLbl name="bgAccFollowNode1">
-    <dgm:scene3d>
-      <a:camera prst="orthographicFront"/>
-      <a:lightRig rig="threePt" dir="t"/>
-    </dgm:scene3d>
-    <dgm:sp3d/>
-    <dgm:txPr/>
-    <dgm:style>
-      <a:lnRef idx="1">
-        <a:scrgbClr r="0" g="0" b="0"/>
-      </a:lnRef>
-      <a:fillRef idx="1">
-        <a:scrgbClr r="0" g="0" b="0"/>
-      </a:fillRef>
-      <a:effectRef idx="0">
-        <a:scrgbClr r="0" g="0" b="0"/>
-      </a:effectRef>
-      <a:fontRef idx="minor"/>
-    </dgm:style>
-  </dgm:styleLbl>
-  <dgm:styleLbl name="fgAcc0">
-    <dgm:scene3d>
-      <a:camera prst="orthographicFront"/>
-      <a:lightRig rig="threePt" dir="t"/>
-    </dgm:scene3d>
-    <dgm:sp3d/>
-    <dgm:txPr/>
-    <dgm:style>
-      <a:lnRef idx="1">
-        <a:scrgbClr r="0" g="0" b="0"/>
-      </a:lnRef>
-      <a:fillRef idx="1">
-        <a:scrgbClr r="0" g="0" b="0"/>
-      </a:fillRef>
-      <a:effectRef idx="0">
-        <a:scrgbClr r="0" g="0" b="0"/>
-      </a:effectRef>
-      <a:fontRef idx="minor"/>
-    </dgm:style>
-  </dgm:styleLbl>
-  <dgm:styleLbl name="fgAcc2">
-    <dgm:scene3d>
-      <a:camera prst="orthographicFront"/>
-      <a:lightRig rig="threePt" dir="t"/>
-    </dgm:scene3d>
-    <dgm:sp3d/>
-    <dgm:txPr/>
-    <dgm:style>
-      <a:lnRef idx="1">
-        <a:scrgbClr r="0" g="0" b="0"/>
-      </a:lnRef>
-      <a:fillRef idx="1">
-        <a:scrgbClr r="0" g="0" b="0"/>
-      </a:fillRef>
-      <a:effectRef idx="0">
-        <a:scrgbClr r="0" g="0" b="0"/>
-      </a:effectRef>
-      <a:fontRef idx="minor"/>
-    </dgm:style>
-  </dgm:styleLbl>
-  <dgm:styleLbl name="fgAcc3">
-    <dgm:scene3d>
-      <a:camera prst="orthographicFront"/>
-      <a:lightRig rig="threePt" dir="t"/>
-    </dgm:scene3d>
-    <dgm:sp3d/>
-    <dgm:txPr/>
-    <dgm:style>
-      <a:lnRef idx="1">
-        <a:scrgbClr r="0" g="0" b="0"/>
-      </a:lnRef>
-      <a:fillRef idx="1">
-        <a:scrgbClr r="0" g="0" b="0"/>
-      </a:fillRef>
-      <a:effectRef idx="0">
-        <a:scrgbClr r="0" g="0" b="0"/>
-      </a:effectRef>
-      <a:fontRef idx="minor"/>
-    </dgm:style>
-  </dgm:styleLbl>
-  <dgm:styleLbl name="fgAcc4">
-    <dgm:scene3d>
-      <a:camera prst="orthographicFront"/>
-      <a:lightRig rig="threePt" dir="t"/>
-    </dgm:scene3d>
-    <dgm:sp3d/>
-    <dgm:txPr/>
-    <dgm:style>
-      <a:lnRef idx="1">
-        <a:scrgbClr r="0" g="0" b="0"/>
-      </a:lnRef>
-      <a:fillRef idx="1">
-        <a:scrgbClr r="0" g="0" b="0"/>
-      </a:fillRef>
-      <a:effectRef idx="0">
-        <a:scrgbClr r="0" g="0" b="0"/>
-      </a:effectRef>
-      <a:fontRef idx="minor"/>
-    </dgm:style>
-  </dgm:styleLbl>
-  <dgm:styleLbl name="bgShp">
-    <dgm:scene3d>
-      <a:camera prst="orthographicFront"/>
-      <a:lightRig rig="threePt" dir="t"/>
-    </dgm:scene3d>
-    <dgm:sp3d/>
-    <dgm:txPr/>
-    <dgm:style>
-      <a:lnRef idx="0">
-        <a:scrgbClr r="0" g="0" b="0"/>
-      </a:lnRef>
-      <a:fillRef idx="1">
-        <a:scrgbClr r="0" g="0" b="0"/>
-      </a:fillRef>
-      <a:effectRef idx="2">
-        <a:scrgbClr r="0" g="0" b="0"/>
-      </a:effectRef>
-      <a:fontRef idx="minor"/>
-    </dgm:style>
-  </dgm:styleLbl>
-  <dgm:styleLbl name="dkBgShp">
-    <dgm:scene3d>
-      <a:camera prst="orthographicFront"/>
-      <a:lightRig rig="threePt" dir="t"/>
-    </dgm:scene3d>
-    <dgm:sp3d/>
-    <dgm:txPr/>
-    <dgm:style>
-      <a:lnRef idx="0">
-        <a:scrgbClr r="0" g="0" b="0"/>
-      </a:lnRef>
-      <a:fillRef idx="1">
-        <a:scrgbClr r="0" g="0" b="0"/>
-      </a:fillRef>
-      <a:effectRef idx="2">
-        <a:scrgbClr r="0" g="0" b="0"/>
-      </a:effectRef>
-      <a:fontRef idx="minor"/>
-    </dgm:style>
-  </dgm:styleLbl>
-  <dgm:styleLbl name="trBgShp">
-    <dgm:scene3d>
-      <a:camera prst="orthographicFront"/>
-      <a:lightRig rig="threePt" dir="t"/>
-    </dgm:scene3d>
-    <dgm:sp3d/>
-    <dgm:txPr/>
-    <dgm:style>
-      <a:lnRef idx="0">
-        <a:scrgbClr r="0" g="0" b="0"/>
-      </a:lnRef>
-      <a:fillRef idx="1">
-        <a:scrgbClr r="0" g="0" b="0"/>
-      </a:fillRef>
-      <a:effectRef idx="0">
-        <a:scrgbClr r="0" g="0" b="0"/>
-      </a:effectRef>
-      <a:fontRef idx="minor"/>
-    </dgm:style>
-  </dgm:styleLbl>
-  <dgm:styleLbl name="fgShp">
-    <dgm:scene3d>
-      <a:camera prst="orthographicFront"/>
-      <a:lightRig rig="threePt" dir="t"/>
-    </dgm:scene3d>
-    <dgm:sp3d/>
-    <dgm:txPr/>
-    <dgm:style>
-      <a:lnRef idx="0">
-        <a:scrgbClr r="0" g="0" b="0"/>
-      </a:lnRef>
-      <a:fillRef idx="3">
-        <a:scrgbClr r="0" g="0" b="0"/>
-      </a:fillRef>
-      <a:effectRef idx="2">
         <a:scrgbClr r="0" g="0" b="0"/>
       </a:effectRef>
       <a:fontRef idx="minor"/>
@@ -12715,690 +9659,6 @@
 <file path=ppt/slides/slide3.xml><?xml version="1.0" encoding="utf-8"?>
 <p:sld xmlns:a="http://schemas.openxmlformats.org/drawingml/2006/main" xmlns:r="http://schemas.openxmlformats.org/officeDocument/2006/relationships" xmlns:p="http://schemas.openxmlformats.org/presentationml/2006/main">
   <p:cSld>
-    <p:bg>
-      <p:bgPr>
-        <a:solidFill>
-          <a:schemeClr val="bg1"/>
-        </a:solidFill>
-        <a:effectLst/>
-      </p:bgPr>
-    </p:bg>
-    <p:spTree>
-      <p:nvGrpSpPr>
-        <p:cNvPr id="1" name=""/>
-        <p:cNvGrpSpPr/>
-        <p:nvPr/>
-      </p:nvGrpSpPr>
-      <p:grpSpPr>
-        <a:xfrm>
-          <a:off x="0" y="0"/>
-          <a:ext cx="0" cy="0"/>
-          <a:chOff x="0" y="0"/>
-          <a:chExt cx="0" cy="0"/>
-        </a:xfrm>
-      </p:grpSpPr>
-      <p:pic>
-        <p:nvPicPr>
-          <p:cNvPr id="8" name="Picture 6" descr="Remote Sensing | Free Full-Text | Building Extraction from Very ...">
-            <a:extLst>
-              <a:ext uri="{FF2B5EF4-FFF2-40B4-BE49-F238E27FC236}">
-                <a16:creationId xmlns:a16="http://schemas.microsoft.com/office/drawing/2014/main" id="{310EE5C2-183D-40C6-B291-798C2EDEF4C1}"/>
-              </a:ext>
-            </a:extLst>
-          </p:cNvPr>
-          <p:cNvPicPr>
-            <a:picLocks noChangeAspect="1" noChangeArrowheads="1"/>
-          </p:cNvPicPr>
-          <p:nvPr/>
-        </p:nvPicPr>
-        <p:blipFill rotWithShape="1">
-          <a:blip r:embed="rId2">
-            <a:duotone>
-              <a:prstClr val="black"/>
-              <a:schemeClr val="tx2">
-                <a:tint val="45000"/>
-                <a:satMod val="400000"/>
-              </a:schemeClr>
-            </a:duotone>
-            <a:alphaModFix amt="35000"/>
-            <a:extLst>
-              <a:ext uri="{28A0092B-C50C-407E-A947-70E740481C1C}">
-                <a14:useLocalDpi xmlns:a14="http://schemas.microsoft.com/office/drawing/2010/main" val="0"/>
-              </a:ext>
-            </a:extLst>
-          </a:blip>
-          <a:srcRect l="12863" r="-1" b="-1"/>
-          <a:stretch/>
-        </p:blipFill>
-        <p:spPr bwMode="auto">
-          <a:xfrm>
-            <a:off x="-7" y="-8"/>
-            <a:ext cx="12192000" cy="6855958"/>
-          </a:xfrm>
-          <a:prstGeom prst="rect">
-            <a:avLst/>
-          </a:prstGeom>
-          <a:noFill/>
-          <a:extLst>
-            <a:ext uri="{909E8E84-426E-40DD-AFC4-6F175D3DCCD1}">
-              <a14:hiddenFill xmlns:a14="http://schemas.microsoft.com/office/drawing/2010/main">
-                <a:solidFill>
-                  <a:srgbClr val="FFFFFF"/>
-                </a:solidFill>
-              </a14:hiddenFill>
-            </a:ext>
-          </a:extLst>
-        </p:spPr>
-      </p:pic>
-      <p:sp>
-        <p:nvSpPr>
-          <p:cNvPr id="2" name="Title 1">
-            <a:extLst>
-              <a:ext uri="{FF2B5EF4-FFF2-40B4-BE49-F238E27FC236}">
-                <a16:creationId xmlns:a16="http://schemas.microsoft.com/office/drawing/2014/main" id="{79F50C27-1C5A-4A28-8F2D-EF5D41151ADE}"/>
-              </a:ext>
-            </a:extLst>
-          </p:cNvPr>
-          <p:cNvSpPr>
-            <a:spLocks noGrp="1"/>
-          </p:cNvSpPr>
-          <p:nvPr>
-            <p:ph type="title"/>
-          </p:nvPr>
-        </p:nvSpPr>
-        <p:spPr>
-          <a:xfrm>
-            <a:off x="0" y="1381700"/>
-            <a:ext cx="8389083" cy="1325563"/>
-          </a:xfrm>
-          <a:effectLst>
-            <a:softEdge rad="114300"/>
-          </a:effectLst>
-        </p:spPr>
-        <p:style>
-          <a:lnRef idx="2">
-            <a:schemeClr val="accent6"/>
-          </a:lnRef>
-          <a:fillRef idx="1">
-            <a:schemeClr val="lt1"/>
-          </a:fillRef>
-          <a:effectRef idx="0">
-            <a:schemeClr val="accent6"/>
-          </a:effectRef>
-          <a:fontRef idx="minor">
-            <a:schemeClr val="dk1"/>
-          </a:fontRef>
-        </p:style>
-        <p:txBody>
-          <a:bodyPr>
-            <a:normAutofit fontScale="90000"/>
-          </a:bodyPr>
-          <a:lstStyle/>
-          <a:p>
-            <a:r>
-              <a:rPr lang="en-GB" sz="4800" dirty="0"/>
-              <a:t>Localised k-means label separation</a:t>
-            </a:r>
-          </a:p>
-        </p:txBody>
-      </p:sp>
-      <p:sp>
-        <p:nvSpPr>
-          <p:cNvPr id="14" name="Freeform: Shape 13">
-            <a:extLst>
-              <a:ext uri="{FF2B5EF4-FFF2-40B4-BE49-F238E27FC236}">
-                <a16:creationId xmlns:a16="http://schemas.microsoft.com/office/drawing/2014/main" id="{86B8807B-7828-4E42-86D6-939A5397D890}"/>
-              </a:ext>
-              <a:ext uri="{C183D7F6-B498-43B3-948B-1728B52AA6E4}">
-                <adec:decorative xmlns:adec="http://schemas.microsoft.com/office/drawing/2017/decorative" val="1"/>
-              </a:ext>
-            </a:extLst>
-          </p:cNvPr>
-          <p:cNvSpPr>
-            <a:spLocks noGrp="1" noRot="1" noChangeAspect="1" noMove="1" noResize="1" noEditPoints="1" noAdjustHandles="1" noChangeArrowheads="1" noChangeShapeType="1" noTextEdit="1"/>
-          </p:cNvSpPr>
-          <p:nvPr>
-            <p:extLst>
-              <p:ext uri="{386F3935-93C4-4BCD-93E2-E3B085C9AB24}">
-                <p16:designElem xmlns:p16="http://schemas.microsoft.com/office/powerpoint/2015/main" val="1"/>
-              </p:ext>
-            </p:extLst>
-          </p:nvPr>
-        </p:nvSpPr>
-        <p:spPr>
-          <a:xfrm>
-            <a:off x="7525108" y="-2055"/>
-            <a:ext cx="4666892" cy="3481643"/>
-          </a:xfrm>
-          <a:custGeom>
-            <a:avLst/>
-            <a:gdLst>
-              <a:gd name="connsiteX0" fmla="*/ 144173 w 4666892"/>
-              <a:gd name="connsiteY0" fmla="*/ 0 h 3481643"/>
-              <a:gd name="connsiteX1" fmla="*/ 4666892 w 4666892"/>
-              <a:gd name="connsiteY1" fmla="*/ 0 h 3481643"/>
-              <a:gd name="connsiteX2" fmla="*/ 4666892 w 4666892"/>
-              <a:gd name="connsiteY2" fmla="*/ 2512390 h 3481643"/>
-              <a:gd name="connsiteX3" fmla="*/ 4657487 w 4666892"/>
-              <a:gd name="connsiteY3" fmla="*/ 2524968 h 3481643"/>
-              <a:gd name="connsiteX4" fmla="*/ 2628900 w 4666892"/>
-              <a:gd name="connsiteY4" fmla="*/ 3481643 h 3481643"/>
-              <a:gd name="connsiteX5" fmla="*/ 0 w 4666892"/>
-              <a:gd name="connsiteY5" fmla="*/ 852743 h 3481643"/>
-              <a:gd name="connsiteX6" fmla="*/ 118190 w 4666892"/>
-              <a:gd name="connsiteY6" fmla="*/ 70989 h 3481643"/>
-            </a:gdLst>
-            <a:ahLst/>
-            <a:cxnLst>
-              <a:cxn ang="0">
-                <a:pos x="connsiteX0" y="connsiteY0"/>
-              </a:cxn>
-              <a:cxn ang="0">
-                <a:pos x="connsiteX1" y="connsiteY1"/>
-              </a:cxn>
-              <a:cxn ang="0">
-                <a:pos x="connsiteX2" y="connsiteY2"/>
-              </a:cxn>
-              <a:cxn ang="0">
-                <a:pos x="connsiteX3" y="connsiteY3"/>
-              </a:cxn>
-              <a:cxn ang="0">
-                <a:pos x="connsiteX4" y="connsiteY4"/>
-              </a:cxn>
-              <a:cxn ang="0">
-                <a:pos x="connsiteX5" y="connsiteY5"/>
-              </a:cxn>
-              <a:cxn ang="0">
-                <a:pos x="connsiteX6" y="connsiteY6"/>
-              </a:cxn>
-            </a:cxnLst>
-            <a:rect l="l" t="t" r="r" b="b"/>
-            <a:pathLst>
-              <a:path w="4666892" h="3481643">
-                <a:moveTo>
-                  <a:pt x="144173" y="0"/>
-                </a:moveTo>
-                <a:lnTo>
-                  <a:pt x="4666892" y="0"/>
-                </a:lnTo>
-                <a:lnTo>
-                  <a:pt x="4666892" y="2512390"/>
-                </a:lnTo>
-                <a:lnTo>
-                  <a:pt x="4657487" y="2524968"/>
-                </a:lnTo>
-                <a:cubicBezTo>
-                  <a:pt x="4175308" y="3109233"/>
-                  <a:pt x="3445594" y="3481643"/>
-                  <a:pt x="2628900" y="3481643"/>
-                </a:cubicBezTo>
-                <a:cubicBezTo>
-                  <a:pt x="1176999" y="3481643"/>
-                  <a:pt x="0" y="2304644"/>
-                  <a:pt x="0" y="852743"/>
-                </a:cubicBezTo>
-                <a:cubicBezTo>
-                  <a:pt x="0" y="580512"/>
-                  <a:pt x="41379" y="317945"/>
-                  <a:pt x="118190" y="70989"/>
-                </a:cubicBezTo>
-                <a:close/>
-              </a:path>
-            </a:pathLst>
-          </a:custGeom>
-          <a:solidFill>
-            <a:srgbClr val="FFFFFF">
-              <a:alpha val="90000"/>
-            </a:srgbClr>
-          </a:solidFill>
-          <a:ln>
-            <a:noFill/>
-          </a:ln>
-        </p:spPr>
-        <p:style>
-          <a:lnRef idx="2">
-            <a:schemeClr val="accent1">
-              <a:shade val="50000"/>
-            </a:schemeClr>
-          </a:lnRef>
-          <a:fillRef idx="1">
-            <a:schemeClr val="accent1"/>
-          </a:fillRef>
-          <a:effectRef idx="0">
-            <a:schemeClr val="accent1"/>
-          </a:effectRef>
-          <a:fontRef idx="minor">
-            <a:schemeClr val="lt1"/>
-          </a:fontRef>
-        </p:style>
-        <p:txBody>
-          <a:bodyPr wrap="square" rtlCol="0" anchor="ctr">
-            <a:noAutofit/>
-          </a:bodyPr>
-          <a:lstStyle/>
-          <a:p>
-            <a:pPr marL="0" marR="0" lvl="0" indent="0" algn="ctr" defTabSz="914400" rtl="0" eaLnBrk="1" fontAlgn="auto" latinLnBrk="0" hangingPunct="1">
-              <a:lnSpc>
-                <a:spcPct val="100000"/>
-              </a:lnSpc>
-              <a:spcBef>
-                <a:spcPts val="0"/>
-              </a:spcBef>
-              <a:spcAft>
-                <a:spcPts val="0"/>
-              </a:spcAft>
-              <a:buClrTx/>
-              <a:buSzTx/>
-              <a:buFontTx/>
-              <a:buNone/>
-              <a:tabLst/>
-              <a:defRPr/>
-            </a:pPr>
-            <a:endParaRPr kumimoji="0" lang="en-US" sz="1800" b="0" i="0" u="none" strike="noStrike" kern="1200" cap="none" spc="0" normalizeH="0" baseline="0" noProof="0">
-              <a:ln>
-                <a:noFill/>
-              </a:ln>
-              <a:solidFill>
-                <a:prstClr val="white"/>
-              </a:solidFill>
-              <a:effectLst/>
-              <a:uLnTx/>
-              <a:uFillTx/>
-              <a:latin typeface="Calibri" panose="020F0502020204030204"/>
-              <a:ea typeface="+mn-ea"/>
-              <a:cs typeface="+mn-cs"/>
-            </a:endParaRPr>
-          </a:p>
-        </p:txBody>
-      </p:sp>
-      <p:pic>
-        <p:nvPicPr>
-          <p:cNvPr id="7" name="Picture 4">
-            <a:extLst>
-              <a:ext uri="{FF2B5EF4-FFF2-40B4-BE49-F238E27FC236}">
-                <a16:creationId xmlns:a16="http://schemas.microsoft.com/office/drawing/2014/main" id="{050D1006-5306-4554-908D-C886D782852B}"/>
-              </a:ext>
-            </a:extLst>
-          </p:cNvPr>
-          <p:cNvPicPr>
-            <a:picLocks noChangeAspect="1" noChangeArrowheads="1"/>
-          </p:cNvPicPr>
-          <p:nvPr/>
-        </p:nvPicPr>
-        <p:blipFill rotWithShape="1">
-          <a:blip r:embed="rId3">
-            <a:extLst>
-              <a:ext uri="{28A0092B-C50C-407E-A947-70E740481C1C}">
-                <a14:useLocalDpi xmlns:a14="http://schemas.microsoft.com/office/drawing/2010/main" val="0"/>
-              </a:ext>
-            </a:extLst>
-          </a:blip>
-          <a:srcRect t="10291" b="16404"/>
-          <a:stretch/>
-        </p:blipFill>
-        <p:spPr bwMode="auto">
-          <a:xfrm>
-            <a:off x="7689829" y="-2055"/>
-            <a:ext cx="4502173" cy="3316924"/>
-          </a:xfrm>
-          <a:custGeom>
-            <a:avLst/>
-            <a:gdLst/>
-            <a:ahLst/>
-            <a:cxnLst/>
-            <a:rect l="l" t="t" r="r" b="b"/>
-            <a:pathLst>
-              <a:path w="4502173" h="3316924">
-                <a:moveTo>
-                  <a:pt x="154695" y="0"/>
-                </a:moveTo>
-                <a:lnTo>
-                  <a:pt x="4502173" y="0"/>
-                </a:lnTo>
-                <a:lnTo>
-                  <a:pt x="4502173" y="2237639"/>
-                </a:lnTo>
-                <a:lnTo>
-                  <a:pt x="4365663" y="2420191"/>
-                </a:lnTo>
-                <a:cubicBezTo>
-                  <a:pt x="3913696" y="2967849"/>
-                  <a:pt x="3229704" y="3316924"/>
-                  <a:pt x="2464181" y="3316924"/>
-                </a:cubicBezTo>
-                <a:cubicBezTo>
-                  <a:pt x="1103251" y="3316924"/>
-                  <a:pt x="0" y="2213673"/>
-                  <a:pt x="0" y="852743"/>
-                </a:cubicBezTo>
-                <a:cubicBezTo>
-                  <a:pt x="0" y="597569"/>
-                  <a:pt x="38787" y="351454"/>
-                  <a:pt x="110786" y="119971"/>
-                </a:cubicBezTo>
-                <a:close/>
-              </a:path>
-            </a:pathLst>
-          </a:custGeom>
-          <a:solidFill>
-            <a:srgbClr val="FFFFFF"/>
-          </a:solidFill>
-          <a:scene3d>
-            <a:camera prst="orthographicFront"/>
-            <a:lightRig rig="threePt" dir="t">
-              <a:rot lat="0" lon="0" rev="2700000"/>
-            </a:lightRig>
-          </a:scene3d>
-          <a:sp3d>
-            <a:bevelT h="38100"/>
-            <a:contourClr>
-              <a:srgbClr val="C0C0C0"/>
-            </a:contourClr>
-          </a:sp3d>
-        </p:spPr>
-      </p:pic>
-      <p:sp>
-        <p:nvSpPr>
-          <p:cNvPr id="16" name="Freeform: Shape 15">
-            <a:extLst>
-              <a:ext uri="{FF2B5EF4-FFF2-40B4-BE49-F238E27FC236}">
-                <a16:creationId xmlns:a16="http://schemas.microsoft.com/office/drawing/2014/main" id="{648F5915-2CE1-4F74-88C5-D4366893D2DF}"/>
-              </a:ext>
-              <a:ext uri="{C183D7F6-B498-43B3-948B-1728B52AA6E4}">
-                <adec:decorative xmlns:adec="http://schemas.microsoft.com/office/drawing/2017/decorative" val="1"/>
-              </a:ext>
-            </a:extLst>
-          </p:cNvPr>
-          <p:cNvSpPr>
-            <a:spLocks noGrp="1" noRot="1" noChangeAspect="1" noMove="1" noResize="1" noEditPoints="1" noAdjustHandles="1" noChangeArrowheads="1" noChangeShapeType="1" noTextEdit="1"/>
-          </p:cNvSpPr>
-          <p:nvPr>
-            <p:extLst>
-              <p:ext uri="{386F3935-93C4-4BCD-93E2-E3B085C9AB24}">
-                <p16:designElem xmlns:p16="http://schemas.microsoft.com/office/powerpoint/2015/main" val="1"/>
-              </p:ext>
-            </p:extLst>
-          </p:nvPr>
-        </p:nvSpPr>
-        <p:spPr>
-          <a:xfrm>
-            <a:off x="8604737" y="3918051"/>
-            <a:ext cx="3587263" cy="2939948"/>
-          </a:xfrm>
-          <a:custGeom>
-            <a:avLst/>
-            <a:gdLst>
-              <a:gd name="connsiteX0" fmla="*/ 2070613 w 3587263"/>
-              <a:gd name="connsiteY0" fmla="*/ 0 h 2939948"/>
-              <a:gd name="connsiteX1" fmla="*/ 3534758 w 3587263"/>
-              <a:gd name="connsiteY1" fmla="*/ 606469 h 2939948"/>
-              <a:gd name="connsiteX2" fmla="*/ 3587263 w 3587263"/>
-              <a:gd name="connsiteY2" fmla="*/ 664240 h 2939948"/>
-              <a:gd name="connsiteX3" fmla="*/ 3587263 w 3587263"/>
-              <a:gd name="connsiteY3" fmla="*/ 2939948 h 2939948"/>
-              <a:gd name="connsiteX4" fmla="*/ 193241 w 3587263"/>
-              <a:gd name="connsiteY4" fmla="*/ 2939948 h 2939948"/>
-              <a:gd name="connsiteX5" fmla="*/ 162719 w 3587263"/>
-              <a:gd name="connsiteY5" fmla="*/ 2876589 h 2939948"/>
-              <a:gd name="connsiteX6" fmla="*/ 0 w 3587263"/>
-              <a:gd name="connsiteY6" fmla="*/ 2070613 h 2939948"/>
-              <a:gd name="connsiteX7" fmla="*/ 2070613 w 3587263"/>
-              <a:gd name="connsiteY7" fmla="*/ 0 h 2939948"/>
-            </a:gdLst>
-            <a:ahLst/>
-            <a:cxnLst>
-              <a:cxn ang="0">
-                <a:pos x="connsiteX0" y="connsiteY0"/>
-              </a:cxn>
-              <a:cxn ang="0">
-                <a:pos x="connsiteX1" y="connsiteY1"/>
-              </a:cxn>
-              <a:cxn ang="0">
-                <a:pos x="connsiteX2" y="connsiteY2"/>
-              </a:cxn>
-              <a:cxn ang="0">
-                <a:pos x="connsiteX3" y="connsiteY3"/>
-              </a:cxn>
-              <a:cxn ang="0">
-                <a:pos x="connsiteX4" y="connsiteY4"/>
-              </a:cxn>
-              <a:cxn ang="0">
-                <a:pos x="connsiteX5" y="connsiteY5"/>
-              </a:cxn>
-              <a:cxn ang="0">
-                <a:pos x="connsiteX6" y="connsiteY6"/>
-              </a:cxn>
-              <a:cxn ang="0">
-                <a:pos x="connsiteX7" y="connsiteY7"/>
-              </a:cxn>
-            </a:cxnLst>
-            <a:rect l="l" t="t" r="r" b="b"/>
-            <a:pathLst>
-              <a:path w="3587263" h="2939948">
-                <a:moveTo>
-                  <a:pt x="2070613" y="0"/>
-                </a:moveTo>
-                <a:cubicBezTo>
-                  <a:pt x="2642397" y="0"/>
-                  <a:pt x="3160050" y="231761"/>
-                  <a:pt x="3534758" y="606469"/>
-                </a:cubicBezTo>
-                <a:lnTo>
-                  <a:pt x="3587263" y="664240"/>
-                </a:lnTo>
-                <a:lnTo>
-                  <a:pt x="3587263" y="2939948"/>
-                </a:lnTo>
-                <a:lnTo>
-                  <a:pt x="193241" y="2939948"/>
-                </a:lnTo>
-                <a:lnTo>
-                  <a:pt x="162719" y="2876589"/>
-                </a:lnTo>
-                <a:cubicBezTo>
-                  <a:pt x="57940" y="2628865"/>
-                  <a:pt x="0" y="2356505"/>
-                  <a:pt x="0" y="2070613"/>
-                </a:cubicBezTo>
-                <a:cubicBezTo>
-                  <a:pt x="0" y="927045"/>
-                  <a:pt x="927045" y="0"/>
-                  <a:pt x="2070613" y="0"/>
-                </a:cubicBezTo>
-                <a:close/>
-              </a:path>
-            </a:pathLst>
-          </a:custGeom>
-          <a:solidFill>
-            <a:srgbClr val="FFFFFF">
-              <a:alpha val="90000"/>
-            </a:srgbClr>
-          </a:solidFill>
-          <a:ln>
-            <a:noFill/>
-          </a:ln>
-        </p:spPr>
-        <p:style>
-          <a:lnRef idx="2">
-            <a:schemeClr val="accent1">
-              <a:shade val="50000"/>
-            </a:schemeClr>
-          </a:lnRef>
-          <a:fillRef idx="1">
-            <a:schemeClr val="accent1"/>
-          </a:fillRef>
-          <a:effectRef idx="0">
-            <a:schemeClr val="accent1"/>
-          </a:effectRef>
-          <a:fontRef idx="minor">
-            <a:schemeClr val="lt1"/>
-          </a:fontRef>
-        </p:style>
-        <p:txBody>
-          <a:bodyPr rtlCol="0" anchor="ctr"/>
-          <a:lstStyle/>
-          <a:p>
-            <a:pPr marL="0" marR="0" lvl="0" indent="0" algn="ctr" defTabSz="914400" rtl="0" eaLnBrk="1" fontAlgn="auto" latinLnBrk="0" hangingPunct="1">
-              <a:lnSpc>
-                <a:spcPct val="100000"/>
-              </a:lnSpc>
-              <a:spcBef>
-                <a:spcPts val="0"/>
-              </a:spcBef>
-              <a:spcAft>
-                <a:spcPts val="0"/>
-              </a:spcAft>
-              <a:buClrTx/>
-              <a:buSzTx/>
-              <a:buFontTx/>
-              <a:buNone/>
-              <a:tabLst/>
-              <a:defRPr/>
-            </a:pPr>
-            <a:endParaRPr kumimoji="0" lang="en-US" sz="1800" b="0" i="0" u="none" strike="noStrike" kern="1200" cap="none" spc="0" normalizeH="0" baseline="0" noProof="0">
-              <a:ln>
-                <a:noFill/>
-              </a:ln>
-              <a:solidFill>
-                <a:prstClr val="white"/>
-              </a:solidFill>
-              <a:effectLst/>
-              <a:uLnTx/>
-              <a:uFillTx/>
-              <a:latin typeface="Calibri" panose="020F0502020204030204"/>
-              <a:ea typeface="+mn-ea"/>
-              <a:cs typeface="+mn-cs"/>
-            </a:endParaRPr>
-          </a:p>
-        </p:txBody>
-      </p:sp>
-      <p:pic>
-        <p:nvPicPr>
-          <p:cNvPr id="9" name="Picture 8" descr="A close up of a flower&#10;&#10;Description automatically generated">
-            <a:extLst>
-              <a:ext uri="{FF2B5EF4-FFF2-40B4-BE49-F238E27FC236}">
-                <a16:creationId xmlns:a16="http://schemas.microsoft.com/office/drawing/2014/main" id="{0349424E-A546-4D53-B746-ECB95B7E6430}"/>
-              </a:ext>
-            </a:extLst>
-          </p:cNvPr>
-          <p:cNvPicPr>
-            <a:picLocks noChangeAspect="1"/>
-          </p:cNvPicPr>
-          <p:nvPr/>
-        </p:nvPicPr>
-        <p:blipFill rotWithShape="1">
-          <a:blip r:embed="rId4"/>
-          <a:srcRect t="10849" r="1" b="8466"/>
-          <a:stretch/>
-        </p:blipFill>
-        <p:spPr>
-          <a:xfrm>
-            <a:off x="8768834" y="4082148"/>
-            <a:ext cx="3423175" cy="2775859"/>
-          </a:xfrm>
-          <a:custGeom>
-            <a:avLst/>
-            <a:gdLst/>
-            <a:ahLst/>
-            <a:cxnLst/>
-            <a:rect l="l" t="t" r="r" b="b"/>
-            <a:pathLst>
-              <a:path w="3423175" h="2775859">
-                <a:moveTo>
-                  <a:pt x="1906524" y="0"/>
-                </a:moveTo>
-                <a:cubicBezTo>
-                  <a:pt x="2498805" y="0"/>
-                  <a:pt x="3028006" y="270078"/>
-                  <a:pt x="3377691" y="693798"/>
-                </a:cubicBezTo>
-                <a:lnTo>
-                  <a:pt x="3423175" y="754624"/>
-                </a:lnTo>
-                <a:lnTo>
-                  <a:pt x="3423175" y="2775859"/>
-                </a:lnTo>
-                <a:lnTo>
-                  <a:pt x="211114" y="2775859"/>
-                </a:lnTo>
-                <a:lnTo>
-                  <a:pt x="149824" y="2648629"/>
-                </a:lnTo>
-                <a:cubicBezTo>
-                  <a:pt x="53349" y="2420536"/>
-                  <a:pt x="0" y="2169760"/>
-                  <a:pt x="0" y="1906524"/>
-                </a:cubicBezTo>
-                <a:cubicBezTo>
-                  <a:pt x="0" y="853580"/>
-                  <a:pt x="853580" y="0"/>
-                  <a:pt x="1906524" y="0"/>
-                </a:cubicBezTo>
-                <a:close/>
-              </a:path>
-            </a:pathLst>
-          </a:custGeom>
-          <a:solidFill>
-            <a:srgbClr val="FFFFFF"/>
-          </a:solidFill>
-          <a:scene3d>
-            <a:camera prst="orthographicFront"/>
-            <a:lightRig rig="threePt" dir="t">
-              <a:rot lat="0" lon="0" rev="2700000"/>
-            </a:lightRig>
-          </a:scene3d>
-          <a:sp3d>
-            <a:bevelT h="38100"/>
-            <a:contourClr>
-              <a:srgbClr val="C0C0C0"/>
-            </a:contourClr>
-          </a:sp3d>
-        </p:spPr>
-      </p:pic>
-      <p:graphicFrame>
-        <p:nvGraphicFramePr>
-          <p:cNvPr id="6" name="Diagram 5">
-            <a:extLst>
-              <a:ext uri="{FF2B5EF4-FFF2-40B4-BE49-F238E27FC236}">
-                <a16:creationId xmlns:a16="http://schemas.microsoft.com/office/drawing/2014/main" id="{3B0B4268-39D3-4984-9D3A-704156347604}"/>
-              </a:ext>
-            </a:extLst>
-          </p:cNvPr>
-          <p:cNvGraphicFramePr/>
-          <p:nvPr>
-            <p:extLst>
-              <p:ext uri="{D42A27DB-BD31-4B8C-83A1-F6EECF244321}">
-                <p14:modId xmlns:p14="http://schemas.microsoft.com/office/powerpoint/2010/main" val="1325644185"/>
-              </p:ext>
-            </p:extLst>
-          </p:nvPr>
-        </p:nvGraphicFramePr>
-        <p:xfrm>
-          <a:off x="805542" y="2871982"/>
-          <a:ext cx="6382657" cy="3181684"/>
-        </p:xfrm>
-        <a:graphic>
-          <a:graphicData uri="http://schemas.openxmlformats.org/drawingml/2006/diagram">
-            <dgm:relIds xmlns:dgm="http://schemas.openxmlformats.org/drawingml/2006/diagram" xmlns:r="http://schemas.openxmlformats.org/officeDocument/2006/relationships" r:dm="rId5" r:lo="rId6" r:qs="rId7" r:cs="rId8"/>
-          </a:graphicData>
-        </a:graphic>
-      </p:graphicFrame>
-    </p:spTree>
-    <p:extLst>
-      <p:ext uri="{BB962C8B-B14F-4D97-AF65-F5344CB8AC3E}">
-        <p14:creationId xmlns:p14="http://schemas.microsoft.com/office/powerpoint/2010/main" val="1555561054"/>
-      </p:ext>
-    </p:extLst>
-  </p:cSld>
-  <p:clrMapOvr>
-    <a:overrideClrMapping bg1="dk1" tx1="lt1" bg2="dk2" tx2="lt2" accent1="accent1" accent2="accent2" accent3="accent3" accent4="accent4" accent5="accent5" accent6="accent6" hlink="hlink" folHlink="folHlink"/>
-  </p:clrMapOvr>
-</p:sld>
-</file>
-
-<file path=ppt/slides/slide4.xml><?xml version="1.0" encoding="utf-8"?>
-<p:sld xmlns:a="http://schemas.openxmlformats.org/drawingml/2006/main" xmlns:r="http://schemas.openxmlformats.org/officeDocument/2006/relationships" xmlns:p="http://schemas.openxmlformats.org/presentationml/2006/main">
-  <p:cSld>
     <p:spTree>
       <p:nvGrpSpPr>
         <p:cNvPr id="1" name=""/>
@@ -13519,7 +9779,7 @@
 </p:sld>
 </file>
 
-<file path=ppt/slides/slide5.xml><?xml version="1.0" encoding="utf-8"?>
+<file path=ppt/slides/slide4.xml><?xml version="1.0" encoding="utf-8"?>
 <p:sld xmlns:a="http://schemas.openxmlformats.org/drawingml/2006/main" xmlns:r="http://schemas.openxmlformats.org/officeDocument/2006/relationships" xmlns:p="http://schemas.openxmlformats.org/presentationml/2006/main">
   <p:cSld>
     <p:spTree>
@@ -13687,7 +9947,7 @@
 </p:sld>
 </file>
 
-<file path=ppt/slides/slide6.xml><?xml version="1.0" encoding="utf-8"?>
+<file path=ppt/slides/slide5.xml><?xml version="1.0" encoding="utf-8"?>
 <p:sld xmlns:a="http://schemas.openxmlformats.org/drawingml/2006/main" xmlns:r="http://schemas.openxmlformats.org/officeDocument/2006/relationships" xmlns:p="http://schemas.openxmlformats.org/presentationml/2006/main">
   <p:cSld>
     <p:spTree>
@@ -13798,7 +10058,7 @@
 </p:sld>
 </file>
 
-<file path=ppt/slides/slide7.xml><?xml version="1.0" encoding="utf-8"?>
+<file path=ppt/slides/slide6.xml><?xml version="1.0" encoding="utf-8"?>
 <p:sld xmlns:a="http://schemas.openxmlformats.org/drawingml/2006/main" xmlns:r="http://schemas.openxmlformats.org/officeDocument/2006/relationships" xmlns:p="http://schemas.openxmlformats.org/presentationml/2006/main">
   <p:cSld>
     <p:spTree>
@@ -14537,6 +10797,1162 @@
 </p:sld>
 </file>
 
+<file path=ppt/slides/slide7.xml><?xml version="1.0" encoding="utf-8"?>
+<p:sld xmlns:a="http://schemas.openxmlformats.org/drawingml/2006/main" xmlns:r="http://schemas.openxmlformats.org/officeDocument/2006/relationships" xmlns:p="http://schemas.openxmlformats.org/presentationml/2006/main">
+  <p:cSld>
+    <p:bg>
+      <p:bgPr>
+        <a:solidFill>
+          <a:schemeClr val="bg1"/>
+        </a:solidFill>
+        <a:effectLst/>
+      </p:bgPr>
+    </p:bg>
+    <p:spTree>
+      <p:nvGrpSpPr>
+        <p:cNvPr id="1" name=""/>
+        <p:cNvGrpSpPr/>
+        <p:nvPr/>
+      </p:nvGrpSpPr>
+      <p:grpSpPr>
+        <a:xfrm>
+          <a:off x="0" y="0"/>
+          <a:ext cx="0" cy="0"/>
+          <a:chOff x="0" y="0"/>
+          <a:chExt cx="0" cy="0"/>
+        </a:xfrm>
+      </p:grpSpPr>
+      <p:sp>
+        <p:nvSpPr>
+          <p:cNvPr id="16" name="Freeform: Shape 18">
+            <a:extLst>
+              <a:ext uri="{FF2B5EF4-FFF2-40B4-BE49-F238E27FC236}">
+                <a16:creationId xmlns:a16="http://schemas.microsoft.com/office/drawing/2014/main" id="{F82BF3E2-EB0E-40D6-8835-2367A5316CA4}"/>
+              </a:ext>
+              <a:ext uri="{C183D7F6-B498-43B3-948B-1728B52AA6E4}">
+                <adec:decorative xmlns:adec="http://schemas.microsoft.com/office/drawing/2017/decorative" val="1"/>
+              </a:ext>
+            </a:extLst>
+          </p:cNvPr>
+          <p:cNvSpPr>
+            <a:spLocks noGrp="1" noRot="1" noChangeAspect="1" noMove="1" noResize="1" noEditPoints="1" noAdjustHandles="1" noChangeArrowheads="1" noChangeShapeType="1" noTextEdit="1"/>
+          </p:cNvSpPr>
+          <p:nvPr>
+            <p:extLst>
+              <p:ext uri="{386F3935-93C4-4BCD-93E2-E3B085C9AB24}">
+                <p16:designElem xmlns:p16="http://schemas.microsoft.com/office/powerpoint/2015/main" val="1"/>
+              </p:ext>
+            </p:extLst>
+          </p:nvPr>
+        </p:nvSpPr>
+        <p:spPr>
+          <a:xfrm>
+            <a:off x="6148480" y="1563968"/>
+            <a:ext cx="6043520" cy="5294033"/>
+          </a:xfrm>
+          <a:custGeom>
+            <a:avLst/>
+            <a:gdLst>
+              <a:gd name="connsiteX0" fmla="*/ 3600823 w 6043520"/>
+              <a:gd name="connsiteY0" fmla="*/ 0 h 5294033"/>
+              <a:gd name="connsiteX1" fmla="*/ 5891281 w 6043520"/>
+              <a:gd name="connsiteY1" fmla="*/ 822253 h 5294033"/>
+              <a:gd name="connsiteX2" fmla="*/ 6043520 w 6043520"/>
+              <a:gd name="connsiteY2" fmla="*/ 960617 h 5294033"/>
+              <a:gd name="connsiteX3" fmla="*/ 6043520 w 6043520"/>
+              <a:gd name="connsiteY3" fmla="*/ 5294033 h 5294033"/>
+              <a:gd name="connsiteX4" fmla="*/ 423445 w 6043520"/>
+              <a:gd name="connsiteY4" fmla="*/ 5294033 h 5294033"/>
+              <a:gd name="connsiteX5" fmla="*/ 282971 w 6043520"/>
+              <a:gd name="connsiteY5" fmla="*/ 5002426 h 5294033"/>
+              <a:gd name="connsiteX6" fmla="*/ 0 w 6043520"/>
+              <a:gd name="connsiteY6" fmla="*/ 3600823 h 5294033"/>
+              <a:gd name="connsiteX7" fmla="*/ 3600823 w 6043520"/>
+              <a:gd name="connsiteY7" fmla="*/ 0 h 5294033"/>
+            </a:gdLst>
+            <a:ahLst/>
+            <a:cxnLst>
+              <a:cxn ang="0">
+                <a:pos x="connsiteX0" y="connsiteY0"/>
+              </a:cxn>
+              <a:cxn ang="0">
+                <a:pos x="connsiteX1" y="connsiteY1"/>
+              </a:cxn>
+              <a:cxn ang="0">
+                <a:pos x="connsiteX2" y="connsiteY2"/>
+              </a:cxn>
+              <a:cxn ang="0">
+                <a:pos x="connsiteX3" y="connsiteY3"/>
+              </a:cxn>
+              <a:cxn ang="0">
+                <a:pos x="connsiteX4" y="connsiteY4"/>
+              </a:cxn>
+              <a:cxn ang="0">
+                <a:pos x="connsiteX5" y="connsiteY5"/>
+              </a:cxn>
+              <a:cxn ang="0">
+                <a:pos x="connsiteX6" y="connsiteY6"/>
+              </a:cxn>
+              <a:cxn ang="0">
+                <a:pos x="connsiteX7" y="connsiteY7"/>
+              </a:cxn>
+            </a:cxnLst>
+            <a:rect l="l" t="t" r="r" b="b"/>
+            <a:pathLst>
+              <a:path w="6043520" h="5294033">
+                <a:moveTo>
+                  <a:pt x="3600823" y="0"/>
+                </a:moveTo>
+                <a:cubicBezTo>
+                  <a:pt x="4470871" y="0"/>
+                  <a:pt x="5268847" y="308574"/>
+                  <a:pt x="5891281" y="822253"/>
+                </a:cubicBezTo>
+                <a:lnTo>
+                  <a:pt x="6043520" y="960617"/>
+                </a:lnTo>
+                <a:lnTo>
+                  <a:pt x="6043520" y="5294033"/>
+                </a:lnTo>
+                <a:lnTo>
+                  <a:pt x="423445" y="5294033"/>
+                </a:lnTo>
+                <a:lnTo>
+                  <a:pt x="282971" y="5002426"/>
+                </a:lnTo>
+                <a:cubicBezTo>
+                  <a:pt x="100759" y="4571630"/>
+                  <a:pt x="0" y="4097993"/>
+                  <a:pt x="0" y="3600823"/>
+                </a:cubicBezTo>
+                <a:cubicBezTo>
+                  <a:pt x="0" y="1612143"/>
+                  <a:pt x="1612143" y="0"/>
+                  <a:pt x="3600823" y="0"/>
+                </a:cubicBezTo>
+                <a:close/>
+              </a:path>
+            </a:pathLst>
+          </a:custGeom>
+          <a:solidFill>
+            <a:schemeClr val="tx1">
+              <a:lumMod val="75000"/>
+              <a:lumOff val="25000"/>
+            </a:schemeClr>
+          </a:solidFill>
+          <a:ln>
+            <a:noFill/>
+          </a:ln>
+        </p:spPr>
+        <p:style>
+          <a:lnRef idx="2">
+            <a:schemeClr val="accent1">
+              <a:shade val="50000"/>
+            </a:schemeClr>
+          </a:lnRef>
+          <a:fillRef idx="1">
+            <a:schemeClr val="accent1"/>
+          </a:fillRef>
+          <a:effectRef idx="0">
+            <a:schemeClr val="accent1"/>
+          </a:effectRef>
+          <a:fontRef idx="minor">
+            <a:schemeClr val="lt1"/>
+          </a:fontRef>
+        </p:style>
+        <p:txBody>
+          <a:bodyPr wrap="square" rtlCol="0" anchor="ctr">
+            <a:noAutofit/>
+          </a:bodyPr>
+          <a:lstStyle/>
+          <a:p>
+            <a:pPr marL="0" marR="0" lvl="0" indent="0" algn="ctr" defTabSz="914400" rtl="0" eaLnBrk="1" fontAlgn="auto" latinLnBrk="0" hangingPunct="1">
+              <a:lnSpc>
+                <a:spcPct val="100000"/>
+              </a:lnSpc>
+              <a:spcBef>
+                <a:spcPts val="0"/>
+              </a:spcBef>
+              <a:spcAft>
+                <a:spcPts val="0"/>
+              </a:spcAft>
+              <a:buClrTx/>
+              <a:buSzTx/>
+              <a:buFontTx/>
+              <a:buNone/>
+              <a:tabLst/>
+              <a:defRPr/>
+            </a:pPr>
+            <a:endParaRPr kumimoji="0" lang="en-US" sz="1800" b="0" i="0" u="none" strike="noStrike" kern="1200" cap="none" spc="0" normalizeH="0" baseline="0" noProof="0">
+              <a:ln>
+                <a:noFill/>
+              </a:ln>
+              <a:solidFill>
+                <a:prstClr val="white"/>
+              </a:solidFill>
+              <a:effectLst/>
+              <a:uLnTx/>
+              <a:uFillTx/>
+              <a:latin typeface="Calibri" panose="020F0502020204030204"/>
+              <a:ea typeface="+mn-ea"/>
+              <a:cs typeface="+mn-cs"/>
+            </a:endParaRPr>
+          </a:p>
+        </p:txBody>
+      </p:sp>
+      <p:sp useBgFill="1">
+        <p:nvSpPr>
+          <p:cNvPr id="21" name="Freeform: Shape 20">
+            <a:extLst>
+              <a:ext uri="{FF2B5EF4-FFF2-40B4-BE49-F238E27FC236}">
+                <a16:creationId xmlns:a16="http://schemas.microsoft.com/office/drawing/2014/main" id="{CB6FFAAC-8A48-4FBF-BAFE-BAD367694022}"/>
+              </a:ext>
+              <a:ext uri="{C183D7F6-B498-43B3-948B-1728B52AA6E4}">
+                <adec:decorative xmlns:adec="http://schemas.microsoft.com/office/drawing/2017/decorative" val="1"/>
+              </a:ext>
+            </a:extLst>
+          </p:cNvPr>
+          <p:cNvSpPr>
+            <a:spLocks noGrp="1" noRot="1" noChangeAspect="1" noMove="1" noResize="1" noEditPoints="1" noAdjustHandles="1" noChangeArrowheads="1" noChangeShapeType="1" noTextEdit="1"/>
+          </p:cNvSpPr>
+          <p:nvPr>
+            <p:extLst>
+              <p:ext uri="{386F3935-93C4-4BCD-93E2-E3B085C9AB24}">
+                <p16:designElem xmlns:p16="http://schemas.microsoft.com/office/powerpoint/2015/main" val="1"/>
+              </p:ext>
+            </p:extLst>
+          </p:nvPr>
+        </p:nvSpPr>
+        <p:spPr>
+          <a:xfrm>
+            <a:off x="6283728" y="1699214"/>
+            <a:ext cx="5908273" cy="5158786"/>
+          </a:xfrm>
+          <a:custGeom>
+            <a:avLst/>
+            <a:gdLst>
+              <a:gd name="connsiteX0" fmla="*/ 3465576 w 5908273"/>
+              <a:gd name="connsiteY0" fmla="*/ 0 h 5158786"/>
+              <a:gd name="connsiteX1" fmla="*/ 5670004 w 5908273"/>
+              <a:gd name="connsiteY1" fmla="*/ 791369 h 5158786"/>
+              <a:gd name="connsiteX2" fmla="*/ 5908273 w 5908273"/>
+              <a:gd name="connsiteY2" fmla="*/ 1007923 h 5158786"/>
+              <a:gd name="connsiteX3" fmla="*/ 5908273 w 5908273"/>
+              <a:gd name="connsiteY3" fmla="*/ 5158786 h 5158786"/>
+              <a:gd name="connsiteX4" fmla="*/ 443374 w 5908273"/>
+              <a:gd name="connsiteY4" fmla="*/ 5158786 h 5158786"/>
+              <a:gd name="connsiteX5" fmla="*/ 418277 w 5908273"/>
+              <a:gd name="connsiteY5" fmla="*/ 5117476 h 5158786"/>
+              <a:gd name="connsiteX6" fmla="*/ 0 w 5908273"/>
+              <a:gd name="connsiteY6" fmla="*/ 3465576 h 5158786"/>
+              <a:gd name="connsiteX7" fmla="*/ 3465576 w 5908273"/>
+              <a:gd name="connsiteY7" fmla="*/ 0 h 5158786"/>
+            </a:gdLst>
+            <a:ahLst/>
+            <a:cxnLst>
+              <a:cxn ang="0">
+                <a:pos x="connsiteX0" y="connsiteY0"/>
+              </a:cxn>
+              <a:cxn ang="0">
+                <a:pos x="connsiteX1" y="connsiteY1"/>
+              </a:cxn>
+              <a:cxn ang="0">
+                <a:pos x="connsiteX2" y="connsiteY2"/>
+              </a:cxn>
+              <a:cxn ang="0">
+                <a:pos x="connsiteX3" y="connsiteY3"/>
+              </a:cxn>
+              <a:cxn ang="0">
+                <a:pos x="connsiteX4" y="connsiteY4"/>
+              </a:cxn>
+              <a:cxn ang="0">
+                <a:pos x="connsiteX5" y="connsiteY5"/>
+              </a:cxn>
+              <a:cxn ang="0">
+                <a:pos x="connsiteX6" y="connsiteY6"/>
+              </a:cxn>
+              <a:cxn ang="0">
+                <a:pos x="connsiteX7" y="connsiteY7"/>
+              </a:cxn>
+            </a:cxnLst>
+            <a:rect l="l" t="t" r="r" b="b"/>
+            <a:pathLst>
+              <a:path w="5908273" h="5158786">
+                <a:moveTo>
+                  <a:pt x="3465576" y="0"/>
+                </a:moveTo>
+                <a:cubicBezTo>
+                  <a:pt x="4302945" y="0"/>
+                  <a:pt x="5070948" y="296984"/>
+                  <a:pt x="5670004" y="791369"/>
+                </a:cubicBezTo>
+                <a:lnTo>
+                  <a:pt x="5908273" y="1007923"/>
+                </a:lnTo>
+                <a:lnTo>
+                  <a:pt x="5908273" y="5158786"/>
+                </a:lnTo>
+                <a:lnTo>
+                  <a:pt x="443374" y="5158786"/>
+                </a:lnTo>
+                <a:lnTo>
+                  <a:pt x="418277" y="5117476"/>
+                </a:lnTo>
+                <a:cubicBezTo>
+                  <a:pt x="151523" y="4626427"/>
+                  <a:pt x="0" y="4063697"/>
+                  <a:pt x="0" y="3465576"/>
+                </a:cubicBezTo>
+                <a:cubicBezTo>
+                  <a:pt x="0" y="1551591"/>
+                  <a:pt x="1551591" y="0"/>
+                  <a:pt x="3465576" y="0"/>
+                </a:cubicBezTo>
+                <a:close/>
+              </a:path>
+            </a:pathLst>
+          </a:custGeom>
+          <a:ln>
+            <a:noFill/>
+          </a:ln>
+        </p:spPr>
+        <p:style>
+          <a:lnRef idx="2">
+            <a:schemeClr val="accent1">
+              <a:shade val="50000"/>
+            </a:schemeClr>
+          </a:lnRef>
+          <a:fillRef idx="1">
+            <a:schemeClr val="accent1"/>
+          </a:fillRef>
+          <a:effectRef idx="0">
+            <a:schemeClr val="accent1"/>
+          </a:effectRef>
+          <a:fontRef idx="minor">
+            <a:schemeClr val="lt1"/>
+          </a:fontRef>
+        </p:style>
+        <p:txBody>
+          <a:bodyPr wrap="square" rtlCol="0" anchor="ctr">
+            <a:noAutofit/>
+          </a:bodyPr>
+          <a:lstStyle/>
+          <a:p>
+            <a:pPr algn="ctr"/>
+            <a:endParaRPr lang="en-US"/>
+          </a:p>
+        </p:txBody>
+      </p:sp>
+      <p:sp>
+        <p:nvSpPr>
+          <p:cNvPr id="23" name="Oval 22">
+            <a:extLst>
+              <a:ext uri="{FF2B5EF4-FFF2-40B4-BE49-F238E27FC236}">
+                <a16:creationId xmlns:a16="http://schemas.microsoft.com/office/drawing/2014/main" id="{481E86DD-89E6-42B2-8675-84B7C56BFF7D}"/>
+              </a:ext>
+              <a:ext uri="{C183D7F6-B498-43B3-948B-1728B52AA6E4}">
+                <adec:decorative xmlns:adec="http://schemas.microsoft.com/office/drawing/2017/decorative" val="1"/>
+              </a:ext>
+            </a:extLst>
+          </p:cNvPr>
+          <p:cNvSpPr>
+            <a:spLocks noGrp="1" noRot="1" noChangeAspect="1" noMove="1" noResize="1" noEditPoints="1" noAdjustHandles="1" noChangeArrowheads="1" noChangeShapeType="1" noTextEdit="1"/>
+          </p:cNvSpPr>
+          <p:nvPr>
+            <p:extLst>
+              <p:ext uri="{386F3935-93C4-4BCD-93E2-E3B085C9AB24}">
+                <p16:designElem xmlns:p16="http://schemas.microsoft.com/office/powerpoint/2015/main" val="1"/>
+              </p:ext>
+            </p:extLst>
+          </p:nvPr>
+        </p:nvSpPr>
+        <p:spPr>
+          <a:xfrm>
+            <a:off x="3150534" y="1716727"/>
+            <a:ext cx="4572000" cy="4572000"/>
+          </a:xfrm>
+          <a:prstGeom prst="ellipse">
+            <a:avLst/>
+          </a:prstGeom>
+          <a:solidFill>
+            <a:schemeClr val="tx1">
+              <a:lumMod val="75000"/>
+              <a:lumOff val="25000"/>
+            </a:schemeClr>
+          </a:solidFill>
+          <a:ln>
+            <a:noFill/>
+          </a:ln>
+        </p:spPr>
+        <p:style>
+          <a:lnRef idx="2">
+            <a:schemeClr val="accent1">
+              <a:shade val="50000"/>
+            </a:schemeClr>
+          </a:lnRef>
+          <a:fillRef idx="1">
+            <a:schemeClr val="accent1"/>
+          </a:fillRef>
+          <a:effectRef idx="0">
+            <a:schemeClr val="accent1"/>
+          </a:effectRef>
+          <a:fontRef idx="minor">
+            <a:schemeClr val="lt1"/>
+          </a:fontRef>
+        </p:style>
+        <p:txBody>
+          <a:bodyPr rtlCol="0" anchor="ctr"/>
+          <a:lstStyle/>
+          <a:p>
+            <a:pPr marL="0" marR="0" lvl="0" indent="0" algn="ctr" defTabSz="914400" rtl="0" eaLnBrk="1" fontAlgn="auto" latinLnBrk="0" hangingPunct="1">
+              <a:lnSpc>
+                <a:spcPct val="100000"/>
+              </a:lnSpc>
+              <a:spcBef>
+                <a:spcPts val="0"/>
+              </a:spcBef>
+              <a:spcAft>
+                <a:spcPts val="0"/>
+              </a:spcAft>
+              <a:buClrTx/>
+              <a:buSzTx/>
+              <a:buFontTx/>
+              <a:buNone/>
+              <a:tabLst/>
+              <a:defRPr/>
+            </a:pPr>
+            <a:endParaRPr kumimoji="0" lang="en-US" sz="1800" b="0" i="0" u="none" strike="noStrike" kern="1200" cap="none" spc="0" normalizeH="0" baseline="0" noProof="0">
+              <a:ln>
+                <a:noFill/>
+              </a:ln>
+              <a:solidFill>
+                <a:prstClr val="white"/>
+              </a:solidFill>
+              <a:effectLst/>
+              <a:uLnTx/>
+              <a:uFillTx/>
+              <a:latin typeface="Calibri" panose="020F0502020204030204"/>
+              <a:ea typeface="+mn-ea"/>
+              <a:cs typeface="+mn-cs"/>
+            </a:endParaRPr>
+          </a:p>
+        </p:txBody>
+      </p:sp>
+      <p:sp useBgFill="1">
+        <p:nvSpPr>
+          <p:cNvPr id="25" name="Freeform: Shape 24">
+            <a:extLst>
+              <a:ext uri="{FF2B5EF4-FFF2-40B4-BE49-F238E27FC236}">
+                <a16:creationId xmlns:a16="http://schemas.microsoft.com/office/drawing/2014/main" id="{440EF577-B6F8-4C57-B956-AB860B388EB8}"/>
+              </a:ext>
+              <a:ext uri="{C183D7F6-B498-43B3-948B-1728B52AA6E4}">
+                <adec:decorative xmlns:adec="http://schemas.microsoft.com/office/drawing/2017/decorative" val="1"/>
+              </a:ext>
+            </a:extLst>
+          </p:cNvPr>
+          <p:cNvSpPr>
+            <a:spLocks noGrp="1" noRot="1" noChangeAspect="1" noMove="1" noResize="1" noEditPoints="1" noAdjustHandles="1" noChangeArrowheads="1" noChangeShapeType="1" noTextEdit="1"/>
+          </p:cNvSpPr>
+          <p:nvPr>
+            <p:extLst>
+              <p:ext uri="{386F3935-93C4-4BCD-93E2-E3B085C9AB24}">
+                <p16:designElem xmlns:p16="http://schemas.microsoft.com/office/powerpoint/2015/main" val="1"/>
+              </p:ext>
+            </p:extLst>
+          </p:nvPr>
+        </p:nvSpPr>
+        <p:spPr>
+          <a:xfrm>
+            <a:off x="3287694" y="1853886"/>
+            <a:ext cx="4297680" cy="4297680"/>
+          </a:xfrm>
+          <a:custGeom>
+            <a:avLst/>
+            <a:gdLst>
+              <a:gd name="connsiteX0" fmla="*/ 2148840 w 4297680"/>
+              <a:gd name="connsiteY0" fmla="*/ 0 h 4297680"/>
+              <a:gd name="connsiteX1" fmla="*/ 4297680 w 4297680"/>
+              <a:gd name="connsiteY1" fmla="*/ 2148840 h 4297680"/>
+              <a:gd name="connsiteX2" fmla="*/ 2148840 w 4297680"/>
+              <a:gd name="connsiteY2" fmla="*/ 4297680 h 4297680"/>
+              <a:gd name="connsiteX3" fmla="*/ 0 w 4297680"/>
+              <a:gd name="connsiteY3" fmla="*/ 2148840 h 4297680"/>
+              <a:gd name="connsiteX4" fmla="*/ 2148840 w 4297680"/>
+              <a:gd name="connsiteY4" fmla="*/ 0 h 4297680"/>
+            </a:gdLst>
+            <a:ahLst/>
+            <a:cxnLst>
+              <a:cxn ang="0">
+                <a:pos x="connsiteX0" y="connsiteY0"/>
+              </a:cxn>
+              <a:cxn ang="0">
+                <a:pos x="connsiteX1" y="connsiteY1"/>
+              </a:cxn>
+              <a:cxn ang="0">
+                <a:pos x="connsiteX2" y="connsiteY2"/>
+              </a:cxn>
+              <a:cxn ang="0">
+                <a:pos x="connsiteX3" y="connsiteY3"/>
+              </a:cxn>
+              <a:cxn ang="0">
+                <a:pos x="connsiteX4" y="connsiteY4"/>
+              </a:cxn>
+            </a:cxnLst>
+            <a:rect l="l" t="t" r="r" b="b"/>
+            <a:pathLst>
+              <a:path w="4297680" h="4297680">
+                <a:moveTo>
+                  <a:pt x="2148840" y="0"/>
+                </a:moveTo>
+                <a:cubicBezTo>
+                  <a:pt x="3335612" y="0"/>
+                  <a:pt x="4297680" y="962068"/>
+                  <a:pt x="4297680" y="2148840"/>
+                </a:cubicBezTo>
+                <a:cubicBezTo>
+                  <a:pt x="4297680" y="3335612"/>
+                  <a:pt x="3335612" y="4297680"/>
+                  <a:pt x="2148840" y="4297680"/>
+                </a:cubicBezTo>
+                <a:cubicBezTo>
+                  <a:pt x="962068" y="4297680"/>
+                  <a:pt x="0" y="3335612"/>
+                  <a:pt x="0" y="2148840"/>
+                </a:cubicBezTo>
+                <a:cubicBezTo>
+                  <a:pt x="0" y="962068"/>
+                  <a:pt x="962068" y="0"/>
+                  <a:pt x="2148840" y="0"/>
+                </a:cubicBezTo>
+                <a:close/>
+              </a:path>
+            </a:pathLst>
+          </a:custGeom>
+          <a:ln>
+            <a:noFill/>
+          </a:ln>
+        </p:spPr>
+        <p:style>
+          <a:lnRef idx="2">
+            <a:schemeClr val="accent1">
+              <a:shade val="50000"/>
+            </a:schemeClr>
+          </a:lnRef>
+          <a:fillRef idx="1">
+            <a:schemeClr val="accent1"/>
+          </a:fillRef>
+          <a:effectRef idx="0">
+            <a:schemeClr val="accent1"/>
+          </a:effectRef>
+          <a:fontRef idx="minor">
+            <a:schemeClr val="lt1"/>
+          </a:fontRef>
+        </p:style>
+        <p:txBody>
+          <a:bodyPr wrap="square" rtlCol="0" anchor="ctr">
+            <a:noAutofit/>
+          </a:bodyPr>
+          <a:lstStyle/>
+          <a:p>
+            <a:pPr algn="ctr"/>
+            <a:endParaRPr lang="en-US"/>
+          </a:p>
+        </p:txBody>
+      </p:sp>
+      <p:sp>
+        <p:nvSpPr>
+          <p:cNvPr id="27" name="Freeform: Shape 26">
+            <a:extLst>
+              <a:ext uri="{FF2B5EF4-FFF2-40B4-BE49-F238E27FC236}">
+                <a16:creationId xmlns:a16="http://schemas.microsoft.com/office/drawing/2014/main" id="{EA518CE4-E4D4-4D8A-980F-6D692AC96949}"/>
+              </a:ext>
+              <a:ext uri="{C183D7F6-B498-43B3-948B-1728B52AA6E4}">
+                <adec:decorative xmlns:adec="http://schemas.microsoft.com/office/drawing/2017/decorative" val="1"/>
+              </a:ext>
+            </a:extLst>
+          </p:cNvPr>
+          <p:cNvSpPr>
+            <a:spLocks noGrp="1" noRot="1" noChangeAspect="1" noMove="1" noResize="1" noEditPoints="1" noAdjustHandles="1" noChangeArrowheads="1" noChangeShapeType="1" noTextEdit="1"/>
+          </p:cNvSpPr>
+          <p:nvPr>
+            <p:extLst>
+              <p:ext uri="{386F3935-93C4-4BCD-93E2-E3B085C9AB24}">
+                <p16:designElem xmlns:p16="http://schemas.microsoft.com/office/powerpoint/2015/main" val="1"/>
+              </p:ext>
+            </p:extLst>
+          </p:nvPr>
+        </p:nvSpPr>
+        <p:spPr>
+          <a:xfrm>
+            <a:off x="0" y="0"/>
+            <a:ext cx="5155454" cy="4845530"/>
+          </a:xfrm>
+          <a:custGeom>
+            <a:avLst/>
+            <a:gdLst>
+              <a:gd name="connsiteX0" fmla="*/ 0 w 5155454"/>
+              <a:gd name="connsiteY0" fmla="*/ 0 h 4845530"/>
+              <a:gd name="connsiteX1" fmla="*/ 4766270 w 5155454"/>
+              <a:gd name="connsiteY1" fmla="*/ 0 h 4845530"/>
+              <a:gd name="connsiteX2" fmla="*/ 4896671 w 5155454"/>
+              <a:gd name="connsiteY2" fmla="*/ 270697 h 4845530"/>
+              <a:gd name="connsiteX3" fmla="*/ 5155454 w 5155454"/>
+              <a:gd name="connsiteY3" fmla="*/ 1552495 h 4845530"/>
+              <a:gd name="connsiteX4" fmla="*/ 1862419 w 5155454"/>
+              <a:gd name="connsiteY4" fmla="*/ 4845530 h 4845530"/>
+              <a:gd name="connsiteX5" fmla="*/ 21252 w 5155454"/>
+              <a:gd name="connsiteY5" fmla="*/ 4283132 h 4845530"/>
+              <a:gd name="connsiteX6" fmla="*/ 0 w 5155454"/>
+              <a:gd name="connsiteY6" fmla="*/ 4267240 h 4845530"/>
+            </a:gdLst>
+            <a:ahLst/>
+            <a:cxnLst>
+              <a:cxn ang="0">
+                <a:pos x="connsiteX0" y="connsiteY0"/>
+              </a:cxn>
+              <a:cxn ang="0">
+                <a:pos x="connsiteX1" y="connsiteY1"/>
+              </a:cxn>
+              <a:cxn ang="0">
+                <a:pos x="connsiteX2" y="connsiteY2"/>
+              </a:cxn>
+              <a:cxn ang="0">
+                <a:pos x="connsiteX3" y="connsiteY3"/>
+              </a:cxn>
+              <a:cxn ang="0">
+                <a:pos x="connsiteX4" y="connsiteY4"/>
+              </a:cxn>
+              <a:cxn ang="0">
+                <a:pos x="connsiteX5" y="connsiteY5"/>
+              </a:cxn>
+              <a:cxn ang="0">
+                <a:pos x="connsiteX6" y="connsiteY6"/>
+              </a:cxn>
+            </a:cxnLst>
+            <a:rect l="l" t="t" r="r" b="b"/>
+            <a:pathLst>
+              <a:path w="5155454" h="4845530">
+                <a:moveTo>
+                  <a:pt x="0" y="0"/>
+                </a:moveTo>
+                <a:lnTo>
+                  <a:pt x="4766270" y="0"/>
+                </a:lnTo>
+                <a:lnTo>
+                  <a:pt x="4896671" y="270697"/>
+                </a:lnTo>
+                <a:cubicBezTo>
+                  <a:pt x="5063308" y="664671"/>
+                  <a:pt x="5155454" y="1097822"/>
+                  <a:pt x="5155454" y="1552495"/>
+                </a:cubicBezTo>
+                <a:cubicBezTo>
+                  <a:pt x="5155454" y="3371188"/>
+                  <a:pt x="3681112" y="4845530"/>
+                  <a:pt x="1862419" y="4845530"/>
+                </a:cubicBezTo>
+                <a:cubicBezTo>
+                  <a:pt x="1180409" y="4845530"/>
+                  <a:pt x="546824" y="4638201"/>
+                  <a:pt x="21252" y="4283132"/>
+                </a:cubicBezTo>
+                <a:lnTo>
+                  <a:pt x="0" y="4267240"/>
+                </a:lnTo>
+                <a:close/>
+              </a:path>
+            </a:pathLst>
+          </a:custGeom>
+          <a:solidFill>
+            <a:schemeClr val="tx1">
+              <a:lumMod val="75000"/>
+              <a:lumOff val="25000"/>
+            </a:schemeClr>
+          </a:solidFill>
+          <a:ln>
+            <a:noFill/>
+          </a:ln>
+        </p:spPr>
+        <p:style>
+          <a:lnRef idx="2">
+            <a:schemeClr val="accent1">
+              <a:shade val="50000"/>
+            </a:schemeClr>
+          </a:lnRef>
+          <a:fillRef idx="1">
+            <a:schemeClr val="accent1"/>
+          </a:fillRef>
+          <a:effectRef idx="0">
+            <a:schemeClr val="accent1"/>
+          </a:effectRef>
+          <a:fontRef idx="minor">
+            <a:schemeClr val="lt1"/>
+          </a:fontRef>
+        </p:style>
+        <p:txBody>
+          <a:bodyPr wrap="square" rtlCol="0" anchor="ctr">
+            <a:noAutofit/>
+          </a:bodyPr>
+          <a:lstStyle/>
+          <a:p>
+            <a:pPr marL="0" marR="0" lvl="0" indent="0" algn="ctr" defTabSz="914400" rtl="0" eaLnBrk="1" fontAlgn="auto" latinLnBrk="0" hangingPunct="1">
+              <a:lnSpc>
+                <a:spcPct val="100000"/>
+              </a:lnSpc>
+              <a:spcBef>
+                <a:spcPts val="0"/>
+              </a:spcBef>
+              <a:spcAft>
+                <a:spcPts val="0"/>
+              </a:spcAft>
+              <a:buClrTx/>
+              <a:buSzTx/>
+              <a:buFontTx/>
+              <a:buNone/>
+              <a:tabLst/>
+              <a:defRPr/>
+            </a:pPr>
+            <a:endParaRPr kumimoji="0" lang="en-US" sz="1800" b="0" i="0" u="none" strike="noStrike" kern="1200" cap="none" spc="0" normalizeH="0" baseline="0" noProof="0">
+              <a:ln>
+                <a:noFill/>
+              </a:ln>
+              <a:solidFill>
+                <a:prstClr val="white"/>
+              </a:solidFill>
+              <a:effectLst/>
+              <a:uLnTx/>
+              <a:uFillTx/>
+              <a:latin typeface="Calibri" panose="020F0502020204030204"/>
+              <a:ea typeface="+mn-ea"/>
+              <a:cs typeface="+mn-cs"/>
+            </a:endParaRPr>
+          </a:p>
+        </p:txBody>
+      </p:sp>
+      <p:sp useBgFill="1">
+        <p:nvSpPr>
+          <p:cNvPr id="29" name="Freeform: Shape 28">
+            <a:extLst>
+              <a:ext uri="{FF2B5EF4-FFF2-40B4-BE49-F238E27FC236}">
+                <a16:creationId xmlns:a16="http://schemas.microsoft.com/office/drawing/2014/main" id="{5E6FAE32-AB12-4E77-A677-F6BD5D71ADD0}"/>
+              </a:ext>
+              <a:ext uri="{C183D7F6-B498-43B3-948B-1728B52AA6E4}">
+                <adec:decorative xmlns:adec="http://schemas.microsoft.com/office/drawing/2017/decorative" val="1"/>
+              </a:ext>
+            </a:extLst>
+          </p:cNvPr>
+          <p:cNvSpPr>
+            <a:spLocks noGrp="1" noRot="1" noChangeAspect="1" noMove="1" noResize="1" noEditPoints="1" noAdjustHandles="1" noChangeArrowheads="1" noChangeShapeType="1" noTextEdit="1"/>
+          </p:cNvSpPr>
+          <p:nvPr>
+            <p:extLst>
+              <p:ext uri="{386F3935-93C4-4BCD-93E2-E3B085C9AB24}">
+                <p16:designElem xmlns:p16="http://schemas.microsoft.com/office/powerpoint/2015/main" val="1"/>
+              </p:ext>
+            </p:extLst>
+          </p:nvPr>
+        </p:nvSpPr>
+        <p:spPr>
+          <a:xfrm>
+            <a:off x="0" y="0"/>
+            <a:ext cx="5017099" cy="4718647"/>
+          </a:xfrm>
+          <a:custGeom>
+            <a:avLst/>
+            <a:gdLst>
+              <a:gd name="connsiteX0" fmla="*/ 0 w 5017099"/>
+              <a:gd name="connsiteY0" fmla="*/ 0 h 4718647"/>
+              <a:gd name="connsiteX1" fmla="*/ 4599738 w 5017099"/>
+              <a:gd name="connsiteY1" fmla="*/ 0 h 4718647"/>
+              <a:gd name="connsiteX2" fmla="*/ 4636346 w 5017099"/>
+              <a:gd name="connsiteY2" fmla="*/ 60259 h 4718647"/>
+              <a:gd name="connsiteX3" fmla="*/ 5017099 w 5017099"/>
+              <a:gd name="connsiteY3" fmla="*/ 1563967 h 4718647"/>
+              <a:gd name="connsiteX4" fmla="*/ 1862419 w 5017099"/>
+              <a:gd name="connsiteY4" fmla="*/ 4718647 h 4718647"/>
+              <a:gd name="connsiteX5" fmla="*/ 98607 w 5017099"/>
+              <a:gd name="connsiteY5" fmla="*/ 4179877 h 4718647"/>
+              <a:gd name="connsiteX6" fmla="*/ 0 w 5017099"/>
+              <a:gd name="connsiteY6" fmla="*/ 4106140 h 4718647"/>
+            </a:gdLst>
+            <a:ahLst/>
+            <a:cxnLst>
+              <a:cxn ang="0">
+                <a:pos x="connsiteX0" y="connsiteY0"/>
+              </a:cxn>
+              <a:cxn ang="0">
+                <a:pos x="connsiteX1" y="connsiteY1"/>
+              </a:cxn>
+              <a:cxn ang="0">
+                <a:pos x="connsiteX2" y="connsiteY2"/>
+              </a:cxn>
+              <a:cxn ang="0">
+                <a:pos x="connsiteX3" y="connsiteY3"/>
+              </a:cxn>
+              <a:cxn ang="0">
+                <a:pos x="connsiteX4" y="connsiteY4"/>
+              </a:cxn>
+              <a:cxn ang="0">
+                <a:pos x="connsiteX5" y="connsiteY5"/>
+              </a:cxn>
+              <a:cxn ang="0">
+                <a:pos x="connsiteX6" y="connsiteY6"/>
+              </a:cxn>
+            </a:cxnLst>
+            <a:rect l="l" t="t" r="r" b="b"/>
+            <a:pathLst>
+              <a:path w="5017099" h="4718647">
+                <a:moveTo>
+                  <a:pt x="0" y="0"/>
+                </a:moveTo>
+                <a:lnTo>
+                  <a:pt x="4599738" y="0"/>
+                </a:lnTo>
+                <a:lnTo>
+                  <a:pt x="4636346" y="60259"/>
+                </a:lnTo>
+                <a:cubicBezTo>
+                  <a:pt x="4879170" y="507256"/>
+                  <a:pt x="5017099" y="1019504"/>
+                  <a:pt x="5017099" y="1563967"/>
+                </a:cubicBezTo>
+                <a:cubicBezTo>
+                  <a:pt x="5017099" y="3306249"/>
+                  <a:pt x="3604701" y="4718647"/>
+                  <a:pt x="1862419" y="4718647"/>
+                </a:cubicBezTo>
+                <a:cubicBezTo>
+                  <a:pt x="1209063" y="4718647"/>
+                  <a:pt x="602098" y="4520029"/>
+                  <a:pt x="98607" y="4179877"/>
+                </a:cubicBezTo>
+                <a:lnTo>
+                  <a:pt x="0" y="4106140"/>
+                </a:lnTo>
+                <a:close/>
+              </a:path>
+            </a:pathLst>
+          </a:custGeom>
+          <a:ln>
+            <a:noFill/>
+          </a:ln>
+        </p:spPr>
+        <p:style>
+          <a:lnRef idx="2">
+            <a:schemeClr val="accent1">
+              <a:shade val="50000"/>
+            </a:schemeClr>
+          </a:lnRef>
+          <a:fillRef idx="1">
+            <a:schemeClr val="accent1"/>
+          </a:fillRef>
+          <a:effectRef idx="0">
+            <a:schemeClr val="accent1"/>
+          </a:effectRef>
+          <a:fontRef idx="minor">
+            <a:schemeClr val="lt1"/>
+          </a:fontRef>
+        </p:style>
+        <p:txBody>
+          <a:bodyPr wrap="square" rtlCol="0" anchor="ctr">
+            <a:noAutofit/>
+          </a:bodyPr>
+          <a:lstStyle/>
+          <a:p>
+            <a:pPr algn="ctr"/>
+            <a:endParaRPr lang="en-US"/>
+          </a:p>
+        </p:txBody>
+      </p:sp>
+      <p:pic>
+        <p:nvPicPr>
+          <p:cNvPr id="14" name="Picture 13">
+            <a:extLst>
+              <a:ext uri="{FF2B5EF4-FFF2-40B4-BE49-F238E27FC236}">
+                <a16:creationId xmlns:a16="http://schemas.microsoft.com/office/drawing/2014/main" id="{03EAEAE1-F58C-440C-BAD3-A8C17333D3CA}"/>
+              </a:ext>
+            </a:extLst>
+          </p:cNvPr>
+          <p:cNvPicPr>
+            <a:picLocks noChangeAspect="1"/>
+          </p:cNvPicPr>
+          <p:nvPr/>
+        </p:nvPicPr>
+        <p:blipFill>
+          <a:blip r:embed="rId2"/>
+          <a:stretch>
+            <a:fillRect/>
+          </a:stretch>
+        </p:blipFill>
+        <p:spPr>
+          <a:xfrm>
+            <a:off x="495608" y="463674"/>
+            <a:ext cx="3205526" cy="3217333"/>
+          </a:xfrm>
+          <a:prstGeom prst="ellipse">
+            <a:avLst/>
+          </a:prstGeom>
+          <a:ln w="63500" cap="rnd">
+            <a:solidFill>
+              <a:srgbClr val="333333"/>
+            </a:solidFill>
+          </a:ln>
+          <a:effectLst>
+            <a:outerShdw blurRad="381000" dist="292100" dir="5400000" sx="-80000" sy="-18000" rotWithShape="0">
+              <a:srgbClr val="000000">
+                <a:alpha val="22000"/>
+              </a:srgbClr>
+            </a:outerShdw>
+          </a:effectLst>
+          <a:scene3d>
+            <a:camera prst="orthographicFront"/>
+            <a:lightRig rig="contrasting" dir="t">
+              <a:rot lat="0" lon="0" rev="3000000"/>
+            </a:lightRig>
+          </a:scene3d>
+          <a:sp3d contourW="7620">
+            <a:bevelT w="95250" h="31750"/>
+            <a:contourClr>
+              <a:srgbClr val="333333"/>
+            </a:contourClr>
+          </a:sp3d>
+        </p:spPr>
+      </p:pic>
+      <p:pic>
+        <p:nvPicPr>
+          <p:cNvPr id="6" name="Picture 5">
+            <a:extLst>
+              <a:ext uri="{FF2B5EF4-FFF2-40B4-BE49-F238E27FC236}">
+                <a16:creationId xmlns:a16="http://schemas.microsoft.com/office/drawing/2014/main" id="{4B232790-2284-4FA0-B8C8-73C776AF602C}"/>
+              </a:ext>
+            </a:extLst>
+          </p:cNvPr>
+          <p:cNvPicPr>
+            <a:picLocks noChangeAspect="1"/>
+          </p:cNvPicPr>
+          <p:nvPr/>
+        </p:nvPicPr>
+        <p:blipFill>
+          <a:blip r:embed="rId3"/>
+          <a:stretch>
+            <a:fillRect/>
+          </a:stretch>
+        </p:blipFill>
+        <p:spPr>
+          <a:xfrm>
+            <a:off x="6602841" y="378015"/>
+            <a:ext cx="1244820" cy="1244820"/>
+          </a:xfrm>
+          <a:prstGeom prst="ellipse">
+            <a:avLst/>
+          </a:prstGeom>
+          <a:ln w="63500" cap="rnd">
+            <a:solidFill>
+              <a:srgbClr val="333333"/>
+            </a:solidFill>
+          </a:ln>
+          <a:effectLst>
+            <a:outerShdw blurRad="381000" dist="292100" dir="5400000" sx="-80000" sy="-18000" rotWithShape="0">
+              <a:srgbClr val="000000">
+                <a:alpha val="22000"/>
+              </a:srgbClr>
+            </a:outerShdw>
+          </a:effectLst>
+          <a:scene3d>
+            <a:camera prst="orthographicFront"/>
+            <a:lightRig rig="contrasting" dir="t">
+              <a:rot lat="0" lon="0" rev="3000000"/>
+            </a:lightRig>
+          </a:scene3d>
+          <a:sp3d contourW="7620">
+            <a:bevelT w="95250" h="31750"/>
+            <a:contourClr>
+              <a:srgbClr val="333333"/>
+            </a:contourClr>
+          </a:sp3d>
+        </p:spPr>
+      </p:pic>
+      <p:pic>
+        <p:nvPicPr>
+          <p:cNvPr id="8" name="Picture 7">
+            <a:extLst>
+              <a:ext uri="{FF2B5EF4-FFF2-40B4-BE49-F238E27FC236}">
+                <a16:creationId xmlns:a16="http://schemas.microsoft.com/office/drawing/2014/main" id="{1829B404-513C-4B23-AA86-B8487139AB87}"/>
+              </a:ext>
+            </a:extLst>
+          </p:cNvPr>
+          <p:cNvPicPr>
+            <a:picLocks noChangeAspect="1"/>
+          </p:cNvPicPr>
+          <p:nvPr/>
+        </p:nvPicPr>
+        <p:blipFill>
+          <a:blip r:embed="rId4"/>
+          <a:stretch>
+            <a:fillRect/>
+          </a:stretch>
+        </p:blipFill>
+        <p:spPr>
+          <a:xfrm>
+            <a:off x="1615069" y="5010261"/>
+            <a:ext cx="1276071" cy="1278466"/>
+          </a:xfrm>
+          <a:prstGeom prst="ellipse">
+            <a:avLst/>
+          </a:prstGeom>
+          <a:ln w="63500" cap="rnd">
+            <a:solidFill>
+              <a:srgbClr val="333333"/>
+            </a:solidFill>
+          </a:ln>
+          <a:effectLst>
+            <a:outerShdw blurRad="381000" dist="292100" dir="5400000" sx="-80000" sy="-18000" rotWithShape="0">
+              <a:srgbClr val="000000">
+                <a:alpha val="22000"/>
+              </a:srgbClr>
+            </a:outerShdw>
+          </a:effectLst>
+          <a:scene3d>
+            <a:camera prst="orthographicFront"/>
+            <a:lightRig rig="contrasting" dir="t">
+              <a:rot lat="0" lon="0" rev="3000000"/>
+            </a:lightRig>
+          </a:scene3d>
+          <a:sp3d contourW="7620">
+            <a:bevelT w="95250" h="31750"/>
+            <a:contourClr>
+              <a:srgbClr val="333333"/>
+            </a:contourClr>
+          </a:sp3d>
+        </p:spPr>
+      </p:pic>
+      <p:pic>
+        <p:nvPicPr>
+          <p:cNvPr id="4" name="Picture 4">
+            <a:extLst>
+              <a:ext uri="{FF2B5EF4-FFF2-40B4-BE49-F238E27FC236}">
+                <a16:creationId xmlns:a16="http://schemas.microsoft.com/office/drawing/2014/main" id="{448661E6-C1D7-4D2B-A49C-5956778FA2B9}"/>
+              </a:ext>
+            </a:extLst>
+          </p:cNvPr>
+          <p:cNvPicPr>
+            <a:picLocks noChangeAspect="1" noChangeArrowheads="1"/>
+          </p:cNvPicPr>
+          <p:nvPr/>
+        </p:nvPicPr>
+        <p:blipFill>
+          <a:blip r:embed="rId5">
+            <a:extLst>
+              <a:ext uri="{28A0092B-C50C-407E-A947-70E740481C1C}">
+                <a14:useLocalDpi xmlns:a14="http://schemas.microsoft.com/office/drawing/2010/main" val="0"/>
+              </a:ext>
+            </a:extLst>
+          </a:blip>
+          <a:stretch>
+            <a:fillRect/>
+          </a:stretch>
+        </p:blipFill>
+        <p:spPr bwMode="auto">
+          <a:xfrm>
+            <a:off x="4919683" y="3171221"/>
+            <a:ext cx="2069129" cy="2079526"/>
+          </a:xfrm>
+          <a:prstGeom prst="ellipse">
+            <a:avLst/>
+          </a:prstGeom>
+          <a:ln w="63500" cap="rnd">
+            <a:solidFill>
+              <a:srgbClr val="333333"/>
+            </a:solidFill>
+          </a:ln>
+          <a:effectLst>
+            <a:outerShdw blurRad="381000" dist="292100" dir="5400000" sx="-80000" sy="-18000" rotWithShape="0">
+              <a:srgbClr val="000000">
+                <a:alpha val="22000"/>
+              </a:srgbClr>
+            </a:outerShdw>
+          </a:effectLst>
+          <a:scene3d>
+            <a:camera prst="orthographicFront"/>
+            <a:lightRig rig="contrasting" dir="t">
+              <a:rot lat="0" lon="0" rev="3000000"/>
+            </a:lightRig>
+          </a:scene3d>
+          <a:sp3d contourW="7620">
+            <a:bevelT w="95250" h="31750"/>
+            <a:contourClr>
+              <a:srgbClr val="333333"/>
+            </a:contourClr>
+          </a:sp3d>
+        </p:spPr>
+      </p:pic>
+      <p:pic>
+        <p:nvPicPr>
+          <p:cNvPr id="5" name="Picture 4">
+            <a:extLst>
+              <a:ext uri="{FF2B5EF4-FFF2-40B4-BE49-F238E27FC236}">
+                <a16:creationId xmlns:a16="http://schemas.microsoft.com/office/drawing/2014/main" id="{571C406F-FBD4-4E8A-A9ED-A88AD08DE073}"/>
+              </a:ext>
+            </a:extLst>
+          </p:cNvPr>
+          <p:cNvPicPr>
+            <a:picLocks noChangeAspect="1"/>
+          </p:cNvPicPr>
+          <p:nvPr/>
+        </p:nvPicPr>
+        <p:blipFill>
+          <a:blip r:embed="rId6"/>
+          <a:stretch>
+            <a:fillRect/>
+          </a:stretch>
+        </p:blipFill>
+        <p:spPr>
+          <a:xfrm>
+            <a:off x="8208003" y="2842309"/>
+            <a:ext cx="3209289" cy="3217333"/>
+          </a:xfrm>
+          <a:prstGeom prst="ellipse">
+            <a:avLst/>
+          </a:prstGeom>
+          <a:ln w="63500" cap="rnd">
+            <a:solidFill>
+              <a:srgbClr val="333333"/>
+            </a:solidFill>
+          </a:ln>
+          <a:effectLst>
+            <a:outerShdw blurRad="381000" dist="292100" dir="5400000" sx="-80000" sy="-18000" rotWithShape="0">
+              <a:srgbClr val="000000">
+                <a:alpha val="22000"/>
+              </a:srgbClr>
+            </a:outerShdw>
+          </a:effectLst>
+          <a:scene3d>
+            <a:camera prst="orthographicFront"/>
+            <a:lightRig rig="contrasting" dir="t">
+              <a:rot lat="0" lon="0" rev="3000000"/>
+            </a:lightRig>
+          </a:scene3d>
+          <a:sp3d contourW="7620">
+            <a:bevelT w="95250" h="31750"/>
+            <a:contourClr>
+              <a:srgbClr val="333333"/>
+            </a:contourClr>
+          </a:sp3d>
+        </p:spPr>
+      </p:pic>
+    </p:spTree>
+    <p:extLst>
+      <p:ext uri="{BB962C8B-B14F-4D97-AF65-F5344CB8AC3E}">
+        <p14:creationId xmlns:p14="http://schemas.microsoft.com/office/powerpoint/2010/main" val="2535509459"/>
+      </p:ext>
+    </p:extLst>
+  </p:cSld>
+  <p:clrMapOvr>
+    <a:masterClrMapping/>
+  </p:clrMapOvr>
+</p:sld>
+</file>
+
 <file path=ppt/slides/slide8.xml><?xml version="1.0" encoding="utf-8"?>
 <p:sld xmlns:a="http://schemas.openxmlformats.org/drawingml/2006/main" xmlns:r="http://schemas.openxmlformats.org/officeDocument/2006/relationships" xmlns:p="http://schemas.openxmlformats.org/presentationml/2006/main">
   <p:cSld>

</xml_diff>